<commit_message>
Improved figure on verification framework
</commit_message>
<xml_diff>
--- a/chapter_03/figures/forecast_evaluation_strategy.pptx
+++ b/chapter_03/figures/forecast_evaluation_strategy.pptx
@@ -2,7 +2,7 @@
 <file path=ppt/presentation.xml><?xml version="1.0" encoding="utf-8"?>
 <p:presentation xmlns:a="http://schemas.openxmlformats.org/drawingml/2006/main" xmlns:r="http://schemas.openxmlformats.org/officeDocument/2006/relationships" xmlns:p="http://schemas.openxmlformats.org/presentationml/2006/main" saveSubsetFonts="1">
   <p:sldMasterIdLst>
-    <p:sldMasterId id="2147483720" r:id="rId1"/>
+    <p:sldMasterId id="2147483732" r:id="rId1"/>
   </p:sldMasterIdLst>
   <p:notesMasterIdLst>
     <p:notesMasterId r:id="rId3"/>
@@ -10,7 +10,7 @@
   <p:sldIdLst>
     <p:sldId id="256" r:id="rId2"/>
   </p:sldIdLst>
-  <p:sldSz cx="4140200" cy="5688013"/>
+  <p:sldSz cx="4140200" cy="5975350"/>
   <p:notesSz cx="6858000" cy="9144000"/>
   <p:defaultTextStyle>
     <a:defPPr>
@@ -118,7 +118,7 @@
 <file path=ppt/revisionInfo.xml><?xml version="1.0" encoding="utf-8"?>
 <p1510:revInfo xmlns:a="http://schemas.openxmlformats.org/drawingml/2006/main" xmlns:r="http://schemas.openxmlformats.org/officeDocument/2006/relationships" xmlns:p1510="http://schemas.microsoft.com/office/powerpoint/2015/10/main">
   <p1510:revLst>
-    <p1510:client id="{61D033AF-DECF-4E4A-A0E6-FAFF0A02AD4A}" v="36" dt="2025-06-26T16:51:51.109"/>
+    <p1510:client id="{61D033AF-DECF-4E4A-A0E6-FAFF0A02AD4A}" v="38" dt="2025-06-27T05:46:37.567"/>
   </p1510:revLst>
 </p1510:revInfo>
 </file>
@@ -128,16 +128,24 @@
   <pc:docChgLst>
     <pc:chgData name="Fatima Pillosu" userId="a6295d4dc9e22643" providerId="LiveId" clId="{61D033AF-DECF-4E4A-A0E6-FAFF0A02AD4A}"/>
     <pc:docChg chg="undo custSel modSld">
-      <pc:chgData name="Fatima Pillosu" userId="a6295d4dc9e22643" providerId="LiveId" clId="{61D033AF-DECF-4E4A-A0E6-FAFF0A02AD4A}" dt="2025-06-27T04:19:31.373" v="3276" actId="207"/>
+      <pc:chgData name="Fatima Pillosu" userId="a6295d4dc9e22643" providerId="LiveId" clId="{61D033AF-DECF-4E4A-A0E6-FAFF0A02AD4A}" dt="2025-06-27T05:46:41.828" v="3401" actId="1036"/>
       <pc:docMkLst>
         <pc:docMk/>
       </pc:docMkLst>
       <pc:sldChg chg="addSp delSp modSp mod">
-        <pc:chgData name="Fatima Pillosu" userId="a6295d4dc9e22643" providerId="LiveId" clId="{61D033AF-DECF-4E4A-A0E6-FAFF0A02AD4A}" dt="2025-06-27T04:19:31.373" v="3276" actId="207"/>
+        <pc:chgData name="Fatima Pillosu" userId="a6295d4dc9e22643" providerId="LiveId" clId="{61D033AF-DECF-4E4A-A0E6-FAFF0A02AD4A}" dt="2025-06-27T05:46:41.828" v="3401" actId="1036"/>
         <pc:sldMkLst>
           <pc:docMk/>
           <pc:sldMk cId="2412790101" sldId="256"/>
         </pc:sldMkLst>
+        <pc:spChg chg="add del">
+          <ac:chgData name="Fatima Pillosu" userId="a6295d4dc9e22643" providerId="LiveId" clId="{61D033AF-DECF-4E4A-A0E6-FAFF0A02AD4A}" dt="2025-06-27T05:46:19.716" v="3397" actId="478"/>
+          <ac:spMkLst>
+            <pc:docMk/>
+            <pc:sldMk cId="2412790101" sldId="256"/>
+            <ac:spMk id="2" creationId="{315F676F-B7C7-6EB9-DC91-7AAA3B91CAB6}"/>
+          </ac:spMkLst>
+        </pc:spChg>
         <pc:spChg chg="add del mod">
           <ac:chgData name="Fatima Pillosu" userId="a6295d4dc9e22643" providerId="LiveId" clId="{61D033AF-DECF-4E4A-A0E6-FAFF0A02AD4A}" dt="2025-06-26T16:47:03.976" v="3169" actId="478"/>
           <ac:spMkLst>
@@ -154,12 +162,28 @@
             <ac:spMk id="3" creationId="{5F9C8026-4C6B-D6F9-CA2C-A59B5ECF5D00}"/>
           </ac:spMkLst>
         </pc:spChg>
+        <pc:spChg chg="add mod">
+          <ac:chgData name="Fatima Pillosu" userId="a6295d4dc9e22643" providerId="LiveId" clId="{61D033AF-DECF-4E4A-A0E6-FAFF0A02AD4A}" dt="2025-06-27T05:46:41.828" v="3401" actId="1036"/>
+          <ac:spMkLst>
+            <pc:docMk/>
+            <pc:sldMk cId="2412790101" sldId="256"/>
+            <ac:spMk id="3" creationId="{F0379129-0B4C-9E6E-3C06-018694AD7810}"/>
+          </ac:spMkLst>
+        </pc:spChg>
         <pc:spChg chg="add del mod">
           <ac:chgData name="Fatima Pillosu" userId="a6295d4dc9e22643" providerId="LiveId" clId="{61D033AF-DECF-4E4A-A0E6-FAFF0A02AD4A}" dt="2025-06-26T16:50:18.344" v="3216" actId="21"/>
           <ac:spMkLst>
             <pc:docMk/>
             <pc:sldMk cId="2412790101" sldId="256"/>
             <ac:spMk id="3" creationId="{FB5C892E-DCD3-8B9E-2922-1E95ED9097F3}"/>
+          </ac:spMkLst>
+        </pc:spChg>
+        <pc:spChg chg="add mod">
+          <ac:chgData name="Fatima Pillosu" userId="a6295d4dc9e22643" providerId="LiveId" clId="{61D033AF-DECF-4E4A-A0E6-FAFF0A02AD4A}" dt="2025-06-27T05:46:41.828" v="3401" actId="1036"/>
+          <ac:spMkLst>
+            <pc:docMk/>
+            <pc:sldMk cId="2412790101" sldId="256"/>
+            <ac:spMk id="4" creationId="{270F2959-BD8B-2196-95FB-8D47C2F8DFEE}"/>
           </ac:spMkLst>
         </pc:spChg>
         <pc:spChg chg="del">
@@ -178,6 +202,14 @@
             <ac:spMk id="4" creationId="{583A55BE-6294-291E-24EA-6FDD03CBA2E7}"/>
           </ac:spMkLst>
         </pc:spChg>
+        <pc:spChg chg="add mod">
+          <ac:chgData name="Fatima Pillosu" userId="a6295d4dc9e22643" providerId="LiveId" clId="{61D033AF-DECF-4E4A-A0E6-FAFF0A02AD4A}" dt="2025-06-27T05:46:41.828" v="3401" actId="1036"/>
+          <ac:spMkLst>
+            <pc:docMk/>
+            <pc:sldMk cId="2412790101" sldId="256"/>
+            <ac:spMk id="5" creationId="{062ED1AE-086B-DAEA-D664-FB6D28F48278}"/>
+          </ac:spMkLst>
+        </pc:spChg>
         <pc:spChg chg="del">
           <ac:chgData name="Fatima Pillosu" userId="a6295d4dc9e22643" providerId="LiveId" clId="{61D033AF-DECF-4E4A-A0E6-FAFF0A02AD4A}" dt="2025-06-26T05:34:22.862" v="74" actId="21"/>
           <ac:spMkLst>
@@ -210,6 +242,14 @@
             <ac:spMk id="6" creationId="{91E8465F-C483-4093-3158-F91048E66783}"/>
           </ac:spMkLst>
         </pc:spChg>
+        <pc:spChg chg="add mod">
+          <ac:chgData name="Fatima Pillosu" userId="a6295d4dc9e22643" providerId="LiveId" clId="{61D033AF-DECF-4E4A-A0E6-FAFF0A02AD4A}" dt="2025-06-27T05:46:41.828" v="3401" actId="1036"/>
+          <ac:spMkLst>
+            <pc:docMk/>
+            <pc:sldMk cId="2412790101" sldId="256"/>
+            <ac:spMk id="6" creationId="{FB5C892E-DCD3-8B9E-2922-1E95ED9097F3}"/>
+          </ac:spMkLst>
+        </pc:spChg>
         <pc:spChg chg="add del mod">
           <ac:chgData name="Fatima Pillosu" userId="a6295d4dc9e22643" providerId="LiveId" clId="{61D033AF-DECF-4E4A-A0E6-FAFF0A02AD4A}" dt="2025-06-26T16:47:03.976" v="3169" actId="478"/>
           <ac:spMkLst>
@@ -218,12 +258,36 @@
             <ac:spMk id="7" creationId="{31C95DF1-1021-B801-DF6E-518471057358}"/>
           </ac:spMkLst>
         </pc:spChg>
+        <pc:spChg chg="add mod">
+          <ac:chgData name="Fatima Pillosu" userId="a6295d4dc9e22643" providerId="LiveId" clId="{61D033AF-DECF-4E4A-A0E6-FAFF0A02AD4A}" dt="2025-06-27T05:46:41.828" v="3401" actId="1036"/>
+          <ac:spMkLst>
+            <pc:docMk/>
+            <pc:sldMk cId="2412790101" sldId="256"/>
+            <ac:spMk id="7" creationId="{9B01EB53-902C-3FEF-12AF-92C7EBD29C1D}"/>
+          </ac:spMkLst>
+        </pc:spChg>
         <pc:spChg chg="add del mod">
           <ac:chgData name="Fatima Pillosu" userId="a6295d4dc9e22643" providerId="LiveId" clId="{61D033AF-DECF-4E4A-A0E6-FAFF0A02AD4A}" dt="2025-06-26T16:47:03.976" v="3169" actId="478"/>
           <ac:spMkLst>
             <pc:docMk/>
             <pc:sldMk cId="2412790101" sldId="256"/>
             <ac:spMk id="8" creationId="{26DAFA34-6888-C3F6-07E1-0C3D78F45867}"/>
+          </ac:spMkLst>
+        </pc:spChg>
+        <pc:spChg chg="add mod">
+          <ac:chgData name="Fatima Pillosu" userId="a6295d4dc9e22643" providerId="LiveId" clId="{61D033AF-DECF-4E4A-A0E6-FAFF0A02AD4A}" dt="2025-06-27T05:46:41.828" v="3401" actId="1036"/>
+          <ac:spMkLst>
+            <pc:docMk/>
+            <pc:sldMk cId="2412790101" sldId="256"/>
+            <ac:spMk id="8" creationId="{91E8465F-C483-4093-3158-F91048E66783}"/>
+          </ac:spMkLst>
+        </pc:spChg>
+        <pc:spChg chg="add mod">
+          <ac:chgData name="Fatima Pillosu" userId="a6295d4dc9e22643" providerId="LiveId" clId="{61D033AF-DECF-4E4A-A0E6-FAFF0A02AD4A}" dt="2025-06-27T05:46:41.828" v="3401" actId="1036"/>
+          <ac:spMkLst>
+            <pc:docMk/>
+            <pc:sldMk cId="2412790101" sldId="256"/>
+            <ac:spMk id="9" creationId="{14B4D2FE-6A01-70EE-57E1-D9A209E24C0F}"/>
           </ac:spMkLst>
         </pc:spChg>
         <pc:spChg chg="add del mod">
@@ -250,6 +314,22 @@
             <ac:spMk id="10" creationId="{E88CAF47-5440-73C9-1B42-B3885629252B}"/>
           </ac:spMkLst>
         </pc:spChg>
+        <pc:spChg chg="add mod">
+          <ac:chgData name="Fatima Pillosu" userId="a6295d4dc9e22643" providerId="LiveId" clId="{61D033AF-DECF-4E4A-A0E6-FAFF0A02AD4A}" dt="2025-06-27T05:46:41.828" v="3401" actId="1036"/>
+          <ac:spMkLst>
+            <pc:docMk/>
+            <pc:sldMk cId="2412790101" sldId="256"/>
+            <ac:spMk id="10" creationId="{FACA5D21-1BAA-49AA-7590-BDC05D388114}"/>
+          </ac:spMkLst>
+        </pc:spChg>
+        <pc:spChg chg="add mod">
+          <ac:chgData name="Fatima Pillosu" userId="a6295d4dc9e22643" providerId="LiveId" clId="{61D033AF-DECF-4E4A-A0E6-FAFF0A02AD4A}" dt="2025-06-27T05:46:41.828" v="3401" actId="1036"/>
+          <ac:spMkLst>
+            <pc:docMk/>
+            <pc:sldMk cId="2412790101" sldId="256"/>
+            <ac:spMk id="11" creationId="{5216C86E-60C9-619C-F246-35D203BB2F07}"/>
+          </ac:spMkLst>
+        </pc:spChg>
         <pc:spChg chg="del">
           <ac:chgData name="Fatima Pillosu" userId="a6295d4dc9e22643" providerId="LiveId" clId="{61D033AF-DECF-4E4A-A0E6-FAFF0A02AD4A}" dt="2025-06-26T05:34:22.862" v="74" actId="21"/>
           <ac:spMkLst>
@@ -274,6 +354,14 @@
             <ac:spMk id="12" creationId="{5216C86E-60C9-619C-F246-35D203BB2F07}"/>
           </ac:spMkLst>
         </pc:spChg>
+        <pc:spChg chg="add mod">
+          <ac:chgData name="Fatima Pillosu" userId="a6295d4dc9e22643" providerId="LiveId" clId="{61D033AF-DECF-4E4A-A0E6-FAFF0A02AD4A}" dt="2025-06-27T05:46:41.828" v="3401" actId="1036"/>
+          <ac:spMkLst>
+            <pc:docMk/>
+            <pc:sldMk cId="2412790101" sldId="256"/>
+            <ac:spMk id="12" creationId="{A2A0F751-F9A6-3129-E72C-A6BE6A161570}"/>
+          </ac:spMkLst>
+        </pc:spChg>
         <pc:spChg chg="del">
           <ac:chgData name="Fatima Pillosu" userId="a6295d4dc9e22643" providerId="LiveId" clId="{61D033AF-DECF-4E4A-A0E6-FAFF0A02AD4A}" dt="2025-06-26T05:34:22.862" v="74" actId="21"/>
           <ac:spMkLst>
@@ -290,6 +378,14 @@
             <ac:spMk id="13" creationId="{AB6D6DF9-DF18-A3D3-FAC5-57B9823F41B1}"/>
           </ac:spMkLst>
         </pc:spChg>
+        <pc:spChg chg="add mod">
+          <ac:chgData name="Fatima Pillosu" userId="a6295d4dc9e22643" providerId="LiveId" clId="{61D033AF-DECF-4E4A-A0E6-FAFF0A02AD4A}" dt="2025-06-27T05:46:41.828" v="3401" actId="1036"/>
+          <ac:spMkLst>
+            <pc:docMk/>
+            <pc:sldMk cId="2412790101" sldId="256"/>
+            <ac:spMk id="13" creationId="{C181FF3B-6AD0-1BE1-4914-0A9CA1D7C4D3}"/>
+          </ac:spMkLst>
+        </pc:spChg>
         <pc:spChg chg="del">
           <ac:chgData name="Fatima Pillosu" userId="a6295d4dc9e22643" providerId="LiveId" clId="{61D033AF-DECF-4E4A-A0E6-FAFF0A02AD4A}" dt="2025-06-26T05:34:22.862" v="74" actId="21"/>
           <ac:spMkLst>
@@ -306,6 +402,14 @@
             <ac:spMk id="14" creationId="{44F96520-C1B8-0DEE-FE46-92F1569833C7}"/>
           </ac:spMkLst>
         </pc:spChg>
+        <pc:spChg chg="add mod">
+          <ac:chgData name="Fatima Pillosu" userId="a6295d4dc9e22643" providerId="LiveId" clId="{61D033AF-DECF-4E4A-A0E6-FAFF0A02AD4A}" dt="2025-06-27T05:46:41.828" v="3401" actId="1036"/>
+          <ac:spMkLst>
+            <pc:docMk/>
+            <pc:sldMk cId="2412790101" sldId="256"/>
+            <ac:spMk id="14" creationId="{F64F700D-59E2-F229-195C-FCF79FDABACB}"/>
+          </ac:spMkLst>
+        </pc:spChg>
         <pc:spChg chg="del">
           <ac:chgData name="Fatima Pillosu" userId="a6295d4dc9e22643" providerId="LiveId" clId="{61D033AF-DECF-4E4A-A0E6-FAFF0A02AD4A}" dt="2025-06-26T05:34:22.862" v="74" actId="21"/>
           <ac:spMkLst>
@@ -314,6 +418,14 @@
             <ac:spMk id="15" creationId="{270F2959-BD8B-2196-95FB-8D47C2F8DFEE}"/>
           </ac:spMkLst>
         </pc:spChg>
+        <pc:spChg chg="add mod">
+          <ac:chgData name="Fatima Pillosu" userId="a6295d4dc9e22643" providerId="LiveId" clId="{61D033AF-DECF-4E4A-A0E6-FAFF0A02AD4A}" dt="2025-06-27T05:46:41.828" v="3401" actId="1036"/>
+          <ac:spMkLst>
+            <pc:docMk/>
+            <pc:sldMk cId="2412790101" sldId="256"/>
+            <ac:spMk id="15" creationId="{675F66ED-1587-EE2D-7961-3C1CE26DA6A5}"/>
+          </ac:spMkLst>
+        </pc:spChg>
         <pc:spChg chg="add del mod">
           <ac:chgData name="Fatima Pillosu" userId="a6295d4dc9e22643" providerId="LiveId" clId="{61D033AF-DECF-4E4A-A0E6-FAFF0A02AD4A}" dt="2025-06-26T16:50:18.344" v="3216" actId="21"/>
           <ac:spMkLst>
@@ -338,6 +450,22 @@
             <ac:spMk id="16" creationId="{E88CAF47-5440-73C9-1B42-B3885629252B}"/>
           </ac:spMkLst>
         </pc:spChg>
+        <pc:spChg chg="add mod">
+          <ac:chgData name="Fatima Pillosu" userId="a6295d4dc9e22643" providerId="LiveId" clId="{61D033AF-DECF-4E4A-A0E6-FAFF0A02AD4A}" dt="2025-06-27T05:46:41.828" v="3401" actId="1036"/>
+          <ac:spMkLst>
+            <pc:docMk/>
+            <pc:sldMk cId="2412790101" sldId="256"/>
+            <ac:spMk id="16" creationId="{EE073022-3D67-FA36-A6BB-1349696A25C2}"/>
+          </ac:spMkLst>
+        </pc:spChg>
+        <pc:spChg chg="add mod">
+          <ac:chgData name="Fatima Pillosu" userId="a6295d4dc9e22643" providerId="LiveId" clId="{61D033AF-DECF-4E4A-A0E6-FAFF0A02AD4A}" dt="2025-06-27T05:46:41.828" v="3401" actId="1036"/>
+          <ac:spMkLst>
+            <pc:docMk/>
+            <pc:sldMk cId="2412790101" sldId="256"/>
+            <ac:spMk id="17" creationId="{6FE58704-E40A-B268-7ACF-6EE103269248}"/>
+          </ac:spMkLst>
+        </pc:spChg>
         <pc:spChg chg="add del mod">
           <ac:chgData name="Fatima Pillosu" userId="a6295d4dc9e22643" providerId="LiveId" clId="{61D033AF-DECF-4E4A-A0E6-FAFF0A02AD4A}" dt="2025-06-26T16:50:18.344" v="3216" actId="21"/>
           <ac:spMkLst>
@@ -346,6 +474,14 @@
             <ac:spMk id="17" creationId="{F0379129-0B4C-9E6E-3C06-018694AD7810}"/>
           </ac:spMkLst>
         </pc:spChg>
+        <pc:spChg chg="add mod">
+          <ac:chgData name="Fatima Pillosu" userId="a6295d4dc9e22643" providerId="LiveId" clId="{61D033AF-DECF-4E4A-A0E6-FAFF0A02AD4A}" dt="2025-06-27T05:46:41.828" v="3401" actId="1036"/>
+          <ac:spMkLst>
+            <pc:docMk/>
+            <pc:sldMk cId="2412790101" sldId="256"/>
+            <ac:spMk id="18" creationId="{92B98603-355D-9B96-6D9F-C8009BB9722A}"/>
+          </ac:spMkLst>
+        </pc:spChg>
         <pc:spChg chg="add del mod">
           <ac:chgData name="Fatima Pillosu" userId="a6295d4dc9e22643" providerId="LiveId" clId="{61D033AF-DECF-4E4A-A0E6-FAFF0A02AD4A}" dt="2025-06-26T16:47:03.976" v="3169" actId="478"/>
           <ac:spMkLst>
@@ -354,6 +490,14 @@
             <ac:spMk id="18" creationId="{ED3F179D-B885-7D31-FEC9-958FC08D0EE6}"/>
           </ac:spMkLst>
         </pc:spChg>
+        <pc:spChg chg="add mod">
+          <ac:chgData name="Fatima Pillosu" userId="a6295d4dc9e22643" providerId="LiveId" clId="{61D033AF-DECF-4E4A-A0E6-FAFF0A02AD4A}" dt="2025-06-27T05:46:41.828" v="3401" actId="1036"/>
+          <ac:spMkLst>
+            <pc:docMk/>
+            <pc:sldMk cId="2412790101" sldId="256"/>
+            <ac:spMk id="19" creationId="{930869D1-E322-FC45-BA00-86C98ADC3B23}"/>
+          </ac:spMkLst>
+        </pc:spChg>
         <pc:spChg chg="add del mod">
           <ac:chgData name="Fatima Pillosu" userId="a6295d4dc9e22643" providerId="LiveId" clId="{61D033AF-DECF-4E4A-A0E6-FAFF0A02AD4A}" dt="2025-06-26T16:47:03.976" v="3169" actId="478"/>
           <ac:spMkLst>
@@ -362,6 +506,14 @@
             <ac:spMk id="20" creationId="{03BDF258-EAE2-5C51-887C-04325961DE3E}"/>
           </ac:spMkLst>
         </pc:spChg>
+        <pc:spChg chg="add mod">
+          <ac:chgData name="Fatima Pillosu" userId="a6295d4dc9e22643" providerId="LiveId" clId="{61D033AF-DECF-4E4A-A0E6-FAFF0A02AD4A}" dt="2025-06-27T05:46:41.828" v="3401" actId="1036"/>
+          <ac:spMkLst>
+            <pc:docMk/>
+            <pc:sldMk cId="2412790101" sldId="256"/>
+            <ac:spMk id="20" creationId="{BD8DD6A2-178B-DB31-2592-FE465B91B968}"/>
+          </ac:spMkLst>
+        </pc:spChg>
         <pc:spChg chg="add del mod">
           <ac:chgData name="Fatima Pillosu" userId="a6295d4dc9e22643" providerId="LiveId" clId="{61D033AF-DECF-4E4A-A0E6-FAFF0A02AD4A}" dt="2025-06-26T16:50:18.344" v="3216" actId="21"/>
           <ac:spMkLst>
@@ -370,6 +522,14 @@
             <ac:spMk id="21" creationId="{270F2959-BD8B-2196-95FB-8D47C2F8DFEE}"/>
           </ac:spMkLst>
         </pc:spChg>
+        <pc:spChg chg="add mod">
+          <ac:chgData name="Fatima Pillosu" userId="a6295d4dc9e22643" providerId="LiveId" clId="{61D033AF-DECF-4E4A-A0E6-FAFF0A02AD4A}" dt="2025-06-27T05:46:41.828" v="3401" actId="1036"/>
+          <ac:spMkLst>
+            <pc:docMk/>
+            <pc:sldMk cId="2412790101" sldId="256"/>
+            <ac:spMk id="21" creationId="{4F2F5DC6-56FD-AA6B-238F-F1D3E9FEA95A}"/>
+          </ac:spMkLst>
+        </pc:spChg>
         <pc:spChg chg="add del mod">
           <ac:chgData name="Fatima Pillosu" userId="a6295d4dc9e22643" providerId="LiveId" clId="{61D033AF-DECF-4E4A-A0E6-FAFF0A02AD4A}" dt="2025-06-26T14:52:47.772" v="948" actId="478"/>
           <ac:spMkLst>
@@ -378,6 +538,14 @@
             <ac:spMk id="22" creationId="{79BD22D6-2E91-EE6B-6DC1-8F89293EC427}"/>
           </ac:spMkLst>
         </pc:spChg>
+        <pc:spChg chg="add mod">
+          <ac:chgData name="Fatima Pillosu" userId="a6295d4dc9e22643" providerId="LiveId" clId="{61D033AF-DECF-4E4A-A0E6-FAFF0A02AD4A}" dt="2025-06-27T05:46:41.828" v="3401" actId="1036"/>
+          <ac:spMkLst>
+            <pc:docMk/>
+            <pc:sldMk cId="2412790101" sldId="256"/>
+            <ac:spMk id="22" creationId="{BF12B402-8ABA-F1A7-0C14-F3F1483ABF5A}"/>
+          </ac:spMkLst>
+        </pc:spChg>
         <pc:spChg chg="add del mod">
           <ac:chgData name="Fatima Pillosu" userId="a6295d4dc9e22643" providerId="LiveId" clId="{61D033AF-DECF-4E4A-A0E6-FAFF0A02AD4A}" dt="2025-06-26T14:48:02.317" v="802" actId="478"/>
           <ac:spMkLst>
@@ -386,12 +554,28 @@
             <ac:spMk id="23" creationId="{6DE70467-F13E-0EF5-BDD7-2E306D012960}"/>
           </ac:spMkLst>
         </pc:spChg>
+        <pc:spChg chg="add mod">
+          <ac:chgData name="Fatima Pillosu" userId="a6295d4dc9e22643" providerId="LiveId" clId="{61D033AF-DECF-4E4A-A0E6-FAFF0A02AD4A}" dt="2025-06-27T05:46:41.828" v="3401" actId="1036"/>
+          <ac:spMkLst>
+            <pc:docMk/>
+            <pc:sldMk cId="2412790101" sldId="256"/>
+            <ac:spMk id="23" creationId="{E33BAA42-6AE6-B9C5-7D87-CC1819156847}"/>
+          </ac:spMkLst>
+        </pc:spChg>
         <pc:spChg chg="add del mod">
           <ac:chgData name="Fatima Pillosu" userId="a6295d4dc9e22643" providerId="LiveId" clId="{61D033AF-DECF-4E4A-A0E6-FAFF0A02AD4A}" dt="2025-06-26T16:50:18.344" v="3216" actId="21"/>
           <ac:spMkLst>
             <pc:docMk/>
             <pc:sldMk cId="2412790101" sldId="256"/>
             <ac:spMk id="24" creationId="{062ED1AE-086B-DAEA-D664-FB6D28F48278}"/>
+          </ac:spMkLst>
+        </pc:spChg>
+        <pc:spChg chg="add mod">
+          <ac:chgData name="Fatima Pillosu" userId="a6295d4dc9e22643" providerId="LiveId" clId="{61D033AF-DECF-4E4A-A0E6-FAFF0A02AD4A}" dt="2025-06-27T05:46:41.828" v="3401" actId="1036"/>
+          <ac:spMkLst>
+            <pc:docMk/>
+            <pc:sldMk cId="2412790101" sldId="256"/>
+            <ac:spMk id="24" creationId="{49445F97-EAF9-8864-EB39-A2AABCEDD7FB}"/>
           </ac:spMkLst>
         </pc:spChg>
         <pc:spChg chg="add del mod">
@@ -738,176 +922,176 @@
             <ac:spMk id="76" creationId="{49445F97-EAF9-8864-EB39-A2AABCEDD7FB}"/>
           </ac:spMkLst>
         </pc:spChg>
-        <pc:spChg chg="add mod">
-          <ac:chgData name="Fatima Pillosu" userId="a6295d4dc9e22643" providerId="LiveId" clId="{61D033AF-DECF-4E4A-A0E6-FAFF0A02AD4A}" dt="2025-06-27T04:19:31.373" v="3276" actId="207"/>
+        <pc:spChg chg="add del mod">
+          <ac:chgData name="Fatima Pillosu" userId="a6295d4dc9e22643" providerId="LiveId" clId="{61D033AF-DECF-4E4A-A0E6-FAFF0A02AD4A}" dt="2025-06-27T05:46:21.892" v="3398" actId="21"/>
           <ac:spMkLst>
             <pc:docMk/>
             <pc:sldMk cId="2412790101" sldId="256"/>
             <ac:spMk id="81" creationId="{F0379129-0B4C-9E6E-3C06-018694AD7810}"/>
           </ac:spMkLst>
         </pc:spChg>
-        <pc:spChg chg="add mod">
-          <ac:chgData name="Fatima Pillosu" userId="a6295d4dc9e22643" providerId="LiveId" clId="{61D033AF-DECF-4E4A-A0E6-FAFF0A02AD4A}" dt="2025-06-27T04:19:31.373" v="3276" actId="207"/>
+        <pc:spChg chg="add del mod">
+          <ac:chgData name="Fatima Pillosu" userId="a6295d4dc9e22643" providerId="LiveId" clId="{61D033AF-DECF-4E4A-A0E6-FAFF0A02AD4A}" dt="2025-06-27T05:46:21.892" v="3398" actId="21"/>
           <ac:spMkLst>
             <pc:docMk/>
             <pc:sldMk cId="2412790101" sldId="256"/>
             <ac:spMk id="82" creationId="{270F2959-BD8B-2196-95FB-8D47C2F8DFEE}"/>
           </ac:spMkLst>
         </pc:spChg>
-        <pc:spChg chg="add mod">
-          <ac:chgData name="Fatima Pillosu" userId="a6295d4dc9e22643" providerId="LiveId" clId="{61D033AF-DECF-4E4A-A0E6-FAFF0A02AD4A}" dt="2025-06-27T04:19:31.373" v="3276" actId="207"/>
+        <pc:spChg chg="add del mod">
+          <ac:chgData name="Fatima Pillosu" userId="a6295d4dc9e22643" providerId="LiveId" clId="{61D033AF-DECF-4E4A-A0E6-FAFF0A02AD4A}" dt="2025-06-27T05:46:21.892" v="3398" actId="21"/>
           <ac:spMkLst>
             <pc:docMk/>
             <pc:sldMk cId="2412790101" sldId="256"/>
             <ac:spMk id="83" creationId="{062ED1AE-086B-DAEA-D664-FB6D28F48278}"/>
           </ac:spMkLst>
         </pc:spChg>
-        <pc:spChg chg="add mod">
-          <ac:chgData name="Fatima Pillosu" userId="a6295d4dc9e22643" providerId="LiveId" clId="{61D033AF-DECF-4E4A-A0E6-FAFF0A02AD4A}" dt="2025-06-27T04:19:31.373" v="3276" actId="207"/>
+        <pc:spChg chg="add del mod">
+          <ac:chgData name="Fatima Pillosu" userId="a6295d4dc9e22643" providerId="LiveId" clId="{61D033AF-DECF-4E4A-A0E6-FAFF0A02AD4A}" dt="2025-06-27T05:46:21.892" v="3398" actId="21"/>
           <ac:spMkLst>
             <pc:docMk/>
             <pc:sldMk cId="2412790101" sldId="256"/>
             <ac:spMk id="84" creationId="{FB5C892E-DCD3-8B9E-2922-1E95ED9097F3}"/>
           </ac:spMkLst>
         </pc:spChg>
-        <pc:spChg chg="add mod">
-          <ac:chgData name="Fatima Pillosu" userId="a6295d4dc9e22643" providerId="LiveId" clId="{61D033AF-DECF-4E4A-A0E6-FAFF0A02AD4A}" dt="2025-06-27T04:18:30.669" v="3275" actId="14100"/>
+        <pc:spChg chg="add del mod">
+          <ac:chgData name="Fatima Pillosu" userId="a6295d4dc9e22643" providerId="LiveId" clId="{61D033AF-DECF-4E4A-A0E6-FAFF0A02AD4A}" dt="2025-06-27T05:46:21.892" v="3398" actId="21"/>
           <ac:spMkLst>
             <pc:docMk/>
             <pc:sldMk cId="2412790101" sldId="256"/>
             <ac:spMk id="85" creationId="{9B01EB53-902C-3FEF-12AF-92C7EBD29C1D}"/>
           </ac:spMkLst>
         </pc:spChg>
-        <pc:spChg chg="add mod">
-          <ac:chgData name="Fatima Pillosu" userId="a6295d4dc9e22643" providerId="LiveId" clId="{61D033AF-DECF-4E4A-A0E6-FAFF0A02AD4A}" dt="2025-06-27T04:18:04.629" v="3274" actId="1035"/>
+        <pc:spChg chg="add del mod">
+          <ac:chgData name="Fatima Pillosu" userId="a6295d4dc9e22643" providerId="LiveId" clId="{61D033AF-DECF-4E4A-A0E6-FAFF0A02AD4A}" dt="2025-06-27T05:46:21.892" v="3398" actId="21"/>
           <ac:spMkLst>
             <pc:docMk/>
             <pc:sldMk cId="2412790101" sldId="256"/>
             <ac:spMk id="86" creationId="{91E8465F-C483-4093-3158-F91048E66783}"/>
           </ac:spMkLst>
         </pc:spChg>
-        <pc:spChg chg="add mod">
-          <ac:chgData name="Fatima Pillosu" userId="a6295d4dc9e22643" providerId="LiveId" clId="{61D033AF-DECF-4E4A-A0E6-FAFF0A02AD4A}" dt="2025-06-27T04:18:04.629" v="3274" actId="1035"/>
+        <pc:spChg chg="add del mod">
+          <ac:chgData name="Fatima Pillosu" userId="a6295d4dc9e22643" providerId="LiveId" clId="{61D033AF-DECF-4E4A-A0E6-FAFF0A02AD4A}" dt="2025-06-27T05:46:21.892" v="3398" actId="21"/>
           <ac:spMkLst>
             <pc:docMk/>
             <pc:sldMk cId="2412790101" sldId="256"/>
             <ac:spMk id="87" creationId="{14B4D2FE-6A01-70EE-57E1-D9A209E24C0F}"/>
           </ac:spMkLst>
         </pc:spChg>
-        <pc:spChg chg="add mod">
-          <ac:chgData name="Fatima Pillosu" userId="a6295d4dc9e22643" providerId="LiveId" clId="{61D033AF-DECF-4E4A-A0E6-FAFF0A02AD4A}" dt="2025-06-27T04:18:04.629" v="3274" actId="1035"/>
+        <pc:spChg chg="add del mod">
+          <ac:chgData name="Fatima Pillosu" userId="a6295d4dc9e22643" providerId="LiveId" clId="{61D033AF-DECF-4E4A-A0E6-FAFF0A02AD4A}" dt="2025-06-27T05:46:21.892" v="3398" actId="21"/>
           <ac:spMkLst>
             <pc:docMk/>
             <pc:sldMk cId="2412790101" sldId="256"/>
             <ac:spMk id="88" creationId="{FACA5D21-1BAA-49AA-7590-BDC05D388114}"/>
           </ac:spMkLst>
         </pc:spChg>
-        <pc:spChg chg="add mod">
-          <ac:chgData name="Fatima Pillosu" userId="a6295d4dc9e22643" providerId="LiveId" clId="{61D033AF-DECF-4E4A-A0E6-FAFF0A02AD4A}" dt="2025-06-26T16:51:51.109" v="3232"/>
+        <pc:spChg chg="add del mod">
+          <ac:chgData name="Fatima Pillosu" userId="a6295d4dc9e22643" providerId="LiveId" clId="{61D033AF-DECF-4E4A-A0E6-FAFF0A02AD4A}" dt="2025-06-27T05:46:21.892" v="3398" actId="21"/>
           <ac:spMkLst>
             <pc:docMk/>
             <pc:sldMk cId="2412790101" sldId="256"/>
             <ac:spMk id="89" creationId="{5216C86E-60C9-619C-F246-35D203BB2F07}"/>
           </ac:spMkLst>
         </pc:spChg>
-        <pc:spChg chg="add mod">
-          <ac:chgData name="Fatima Pillosu" userId="a6295d4dc9e22643" providerId="LiveId" clId="{61D033AF-DECF-4E4A-A0E6-FAFF0A02AD4A}" dt="2025-06-27T04:19:31.373" v="3276" actId="207"/>
+        <pc:spChg chg="add del mod">
+          <ac:chgData name="Fatima Pillosu" userId="a6295d4dc9e22643" providerId="LiveId" clId="{61D033AF-DECF-4E4A-A0E6-FAFF0A02AD4A}" dt="2025-06-27T05:46:21.892" v="3398" actId="21"/>
           <ac:spMkLst>
             <pc:docMk/>
             <pc:sldMk cId="2412790101" sldId="256"/>
             <ac:spMk id="90" creationId="{A2A0F751-F9A6-3129-E72C-A6BE6A161570}"/>
           </ac:spMkLst>
         </pc:spChg>
-        <pc:spChg chg="add mod">
-          <ac:chgData name="Fatima Pillosu" userId="a6295d4dc9e22643" providerId="LiveId" clId="{61D033AF-DECF-4E4A-A0E6-FAFF0A02AD4A}" dt="2025-06-27T04:19:31.373" v="3276" actId="207"/>
+        <pc:spChg chg="add del mod">
+          <ac:chgData name="Fatima Pillosu" userId="a6295d4dc9e22643" providerId="LiveId" clId="{61D033AF-DECF-4E4A-A0E6-FAFF0A02AD4A}" dt="2025-06-27T05:46:21.892" v="3398" actId="21"/>
           <ac:spMkLst>
             <pc:docMk/>
             <pc:sldMk cId="2412790101" sldId="256"/>
             <ac:spMk id="91" creationId="{C181FF3B-6AD0-1BE1-4914-0A9CA1D7C4D3}"/>
           </ac:spMkLst>
         </pc:spChg>
-        <pc:spChg chg="add mod">
-          <ac:chgData name="Fatima Pillosu" userId="a6295d4dc9e22643" providerId="LiveId" clId="{61D033AF-DECF-4E4A-A0E6-FAFF0A02AD4A}" dt="2025-06-27T04:19:31.373" v="3276" actId="207"/>
+        <pc:spChg chg="add del mod">
+          <ac:chgData name="Fatima Pillosu" userId="a6295d4dc9e22643" providerId="LiveId" clId="{61D033AF-DECF-4E4A-A0E6-FAFF0A02AD4A}" dt="2025-06-27T05:46:21.892" v="3398" actId="21"/>
           <ac:spMkLst>
             <pc:docMk/>
             <pc:sldMk cId="2412790101" sldId="256"/>
             <ac:spMk id="92" creationId="{F64F700D-59E2-F229-195C-FCF79FDABACB}"/>
           </ac:spMkLst>
         </pc:spChg>
-        <pc:spChg chg="add mod">
-          <ac:chgData name="Fatima Pillosu" userId="a6295d4dc9e22643" providerId="LiveId" clId="{61D033AF-DECF-4E4A-A0E6-FAFF0A02AD4A}" dt="2025-06-27T04:19:31.373" v="3276" actId="207"/>
+        <pc:spChg chg="add del mod">
+          <ac:chgData name="Fatima Pillosu" userId="a6295d4dc9e22643" providerId="LiveId" clId="{61D033AF-DECF-4E4A-A0E6-FAFF0A02AD4A}" dt="2025-06-27T05:46:21.892" v="3398" actId="21"/>
           <ac:spMkLst>
             <pc:docMk/>
             <pc:sldMk cId="2412790101" sldId="256"/>
             <ac:spMk id="93" creationId="{675F66ED-1587-EE2D-7961-3C1CE26DA6A5}"/>
           </ac:spMkLst>
         </pc:spChg>
-        <pc:spChg chg="add mod">
-          <ac:chgData name="Fatima Pillosu" userId="a6295d4dc9e22643" providerId="LiveId" clId="{61D033AF-DECF-4E4A-A0E6-FAFF0A02AD4A}" dt="2025-06-27T04:19:31.373" v="3276" actId="207"/>
+        <pc:spChg chg="add del mod">
+          <ac:chgData name="Fatima Pillosu" userId="a6295d4dc9e22643" providerId="LiveId" clId="{61D033AF-DECF-4E4A-A0E6-FAFF0A02AD4A}" dt="2025-06-27T05:46:21.892" v="3398" actId="21"/>
           <ac:spMkLst>
             <pc:docMk/>
             <pc:sldMk cId="2412790101" sldId="256"/>
             <ac:spMk id="94" creationId="{EE073022-3D67-FA36-A6BB-1349696A25C2}"/>
           </ac:spMkLst>
         </pc:spChg>
-        <pc:spChg chg="add mod">
-          <ac:chgData name="Fatima Pillosu" userId="a6295d4dc9e22643" providerId="LiveId" clId="{61D033AF-DECF-4E4A-A0E6-FAFF0A02AD4A}" dt="2025-06-27T04:19:31.373" v="3276" actId="207"/>
+        <pc:spChg chg="add del mod">
+          <ac:chgData name="Fatima Pillosu" userId="a6295d4dc9e22643" providerId="LiveId" clId="{61D033AF-DECF-4E4A-A0E6-FAFF0A02AD4A}" dt="2025-06-27T05:46:21.892" v="3398" actId="21"/>
           <ac:spMkLst>
             <pc:docMk/>
             <pc:sldMk cId="2412790101" sldId="256"/>
             <ac:spMk id="95" creationId="{6FE58704-E40A-B268-7ACF-6EE103269248}"/>
           </ac:spMkLst>
         </pc:spChg>
-        <pc:spChg chg="add mod">
-          <ac:chgData name="Fatima Pillosu" userId="a6295d4dc9e22643" providerId="LiveId" clId="{61D033AF-DECF-4E4A-A0E6-FAFF0A02AD4A}" dt="2025-06-27T04:19:31.373" v="3276" actId="207"/>
+        <pc:spChg chg="add del mod">
+          <ac:chgData name="Fatima Pillosu" userId="a6295d4dc9e22643" providerId="LiveId" clId="{61D033AF-DECF-4E4A-A0E6-FAFF0A02AD4A}" dt="2025-06-27T05:46:21.892" v="3398" actId="21"/>
           <ac:spMkLst>
             <pc:docMk/>
             <pc:sldMk cId="2412790101" sldId="256"/>
             <ac:spMk id="96" creationId="{92B98603-355D-9B96-6D9F-C8009BB9722A}"/>
           </ac:spMkLst>
         </pc:spChg>
-        <pc:spChg chg="add mod">
-          <ac:chgData name="Fatima Pillosu" userId="a6295d4dc9e22643" providerId="LiveId" clId="{61D033AF-DECF-4E4A-A0E6-FAFF0A02AD4A}" dt="2025-06-27T04:19:31.373" v="3276" actId="207"/>
+        <pc:spChg chg="add del mod">
+          <ac:chgData name="Fatima Pillosu" userId="a6295d4dc9e22643" providerId="LiveId" clId="{61D033AF-DECF-4E4A-A0E6-FAFF0A02AD4A}" dt="2025-06-27T05:46:21.892" v="3398" actId="21"/>
           <ac:spMkLst>
             <pc:docMk/>
             <pc:sldMk cId="2412790101" sldId="256"/>
             <ac:spMk id="97" creationId="{930869D1-E322-FC45-BA00-86C98ADC3B23}"/>
           </ac:spMkLst>
         </pc:spChg>
-        <pc:spChg chg="add mod">
-          <ac:chgData name="Fatima Pillosu" userId="a6295d4dc9e22643" providerId="LiveId" clId="{61D033AF-DECF-4E4A-A0E6-FAFF0A02AD4A}" dt="2025-06-27T04:19:31.373" v="3276" actId="207"/>
+        <pc:spChg chg="add del mod">
+          <ac:chgData name="Fatima Pillosu" userId="a6295d4dc9e22643" providerId="LiveId" clId="{61D033AF-DECF-4E4A-A0E6-FAFF0A02AD4A}" dt="2025-06-27T05:46:21.892" v="3398" actId="21"/>
           <ac:spMkLst>
             <pc:docMk/>
             <pc:sldMk cId="2412790101" sldId="256"/>
             <ac:spMk id="98" creationId="{BD8DD6A2-178B-DB31-2592-FE465B91B968}"/>
           </ac:spMkLst>
         </pc:spChg>
-        <pc:spChg chg="add mod">
-          <ac:chgData name="Fatima Pillosu" userId="a6295d4dc9e22643" providerId="LiveId" clId="{61D033AF-DECF-4E4A-A0E6-FAFF0A02AD4A}" dt="2025-06-27T04:19:31.373" v="3276" actId="207"/>
+        <pc:spChg chg="add del mod">
+          <ac:chgData name="Fatima Pillosu" userId="a6295d4dc9e22643" providerId="LiveId" clId="{61D033AF-DECF-4E4A-A0E6-FAFF0A02AD4A}" dt="2025-06-27T05:46:21.892" v="3398" actId="21"/>
           <ac:spMkLst>
             <pc:docMk/>
             <pc:sldMk cId="2412790101" sldId="256"/>
             <ac:spMk id="99" creationId="{4F2F5DC6-56FD-AA6B-238F-F1D3E9FEA95A}"/>
           </ac:spMkLst>
         </pc:spChg>
-        <pc:spChg chg="add mod">
-          <ac:chgData name="Fatima Pillosu" userId="a6295d4dc9e22643" providerId="LiveId" clId="{61D033AF-DECF-4E4A-A0E6-FAFF0A02AD4A}" dt="2025-06-27T04:19:31.373" v="3276" actId="207"/>
+        <pc:spChg chg="add del mod">
+          <ac:chgData name="Fatima Pillosu" userId="a6295d4dc9e22643" providerId="LiveId" clId="{61D033AF-DECF-4E4A-A0E6-FAFF0A02AD4A}" dt="2025-06-27T05:46:21.892" v="3398" actId="21"/>
           <ac:spMkLst>
             <pc:docMk/>
             <pc:sldMk cId="2412790101" sldId="256"/>
             <ac:spMk id="100" creationId="{BF12B402-8ABA-F1A7-0C14-F3F1483ABF5A}"/>
           </ac:spMkLst>
         </pc:spChg>
-        <pc:spChg chg="add mod">
-          <ac:chgData name="Fatima Pillosu" userId="a6295d4dc9e22643" providerId="LiveId" clId="{61D033AF-DECF-4E4A-A0E6-FAFF0A02AD4A}" dt="2025-06-27T04:19:31.373" v="3276" actId="207"/>
+        <pc:spChg chg="add del mod">
+          <ac:chgData name="Fatima Pillosu" userId="a6295d4dc9e22643" providerId="LiveId" clId="{61D033AF-DECF-4E4A-A0E6-FAFF0A02AD4A}" dt="2025-06-27T05:46:21.892" v="3398" actId="21"/>
           <ac:spMkLst>
             <pc:docMk/>
             <pc:sldMk cId="2412790101" sldId="256"/>
             <ac:spMk id="101" creationId="{E33BAA42-6AE6-B9C5-7D87-CC1819156847}"/>
           </ac:spMkLst>
         </pc:spChg>
-        <pc:spChg chg="add mod">
-          <ac:chgData name="Fatima Pillosu" userId="a6295d4dc9e22643" providerId="LiveId" clId="{61D033AF-DECF-4E4A-A0E6-FAFF0A02AD4A}" dt="2025-06-27T04:19:31.373" v="3276" actId="207"/>
+        <pc:spChg chg="add del mod">
+          <ac:chgData name="Fatima Pillosu" userId="a6295d4dc9e22643" providerId="LiveId" clId="{61D033AF-DECF-4E4A-A0E6-FAFF0A02AD4A}" dt="2025-06-27T05:46:21.892" v="3398" actId="21"/>
           <ac:spMkLst>
             <pc:docMk/>
             <pc:sldMk cId="2412790101" sldId="256"/>
@@ -930,6 +1114,38 @@
             <ac:cxnSpMk id="19" creationId="{50849AC7-0405-6E4C-255B-2854D4AC2067}"/>
           </ac:cxnSpMkLst>
         </pc:cxnChg>
+        <pc:cxnChg chg="add mod">
+          <ac:chgData name="Fatima Pillosu" userId="a6295d4dc9e22643" providerId="LiveId" clId="{61D033AF-DECF-4E4A-A0E6-FAFF0A02AD4A}" dt="2025-06-27T05:46:41.828" v="3401" actId="1036"/>
+          <ac:cxnSpMkLst>
+            <pc:docMk/>
+            <pc:sldMk cId="2412790101" sldId="256"/>
+            <ac:cxnSpMk id="25" creationId="{F5B77EE0-1764-73C0-B82D-D5C6872D70F3}"/>
+          </ac:cxnSpMkLst>
+        </pc:cxnChg>
+        <pc:cxnChg chg="add mod">
+          <ac:chgData name="Fatima Pillosu" userId="a6295d4dc9e22643" providerId="LiveId" clId="{61D033AF-DECF-4E4A-A0E6-FAFF0A02AD4A}" dt="2025-06-27T05:46:41.828" v="3401" actId="1036"/>
+          <ac:cxnSpMkLst>
+            <pc:docMk/>
+            <pc:sldMk cId="2412790101" sldId="256"/>
+            <ac:cxnSpMk id="26" creationId="{B34D1450-8571-CA5B-49E2-E7FF08CBEEA7}"/>
+          </ac:cxnSpMkLst>
+        </pc:cxnChg>
+        <pc:cxnChg chg="add mod">
+          <ac:chgData name="Fatima Pillosu" userId="a6295d4dc9e22643" providerId="LiveId" clId="{61D033AF-DECF-4E4A-A0E6-FAFF0A02AD4A}" dt="2025-06-27T05:46:41.828" v="3401" actId="1036"/>
+          <ac:cxnSpMkLst>
+            <pc:docMk/>
+            <pc:sldMk cId="2412790101" sldId="256"/>
+            <ac:cxnSpMk id="27" creationId="{EBA96BED-1C2B-2165-A516-69C67FBDEA11}"/>
+          </ac:cxnSpMkLst>
+        </pc:cxnChg>
+        <pc:cxnChg chg="add mod">
+          <ac:chgData name="Fatima Pillosu" userId="a6295d4dc9e22643" providerId="LiveId" clId="{61D033AF-DECF-4E4A-A0E6-FAFF0A02AD4A}" dt="2025-06-27T05:46:41.828" v="3401" actId="1036"/>
+          <ac:cxnSpMkLst>
+            <pc:docMk/>
+            <pc:sldMk cId="2412790101" sldId="256"/>
+            <ac:cxnSpMk id="28" creationId="{D65539E4-71BB-6DCB-81BC-F16BB93F43F8}"/>
+          </ac:cxnSpMkLst>
+        </pc:cxnChg>
         <pc:cxnChg chg="add del mod">
           <ac:chgData name="Fatima Pillosu" userId="a6295d4dc9e22643" providerId="LiveId" clId="{61D033AF-DECF-4E4A-A0E6-FAFF0A02AD4A}" dt="2025-06-26T16:50:18.344" v="3216" actId="21"/>
           <ac:cxnSpMkLst>
@@ -994,32 +1210,32 @@
             <ac:cxnSpMk id="80" creationId="{D65539E4-71BB-6DCB-81BC-F16BB93F43F8}"/>
           </ac:cxnSpMkLst>
         </pc:cxnChg>
-        <pc:cxnChg chg="add mod">
-          <ac:chgData name="Fatima Pillosu" userId="a6295d4dc9e22643" providerId="LiveId" clId="{61D033AF-DECF-4E4A-A0E6-FAFF0A02AD4A}" dt="2025-06-26T16:51:51.109" v="3232"/>
+        <pc:cxnChg chg="add del mod">
+          <ac:chgData name="Fatima Pillosu" userId="a6295d4dc9e22643" providerId="LiveId" clId="{61D033AF-DECF-4E4A-A0E6-FAFF0A02AD4A}" dt="2025-06-27T05:46:21.892" v="3398" actId="21"/>
           <ac:cxnSpMkLst>
             <pc:docMk/>
             <pc:sldMk cId="2412790101" sldId="256"/>
             <ac:cxnSpMk id="103" creationId="{F5B77EE0-1764-73C0-B82D-D5C6872D70F3}"/>
           </ac:cxnSpMkLst>
         </pc:cxnChg>
-        <pc:cxnChg chg="add mod">
-          <ac:chgData name="Fatima Pillosu" userId="a6295d4dc9e22643" providerId="LiveId" clId="{61D033AF-DECF-4E4A-A0E6-FAFF0A02AD4A}" dt="2025-06-26T16:51:51.109" v="3232"/>
+        <pc:cxnChg chg="add del mod">
+          <ac:chgData name="Fatima Pillosu" userId="a6295d4dc9e22643" providerId="LiveId" clId="{61D033AF-DECF-4E4A-A0E6-FAFF0A02AD4A}" dt="2025-06-27T05:46:21.892" v="3398" actId="21"/>
           <ac:cxnSpMkLst>
             <pc:docMk/>
             <pc:sldMk cId="2412790101" sldId="256"/>
             <ac:cxnSpMk id="104" creationId="{B34D1450-8571-CA5B-49E2-E7FF08CBEEA7}"/>
           </ac:cxnSpMkLst>
         </pc:cxnChg>
-        <pc:cxnChg chg="add mod">
-          <ac:chgData name="Fatima Pillosu" userId="a6295d4dc9e22643" providerId="LiveId" clId="{61D033AF-DECF-4E4A-A0E6-FAFF0A02AD4A}" dt="2025-06-26T16:51:51.109" v="3232"/>
+        <pc:cxnChg chg="add del mod">
+          <ac:chgData name="Fatima Pillosu" userId="a6295d4dc9e22643" providerId="LiveId" clId="{61D033AF-DECF-4E4A-A0E6-FAFF0A02AD4A}" dt="2025-06-27T05:46:21.892" v="3398" actId="21"/>
           <ac:cxnSpMkLst>
             <pc:docMk/>
             <pc:sldMk cId="2412790101" sldId="256"/>
             <ac:cxnSpMk id="105" creationId="{EBA96BED-1C2B-2165-A516-69C67FBDEA11}"/>
           </ac:cxnSpMkLst>
         </pc:cxnChg>
-        <pc:cxnChg chg="add mod">
-          <ac:chgData name="Fatima Pillosu" userId="a6295d4dc9e22643" providerId="LiveId" clId="{61D033AF-DECF-4E4A-A0E6-FAFF0A02AD4A}" dt="2025-06-26T16:51:51.109" v="3232"/>
+        <pc:cxnChg chg="add del mod">
+          <ac:chgData name="Fatima Pillosu" userId="a6295d4dc9e22643" providerId="LiveId" clId="{61D033AF-DECF-4E4A-A0E6-FAFF0A02AD4A}" dt="2025-06-27T05:46:21.892" v="3398" actId="21"/>
           <ac:cxnSpMkLst>
             <pc:docMk/>
             <pc:sldMk cId="2412790101" sldId="256"/>
@@ -1132,8 +1348,8 @@
         </p:nvSpPr>
         <p:spPr>
           <a:xfrm>
-            <a:off x="2305050" y="1143000"/>
-            <a:ext cx="2247900" cy="3086100"/>
+            <a:off x="2360613" y="1143000"/>
+            <a:ext cx="2136775" cy="3086100"/>
           </a:xfrm>
           <a:prstGeom prst="rect">
             <a:avLst/>
@@ -1411,8 +1627,8 @@
         </p:nvSpPr>
         <p:spPr>
           <a:xfrm>
-            <a:off x="2305050" y="1143000"/>
-            <a:ext cx="2247900" cy="3086100"/>
+            <a:off x="2360613" y="1143000"/>
+            <a:ext cx="2136775" cy="3086100"/>
           </a:xfrm>
         </p:spPr>
       </p:sp>
@@ -1500,8 +1716,8 @@
         </p:nvSpPr>
         <p:spPr>
           <a:xfrm>
-            <a:off x="310515" y="930886"/>
-            <a:ext cx="3519170" cy="1980271"/>
+            <a:off x="310515" y="977911"/>
+            <a:ext cx="3519170" cy="2080307"/>
           </a:xfrm>
         </p:spPr>
         <p:txBody>
@@ -1532,8 +1748,8 @@
         </p:nvSpPr>
         <p:spPr>
           <a:xfrm>
-            <a:off x="517525" y="2987524"/>
-            <a:ext cx="3105150" cy="1373286"/>
+            <a:off x="517525" y="3138443"/>
+            <a:ext cx="3105150" cy="1442659"/>
           </a:xfrm>
         </p:spPr>
         <p:txBody>
@@ -1653,7 +1869,7 @@
     </p:spTree>
     <p:extLst>
       <p:ext uri="{BB962C8B-B14F-4D97-AF65-F5344CB8AC3E}">
-        <p14:creationId xmlns:p14="http://schemas.microsoft.com/office/powerpoint/2010/main" val="2973469604"/>
+        <p14:creationId xmlns:p14="http://schemas.microsoft.com/office/powerpoint/2010/main" val="3427419639"/>
       </p:ext>
     </p:extLst>
   </p:cSld>
@@ -1823,7 +2039,7 @@
     </p:spTree>
     <p:extLst>
       <p:ext uri="{BB962C8B-B14F-4D97-AF65-F5344CB8AC3E}">
-        <p14:creationId xmlns:p14="http://schemas.microsoft.com/office/powerpoint/2010/main" val="3459348341"/>
+        <p14:creationId xmlns:p14="http://schemas.microsoft.com/office/powerpoint/2010/main" val="4008702703"/>
       </p:ext>
     </p:extLst>
   </p:cSld>
@@ -1862,8 +2078,8 @@
         </p:nvSpPr>
         <p:spPr>
           <a:xfrm>
-            <a:off x="2962831" y="302834"/>
-            <a:ext cx="892731" cy="4820328"/>
+            <a:off x="2962831" y="318132"/>
+            <a:ext cx="892731" cy="5063833"/>
           </a:xfrm>
         </p:spPr>
         <p:txBody>
@@ -1890,8 +2106,8 @@
         </p:nvSpPr>
         <p:spPr>
           <a:xfrm>
-            <a:off x="284639" y="302834"/>
-            <a:ext cx="2626439" cy="4820328"/>
+            <a:off x="284639" y="318132"/>
+            <a:ext cx="2626439" cy="5063833"/>
           </a:xfrm>
         </p:spPr>
         <p:txBody>
@@ -2003,7 +2219,7 @@
     </p:spTree>
     <p:extLst>
       <p:ext uri="{BB962C8B-B14F-4D97-AF65-F5344CB8AC3E}">
-        <p14:creationId xmlns:p14="http://schemas.microsoft.com/office/powerpoint/2010/main" val="4038794493"/>
+        <p14:creationId xmlns:p14="http://schemas.microsoft.com/office/powerpoint/2010/main" val="1935129454"/>
       </p:ext>
     </p:extLst>
   </p:cSld>
@@ -2173,7 +2389,7 @@
     </p:spTree>
     <p:extLst>
       <p:ext uri="{BB962C8B-B14F-4D97-AF65-F5344CB8AC3E}">
-        <p14:creationId xmlns:p14="http://schemas.microsoft.com/office/powerpoint/2010/main" val="1608402783"/>
+        <p14:creationId xmlns:p14="http://schemas.microsoft.com/office/powerpoint/2010/main" val="599031406"/>
       </p:ext>
     </p:extLst>
   </p:cSld>
@@ -2212,8 +2428,8 @@
         </p:nvSpPr>
         <p:spPr>
           <a:xfrm>
-            <a:off x="282482" y="1418055"/>
-            <a:ext cx="3570923" cy="2366055"/>
+            <a:off x="282482" y="1489690"/>
+            <a:ext cx="3570923" cy="2485579"/>
           </a:xfrm>
         </p:spPr>
         <p:txBody>
@@ -2244,8 +2460,8 @@
         </p:nvSpPr>
         <p:spPr>
           <a:xfrm>
-            <a:off x="282482" y="3806494"/>
-            <a:ext cx="3570923" cy="1244252"/>
+            <a:off x="282482" y="3998784"/>
+            <a:ext cx="3570923" cy="1307107"/>
           </a:xfrm>
         </p:spPr>
         <p:txBody>
@@ -2419,7 +2635,7 @@
     </p:spTree>
     <p:extLst>
       <p:ext uri="{BB962C8B-B14F-4D97-AF65-F5344CB8AC3E}">
-        <p14:creationId xmlns:p14="http://schemas.microsoft.com/office/powerpoint/2010/main" val="2406711741"/>
+        <p14:creationId xmlns:p14="http://schemas.microsoft.com/office/powerpoint/2010/main" val="2446184478"/>
       </p:ext>
     </p:extLst>
   </p:cSld>
@@ -2481,8 +2697,8 @@
         </p:nvSpPr>
         <p:spPr>
           <a:xfrm>
-            <a:off x="284639" y="1514170"/>
-            <a:ext cx="1759585" cy="3608992"/>
+            <a:off x="284639" y="1590660"/>
+            <a:ext cx="1759585" cy="3791305"/>
           </a:xfrm>
         </p:spPr>
         <p:txBody>
@@ -2538,8 +2754,8 @@
         </p:nvSpPr>
         <p:spPr>
           <a:xfrm>
-            <a:off x="2095976" y="1514170"/>
-            <a:ext cx="1759585" cy="3608992"/>
+            <a:off x="2095976" y="1590660"/>
+            <a:ext cx="1759585" cy="3791305"/>
           </a:xfrm>
         </p:spPr>
         <p:txBody>
@@ -2651,7 +2867,7 @@
     </p:spTree>
     <p:extLst>
       <p:ext uri="{BB962C8B-B14F-4D97-AF65-F5344CB8AC3E}">
-        <p14:creationId xmlns:p14="http://schemas.microsoft.com/office/powerpoint/2010/main" val="1402318406"/>
+        <p14:creationId xmlns:p14="http://schemas.microsoft.com/office/powerpoint/2010/main" val="1266478800"/>
       </p:ext>
     </p:extLst>
   </p:cSld>
@@ -2690,8 +2906,8 @@
         </p:nvSpPr>
         <p:spPr>
           <a:xfrm>
-            <a:off x="285178" y="302835"/>
-            <a:ext cx="3570923" cy="1099420"/>
+            <a:off x="285178" y="318133"/>
+            <a:ext cx="3570923" cy="1154958"/>
           </a:xfrm>
         </p:spPr>
         <p:txBody>
@@ -2718,8 +2934,8 @@
         </p:nvSpPr>
         <p:spPr>
           <a:xfrm>
-            <a:off x="285179" y="1394354"/>
-            <a:ext cx="1751498" cy="683351"/>
+            <a:off x="285179" y="1464791"/>
+            <a:ext cx="1751498" cy="717871"/>
           </a:xfrm>
         </p:spPr>
         <p:txBody>
@@ -2783,8 +2999,8 @@
         </p:nvSpPr>
         <p:spPr>
           <a:xfrm>
-            <a:off x="285179" y="2077705"/>
-            <a:ext cx="1751498" cy="3055991"/>
+            <a:off x="285179" y="2182663"/>
+            <a:ext cx="1751498" cy="3210368"/>
           </a:xfrm>
         </p:spPr>
         <p:txBody>
@@ -2840,8 +3056,8 @@
         </p:nvSpPr>
         <p:spPr>
           <a:xfrm>
-            <a:off x="2095977" y="1394354"/>
-            <a:ext cx="1760124" cy="683351"/>
+            <a:off x="2095977" y="1464791"/>
+            <a:ext cx="1760124" cy="717871"/>
           </a:xfrm>
         </p:spPr>
         <p:txBody>
@@ -2905,8 +3121,8 @@
         </p:nvSpPr>
         <p:spPr>
           <a:xfrm>
-            <a:off x="2095977" y="2077705"/>
-            <a:ext cx="1760124" cy="3055991"/>
+            <a:off x="2095977" y="2182663"/>
+            <a:ext cx="1760124" cy="3210368"/>
           </a:xfrm>
         </p:spPr>
         <p:txBody>
@@ -3018,7 +3234,7 @@
     </p:spTree>
     <p:extLst>
       <p:ext uri="{BB962C8B-B14F-4D97-AF65-F5344CB8AC3E}">
-        <p14:creationId xmlns:p14="http://schemas.microsoft.com/office/powerpoint/2010/main" val="3518499443"/>
+        <p14:creationId xmlns:p14="http://schemas.microsoft.com/office/powerpoint/2010/main" val="848431461"/>
       </p:ext>
     </p:extLst>
   </p:cSld>
@@ -3136,7 +3352,7 @@
     </p:spTree>
     <p:extLst>
       <p:ext uri="{BB962C8B-B14F-4D97-AF65-F5344CB8AC3E}">
-        <p14:creationId xmlns:p14="http://schemas.microsoft.com/office/powerpoint/2010/main" val="2304804051"/>
+        <p14:creationId xmlns:p14="http://schemas.microsoft.com/office/powerpoint/2010/main" val="3103456263"/>
       </p:ext>
     </p:extLst>
   </p:cSld>
@@ -3231,7 +3447,7 @@
     </p:spTree>
     <p:extLst>
       <p:ext uri="{BB962C8B-B14F-4D97-AF65-F5344CB8AC3E}">
-        <p14:creationId xmlns:p14="http://schemas.microsoft.com/office/powerpoint/2010/main" val="3083019056"/>
+        <p14:creationId xmlns:p14="http://schemas.microsoft.com/office/powerpoint/2010/main" val="3149528862"/>
       </p:ext>
     </p:extLst>
   </p:cSld>
@@ -3270,8 +3486,8 @@
         </p:nvSpPr>
         <p:spPr>
           <a:xfrm>
-            <a:off x="285178" y="379201"/>
-            <a:ext cx="1335322" cy="1327203"/>
+            <a:off x="285178" y="398357"/>
+            <a:ext cx="1335322" cy="1394248"/>
           </a:xfrm>
         </p:spPr>
         <p:txBody>
@@ -3302,8 +3518,8 @@
         </p:nvSpPr>
         <p:spPr>
           <a:xfrm>
-            <a:off x="1760124" y="818970"/>
-            <a:ext cx="2095976" cy="4042176"/>
+            <a:off x="1760124" y="860341"/>
+            <a:ext cx="2095976" cy="4246371"/>
           </a:xfrm>
         </p:spPr>
         <p:txBody>
@@ -3387,8 +3603,8 @@
         </p:nvSpPr>
         <p:spPr>
           <a:xfrm>
-            <a:off x="285178" y="1706404"/>
-            <a:ext cx="1335322" cy="3161324"/>
+            <a:off x="285178" y="1792605"/>
+            <a:ext cx="1335322" cy="3321023"/>
           </a:xfrm>
         </p:spPr>
         <p:txBody>
@@ -3508,7 +3724,7 @@
     </p:spTree>
     <p:extLst>
       <p:ext uri="{BB962C8B-B14F-4D97-AF65-F5344CB8AC3E}">
-        <p14:creationId xmlns:p14="http://schemas.microsoft.com/office/powerpoint/2010/main" val="1697634849"/>
+        <p14:creationId xmlns:p14="http://schemas.microsoft.com/office/powerpoint/2010/main" val="3205400973"/>
       </p:ext>
     </p:extLst>
   </p:cSld>
@@ -3547,8 +3763,8 @@
         </p:nvSpPr>
         <p:spPr>
           <a:xfrm>
-            <a:off x="285178" y="379201"/>
-            <a:ext cx="1335322" cy="1327203"/>
+            <a:off x="285178" y="398357"/>
+            <a:ext cx="1335322" cy="1394248"/>
           </a:xfrm>
         </p:spPr>
         <p:txBody>
@@ -3579,8 +3795,8 @@
         </p:nvSpPr>
         <p:spPr>
           <a:xfrm>
-            <a:off x="1760124" y="818970"/>
-            <a:ext cx="2095976" cy="4042176"/>
+            <a:off x="1760124" y="860341"/>
+            <a:ext cx="2095976" cy="4246371"/>
           </a:xfrm>
         </p:spPr>
         <p:txBody>
@@ -3644,8 +3860,8 @@
         </p:nvSpPr>
         <p:spPr>
           <a:xfrm>
-            <a:off x="285178" y="1706404"/>
-            <a:ext cx="1335322" cy="3161324"/>
+            <a:off x="285178" y="1792605"/>
+            <a:ext cx="1335322" cy="3321023"/>
           </a:xfrm>
         </p:spPr>
         <p:txBody>
@@ -3765,7 +3981,7 @@
     </p:spTree>
     <p:extLst>
       <p:ext uri="{BB962C8B-B14F-4D97-AF65-F5344CB8AC3E}">
-        <p14:creationId xmlns:p14="http://schemas.microsoft.com/office/powerpoint/2010/main" val="179883160"/>
+        <p14:creationId xmlns:p14="http://schemas.microsoft.com/office/powerpoint/2010/main" val="153824804"/>
       </p:ext>
     </p:extLst>
   </p:cSld>
@@ -3809,8 +4025,8 @@
         </p:nvSpPr>
         <p:spPr>
           <a:xfrm>
-            <a:off x="284639" y="302835"/>
-            <a:ext cx="3570923" cy="1099420"/>
+            <a:off x="284639" y="318133"/>
+            <a:ext cx="3570923" cy="1154958"/>
           </a:xfrm>
           <a:prstGeom prst="rect">
             <a:avLst/>
@@ -3842,8 +4058,8 @@
         </p:nvSpPr>
         <p:spPr>
           <a:xfrm>
-            <a:off x="284639" y="1514170"/>
-            <a:ext cx="3570923" cy="3608992"/>
+            <a:off x="284639" y="1590660"/>
+            <a:ext cx="3570923" cy="3791305"/>
           </a:xfrm>
           <a:prstGeom prst="rect">
             <a:avLst/>
@@ -3904,8 +4120,8 @@
         </p:nvSpPr>
         <p:spPr>
           <a:xfrm>
-            <a:off x="284639" y="5271947"/>
-            <a:ext cx="931545" cy="302834"/>
+            <a:off x="284639" y="5538266"/>
+            <a:ext cx="931545" cy="318132"/>
           </a:xfrm>
           <a:prstGeom prst="rect">
             <a:avLst/>
@@ -3945,8 +4161,8 @@
         </p:nvSpPr>
         <p:spPr>
           <a:xfrm>
-            <a:off x="1371441" y="5271947"/>
-            <a:ext cx="1397318" cy="302834"/>
+            <a:off x="1371441" y="5538266"/>
+            <a:ext cx="1397318" cy="318132"/>
           </a:xfrm>
           <a:prstGeom prst="rect">
             <a:avLst/>
@@ -3982,8 +4198,8 @@
         </p:nvSpPr>
         <p:spPr>
           <a:xfrm>
-            <a:off x="2924016" y="5271947"/>
-            <a:ext cx="931545" cy="302834"/>
+            <a:off x="2924016" y="5538266"/>
+            <a:ext cx="931545" cy="318132"/>
           </a:xfrm>
           <a:prstGeom prst="rect">
             <a:avLst/>
@@ -4014,23 +4230,23 @@
     </p:spTree>
     <p:extLst>
       <p:ext uri="{BB962C8B-B14F-4D97-AF65-F5344CB8AC3E}">
-        <p14:creationId xmlns:p14="http://schemas.microsoft.com/office/powerpoint/2010/main" val="2145016497"/>
+        <p14:creationId xmlns:p14="http://schemas.microsoft.com/office/powerpoint/2010/main" val="2426559392"/>
       </p:ext>
     </p:extLst>
   </p:cSld>
   <p:clrMap bg1="lt1" tx1="dk1" bg2="lt2" tx2="dk2" accent1="accent1" accent2="accent2" accent3="accent3" accent4="accent4" accent5="accent5" accent6="accent6" hlink="hlink" folHlink="folHlink"/>
   <p:sldLayoutIdLst>
-    <p:sldLayoutId id="2147483721" r:id="rId1"/>
-    <p:sldLayoutId id="2147483722" r:id="rId2"/>
-    <p:sldLayoutId id="2147483723" r:id="rId3"/>
-    <p:sldLayoutId id="2147483724" r:id="rId4"/>
-    <p:sldLayoutId id="2147483725" r:id="rId5"/>
-    <p:sldLayoutId id="2147483726" r:id="rId6"/>
-    <p:sldLayoutId id="2147483727" r:id="rId7"/>
-    <p:sldLayoutId id="2147483728" r:id="rId8"/>
-    <p:sldLayoutId id="2147483729" r:id="rId9"/>
-    <p:sldLayoutId id="2147483730" r:id="rId10"/>
-    <p:sldLayoutId id="2147483731" r:id="rId11"/>
+    <p:sldLayoutId id="2147483733" r:id="rId1"/>
+    <p:sldLayoutId id="2147483734" r:id="rId2"/>
+    <p:sldLayoutId id="2147483735" r:id="rId3"/>
+    <p:sldLayoutId id="2147483736" r:id="rId4"/>
+    <p:sldLayoutId id="2147483737" r:id="rId5"/>
+    <p:sldLayoutId id="2147483738" r:id="rId6"/>
+    <p:sldLayoutId id="2147483739" r:id="rId7"/>
+    <p:sldLayoutId id="2147483740" r:id="rId8"/>
+    <p:sldLayoutId id="2147483741" r:id="rId9"/>
+    <p:sldLayoutId id="2147483742" r:id="rId10"/>
+    <p:sldLayoutId id="2147483743" r:id="rId11"/>
   </p:sldLayoutIdLst>
   <p:txStyles>
     <p:titleStyle>
@@ -4334,7 +4550,7 @@
       </p:grpSpPr>
       <p:sp>
         <p:nvSpPr>
-          <p:cNvPr id="81" name="TextBox 80">
+          <p:cNvPr id="3" name="TextBox 2">
             <a:extLst>
               <a:ext uri="{FF2B5EF4-FFF2-40B4-BE49-F238E27FC236}">
                 <a16:creationId xmlns:a16="http://schemas.microsoft.com/office/drawing/2014/main" id="{F0379129-0B4C-9E6E-3C06-018694AD7810}"/>
@@ -4346,7 +4562,7 @@
         </p:nvSpPr>
         <p:spPr>
           <a:xfrm>
-            <a:off x="334131" y="834071"/>
+            <a:off x="334131" y="852359"/>
             <a:ext cx="1075362" cy="338554"/>
           </a:xfrm>
           <a:prstGeom prst="rect">
@@ -4383,7 +4599,7 @@
       </p:sp>
       <p:sp>
         <p:nvSpPr>
-          <p:cNvPr id="82" name="TextBox 81">
+          <p:cNvPr id="4" name="TextBox 3">
             <a:extLst>
               <a:ext uri="{FF2B5EF4-FFF2-40B4-BE49-F238E27FC236}">
                 <a16:creationId xmlns:a16="http://schemas.microsoft.com/office/drawing/2014/main" id="{270F2959-BD8B-2196-95FB-8D47C2F8DFEE}"/>
@@ -4395,7 +4611,7 @@
         </p:nvSpPr>
         <p:spPr>
           <a:xfrm>
-            <a:off x="1294576" y="5078899"/>
+            <a:off x="1294576" y="5376587"/>
             <a:ext cx="2883344" cy="461665"/>
           </a:xfrm>
           <a:prstGeom prst="rect">
@@ -4425,7 +4641,7 @@
       </p:sp>
       <p:sp>
         <p:nvSpPr>
-          <p:cNvPr id="83" name="TextBox 82">
+          <p:cNvPr id="5" name="TextBox 4">
             <a:extLst>
               <a:ext uri="{FF2B5EF4-FFF2-40B4-BE49-F238E27FC236}">
                 <a16:creationId xmlns:a16="http://schemas.microsoft.com/office/drawing/2014/main" id="{062ED1AE-086B-DAEA-D664-FB6D28F48278}"/>
@@ -4437,7 +4653,7 @@
         </p:nvSpPr>
         <p:spPr>
           <a:xfrm>
-            <a:off x="-81390" y="-78511"/>
+            <a:off x="-81390" y="-60223"/>
             <a:ext cx="4319282" cy="430887"/>
           </a:xfrm>
           <a:prstGeom prst="rect">
@@ -4485,7 +4701,7 @@
       </p:sp>
       <p:sp>
         <p:nvSpPr>
-          <p:cNvPr id="84" name="TextBox 83">
+          <p:cNvPr id="6" name="TextBox 5">
             <a:extLst>
               <a:ext uri="{FF2B5EF4-FFF2-40B4-BE49-F238E27FC236}">
                 <a16:creationId xmlns:a16="http://schemas.microsoft.com/office/drawing/2014/main" id="{FB5C892E-DCD3-8B9E-2922-1E95ED9097F3}"/>
@@ -4497,7 +4713,7 @@
         </p:nvSpPr>
         <p:spPr>
           <a:xfrm>
-            <a:off x="-104016" y="830208"/>
+            <a:off x="-104016" y="1127896"/>
             <a:ext cx="307777" cy="2495603"/>
           </a:xfrm>
           <a:prstGeom prst="rect">
@@ -4527,7 +4743,7 @@
       </p:sp>
       <p:sp>
         <p:nvSpPr>
-          <p:cNvPr id="85" name="Rectangle 84">
+          <p:cNvPr id="7" name="Rectangle 6">
             <a:extLst>
               <a:ext uri="{FF2B5EF4-FFF2-40B4-BE49-F238E27FC236}">
                 <a16:creationId xmlns:a16="http://schemas.microsoft.com/office/drawing/2014/main" id="{9B01EB53-902C-3FEF-12AF-92C7EBD29C1D}"/>
@@ -4539,7 +4755,7 @@
         </p:nvSpPr>
         <p:spPr>
           <a:xfrm>
-            <a:off x="404488" y="429307"/>
+            <a:off x="404488" y="447595"/>
             <a:ext cx="936000" cy="384365"/>
           </a:xfrm>
           <a:prstGeom prst="rect">
@@ -4602,7 +4818,7 @@
       </p:sp>
       <p:sp>
         <p:nvSpPr>
-          <p:cNvPr id="86" name="Rectangle 85">
+          <p:cNvPr id="8" name="Rectangle 7">
             <a:extLst>
               <a:ext uri="{FF2B5EF4-FFF2-40B4-BE49-F238E27FC236}">
                 <a16:creationId xmlns:a16="http://schemas.microsoft.com/office/drawing/2014/main" id="{91E8465F-C483-4093-3158-F91048E66783}"/>
@@ -4614,7 +4830,7 @@
         </p:nvSpPr>
         <p:spPr>
           <a:xfrm>
-            <a:off x="1371233" y="635578"/>
+            <a:off x="1371233" y="653866"/>
             <a:ext cx="900000" cy="180000"/>
           </a:xfrm>
           <a:prstGeom prst="rect">
@@ -4673,7 +4889,7 @@
       </p:sp>
       <p:sp>
         <p:nvSpPr>
-          <p:cNvPr id="87" name="Rectangle 86">
+          <p:cNvPr id="9" name="Rectangle 8">
             <a:extLst>
               <a:ext uri="{FF2B5EF4-FFF2-40B4-BE49-F238E27FC236}">
                 <a16:creationId xmlns:a16="http://schemas.microsoft.com/office/drawing/2014/main" id="{14B4D2FE-6A01-70EE-57E1-D9A209E24C0F}"/>
@@ -4685,7 +4901,7 @@
         </p:nvSpPr>
         <p:spPr>
           <a:xfrm>
-            <a:off x="2301978" y="635578"/>
+            <a:off x="2301978" y="653866"/>
             <a:ext cx="900000" cy="180000"/>
           </a:xfrm>
           <a:prstGeom prst="rect">
@@ -4744,7 +4960,7 @@
       </p:sp>
       <p:sp>
         <p:nvSpPr>
-          <p:cNvPr id="88" name="Rectangle 87">
+          <p:cNvPr id="10" name="Rectangle 9">
             <a:extLst>
               <a:ext uri="{FF2B5EF4-FFF2-40B4-BE49-F238E27FC236}">
                 <a16:creationId xmlns:a16="http://schemas.microsoft.com/office/drawing/2014/main" id="{FACA5D21-1BAA-49AA-7590-BDC05D388114}"/>
@@ -4756,7 +4972,7 @@
         </p:nvSpPr>
         <p:spPr>
           <a:xfrm>
-            <a:off x="3232722" y="635578"/>
+            <a:off x="3232722" y="653866"/>
             <a:ext cx="900000" cy="180000"/>
           </a:xfrm>
           <a:prstGeom prst="rect">
@@ -4815,7 +5031,7 @@
       </p:sp>
       <p:sp>
         <p:nvSpPr>
-          <p:cNvPr id="89" name="Rectangle 88">
+          <p:cNvPr id="11" name="Rectangle 10">
             <a:extLst>
               <a:ext uri="{FF2B5EF4-FFF2-40B4-BE49-F238E27FC236}">
                 <a16:creationId xmlns:a16="http://schemas.microsoft.com/office/drawing/2014/main" id="{5216C86E-60C9-619C-F246-35D203BB2F07}"/>
@@ -4827,7 +5043,7 @@
         </p:nvSpPr>
         <p:spPr>
           <a:xfrm>
-            <a:off x="1371232" y="429307"/>
+            <a:off x="1371232" y="447595"/>
             <a:ext cx="2761489" cy="180000"/>
           </a:xfrm>
           <a:prstGeom prst="rect">
@@ -4890,7 +5106,7 @@
       </p:sp>
       <p:sp>
         <p:nvSpPr>
-          <p:cNvPr id="90" name="TextBox 89">
+          <p:cNvPr id="12" name="TextBox 11">
             <a:extLst>
               <a:ext uri="{FF2B5EF4-FFF2-40B4-BE49-F238E27FC236}">
                 <a16:creationId xmlns:a16="http://schemas.microsoft.com/office/drawing/2014/main" id="{A2A0F751-F9A6-3129-E72C-A6BE6A161570}"/>
@@ -4902,7 +5118,7 @@
         </p:nvSpPr>
         <p:spPr>
           <a:xfrm>
-            <a:off x="26641" y="834071"/>
+            <a:off x="31039" y="852359"/>
             <a:ext cx="430887" cy="338554"/>
           </a:xfrm>
           <a:prstGeom prst="rect">
@@ -4952,7 +5168,7 @@
       </p:sp>
       <p:sp>
         <p:nvSpPr>
-          <p:cNvPr id="91" name="TextBox 90">
+          <p:cNvPr id="13" name="TextBox 12">
             <a:extLst>
               <a:ext uri="{FF2B5EF4-FFF2-40B4-BE49-F238E27FC236}">
                 <a16:creationId xmlns:a16="http://schemas.microsoft.com/office/drawing/2014/main" id="{C181FF3B-6AD0-1BE1-4914-0A9CA1D7C4D3}"/>
@@ -4964,7 +5180,7 @@
         </p:nvSpPr>
         <p:spPr>
           <a:xfrm>
-            <a:off x="1363545" y="834071"/>
+            <a:off x="1363545" y="852359"/>
             <a:ext cx="896322" cy="338554"/>
           </a:xfrm>
           <a:prstGeom prst="rect">
@@ -5001,7 +5217,7 @@
       </p:sp>
       <p:sp>
         <p:nvSpPr>
-          <p:cNvPr id="92" name="TextBox 91">
+          <p:cNvPr id="14" name="TextBox 13">
             <a:extLst>
               <a:ext uri="{FF2B5EF4-FFF2-40B4-BE49-F238E27FC236}">
                 <a16:creationId xmlns:a16="http://schemas.microsoft.com/office/drawing/2014/main" id="{F64F700D-59E2-F229-195C-FCF79FDABACB}"/>
@@ -5013,7 +5229,7 @@
         </p:nvSpPr>
         <p:spPr>
           <a:xfrm>
-            <a:off x="2313137" y="834071"/>
+            <a:off x="2313137" y="852359"/>
             <a:ext cx="1827063" cy="338554"/>
           </a:xfrm>
           <a:prstGeom prst="rect">
@@ -5050,7 +5266,7 @@
       </p:sp>
       <p:sp>
         <p:nvSpPr>
-          <p:cNvPr id="93" name="TextBox 92">
+          <p:cNvPr id="15" name="TextBox 14">
             <a:extLst>
               <a:ext uri="{FF2B5EF4-FFF2-40B4-BE49-F238E27FC236}">
                 <a16:creationId xmlns:a16="http://schemas.microsoft.com/office/drawing/2014/main" id="{675F66ED-1587-EE2D-7961-3C1CE26DA6A5}"/>
@@ -5062,7 +5278,7 @@
         </p:nvSpPr>
         <p:spPr>
           <a:xfrm>
-            <a:off x="45691" y="1191719"/>
+            <a:off x="31039" y="1350528"/>
             <a:ext cx="430887" cy="734524"/>
           </a:xfrm>
           <a:prstGeom prst="rect">
@@ -5099,7 +5315,7 @@
       </p:sp>
       <p:sp>
         <p:nvSpPr>
-          <p:cNvPr id="94" name="TextBox 93">
+          <p:cNvPr id="16" name="TextBox 15">
             <a:extLst>
               <a:ext uri="{FF2B5EF4-FFF2-40B4-BE49-F238E27FC236}">
                 <a16:creationId xmlns:a16="http://schemas.microsoft.com/office/drawing/2014/main" id="{EE073022-3D67-FA36-A6BB-1349696A25C2}"/>
@@ -5111,8 +5327,8 @@
         </p:nvSpPr>
         <p:spPr>
           <a:xfrm>
-            <a:off x="1348173" y="1205038"/>
-            <a:ext cx="927067" cy="707886"/>
+            <a:off x="1348173" y="1223326"/>
+            <a:ext cx="927067" cy="954107"/>
           </a:xfrm>
           <a:prstGeom prst="rect">
             <a:avLst/>
@@ -5134,7 +5350,7 @@
                 <a:latin typeface="Calibri Light" panose="020F0302020204030204" pitchFamily="34" charset="0"/>
                 <a:cs typeface="Calibri Light" panose="020F0302020204030204" pitchFamily="34" charset="0"/>
               </a:rPr>
-              <a:t>(Domain/regional-wide or gridded) return period–based threshold climatology </a:t>
+              <a:t>(Domain/regional-wide or gridded) rainfall threshold (relative value – e.g., return period - or absolute value - mm)</a:t>
             </a:r>
             <a:endParaRPr lang="en-GB" sz="800" dirty="0">
               <a:solidFill>
@@ -5148,7 +5364,7 @@
       </p:sp>
       <p:sp>
         <p:nvSpPr>
-          <p:cNvPr id="95" name="TextBox 94">
+          <p:cNvPr id="17" name="TextBox 16">
             <a:extLst>
               <a:ext uri="{FF2B5EF4-FFF2-40B4-BE49-F238E27FC236}">
                 <a16:creationId xmlns:a16="http://schemas.microsoft.com/office/drawing/2014/main" id="{6FE58704-E40A-B268-7ACF-6EE103269248}"/>
@@ -5160,7 +5376,7 @@
         </p:nvSpPr>
         <p:spPr>
           <a:xfrm>
-            <a:off x="2309668" y="1328149"/>
+            <a:off x="2290452" y="1469140"/>
             <a:ext cx="1823052" cy="461665"/>
           </a:xfrm>
           <a:prstGeom prst="rect">
@@ -5210,7 +5426,7 @@
       </p:sp>
       <p:sp>
         <p:nvSpPr>
-          <p:cNvPr id="96" name="TextBox 95">
+          <p:cNvPr id="18" name="TextBox 17">
             <a:extLst>
               <a:ext uri="{FF2B5EF4-FFF2-40B4-BE49-F238E27FC236}">
                 <a16:creationId xmlns:a16="http://schemas.microsoft.com/office/drawing/2014/main" id="{92B98603-355D-9B96-6D9F-C8009BB9722A}"/>
@@ -5222,7 +5438,7 @@
         </p:nvSpPr>
         <p:spPr>
           <a:xfrm>
-            <a:off x="107245" y="2248537"/>
+            <a:off x="92594" y="2546225"/>
             <a:ext cx="307777" cy="734524"/>
           </a:xfrm>
           <a:prstGeom prst="rect">
@@ -5259,7 +5475,7 @@
       </p:sp>
       <p:sp>
         <p:nvSpPr>
-          <p:cNvPr id="97" name="TextBox 96">
+          <p:cNvPr id="19" name="TextBox 18">
             <a:extLst>
               <a:ext uri="{FF2B5EF4-FFF2-40B4-BE49-F238E27FC236}">
                 <a16:creationId xmlns:a16="http://schemas.microsoft.com/office/drawing/2014/main" id="{930869D1-E322-FC45-BA00-86C98ADC3B23}"/>
@@ -5271,7 +5487,7 @@
         </p:nvSpPr>
         <p:spPr>
           <a:xfrm>
-            <a:off x="341980" y="1892524"/>
+            <a:off x="341980" y="2190212"/>
             <a:ext cx="1059664" cy="1446550"/>
           </a:xfrm>
           <a:prstGeom prst="rect">
@@ -5311,7 +5527,7 @@
       </p:sp>
       <p:sp>
         <p:nvSpPr>
-          <p:cNvPr id="98" name="TextBox 97">
+          <p:cNvPr id="20" name="TextBox 19">
             <a:extLst>
               <a:ext uri="{FF2B5EF4-FFF2-40B4-BE49-F238E27FC236}">
                 <a16:creationId xmlns:a16="http://schemas.microsoft.com/office/drawing/2014/main" id="{BD8DD6A2-178B-DB31-2592-FE465B91B968}"/>
@@ -5323,7 +5539,7 @@
         </p:nvSpPr>
         <p:spPr>
           <a:xfrm>
-            <a:off x="1371231" y="2446522"/>
+            <a:off x="1371231" y="2744210"/>
             <a:ext cx="2761489" cy="338554"/>
           </a:xfrm>
           <a:prstGeom prst="rect">
@@ -5353,7 +5569,7 @@
       </p:sp>
       <p:sp>
         <p:nvSpPr>
-          <p:cNvPr id="99" name="TextBox 98">
+          <p:cNvPr id="21" name="TextBox 20">
             <a:extLst>
               <a:ext uri="{FF2B5EF4-FFF2-40B4-BE49-F238E27FC236}">
                 <a16:creationId xmlns:a16="http://schemas.microsoft.com/office/drawing/2014/main" id="{4F2F5DC6-56FD-AA6B-238F-F1D3E9FEA95A}"/>
@@ -5365,7 +5581,7 @@
         </p:nvSpPr>
         <p:spPr>
           <a:xfrm>
-            <a:off x="45690" y="3453374"/>
+            <a:off x="45690" y="3751062"/>
             <a:ext cx="307777" cy="1433231"/>
           </a:xfrm>
           <a:prstGeom prst="rect">
@@ -5395,7 +5611,7 @@
       </p:sp>
       <p:sp>
         <p:nvSpPr>
-          <p:cNvPr id="100" name="TextBox 99">
+          <p:cNvPr id="22" name="TextBox 21">
             <a:extLst>
               <a:ext uri="{FF2B5EF4-FFF2-40B4-BE49-F238E27FC236}">
                 <a16:creationId xmlns:a16="http://schemas.microsoft.com/office/drawing/2014/main" id="{BF12B402-8ABA-F1A7-0C14-F3F1483ABF5A}"/>
@@ -5407,7 +5623,7 @@
         </p:nvSpPr>
         <p:spPr>
           <a:xfrm>
-            <a:off x="1294576" y="3440055"/>
+            <a:off x="1294576" y="3737743"/>
             <a:ext cx="1059664" cy="1200329"/>
           </a:xfrm>
           <a:prstGeom prst="rect">
@@ -5519,7 +5735,7 @@
       </p:sp>
       <p:sp>
         <p:nvSpPr>
-          <p:cNvPr id="101" name="TextBox 100">
+          <p:cNvPr id="23" name="TextBox 22">
             <a:extLst>
               <a:ext uri="{FF2B5EF4-FFF2-40B4-BE49-F238E27FC236}">
                 <a16:creationId xmlns:a16="http://schemas.microsoft.com/office/drawing/2014/main" id="{E33BAA42-6AE6-B9C5-7D87-CC1819156847}"/>
@@ -5531,7 +5747,7 @@
         </p:nvSpPr>
         <p:spPr>
           <a:xfrm>
-            <a:off x="2231422" y="3440055"/>
+            <a:off x="2231422" y="3737743"/>
             <a:ext cx="1997677" cy="1446550"/>
           </a:xfrm>
           <a:prstGeom prst="rect">
@@ -5685,7 +5901,7 @@
       </p:sp>
       <p:sp>
         <p:nvSpPr>
-          <p:cNvPr id="102" name="TextBox 101">
+          <p:cNvPr id="24" name="TextBox 23">
             <a:extLst>
               <a:ext uri="{FF2B5EF4-FFF2-40B4-BE49-F238E27FC236}">
                 <a16:creationId xmlns:a16="http://schemas.microsoft.com/office/drawing/2014/main" id="{49445F97-EAF9-8864-EB39-A2AABCEDD7FB}"/>
@@ -5697,7 +5913,7 @@
         </p:nvSpPr>
         <p:spPr>
           <a:xfrm>
-            <a:off x="-15865" y="4942705"/>
+            <a:off x="-15865" y="5240393"/>
             <a:ext cx="430887" cy="753105"/>
           </a:xfrm>
           <a:prstGeom prst="rect">
@@ -5740,7 +5956,7 @@
       </p:sp>
       <p:cxnSp>
         <p:nvCxnSpPr>
-          <p:cNvPr id="103" name="Straight Connector 102">
+          <p:cNvPr id="25" name="Straight Connector 24">
             <a:extLst>
               <a:ext uri="{FF2B5EF4-FFF2-40B4-BE49-F238E27FC236}">
                 <a16:creationId xmlns:a16="http://schemas.microsoft.com/office/drawing/2014/main" id="{F5B77EE0-1764-73C0-B82D-D5C6872D70F3}"/>
@@ -5754,7 +5970,7 @@
         </p:nvCxnSpPr>
         <p:spPr>
           <a:xfrm>
-            <a:off x="2246" y="3382961"/>
+            <a:off x="2246" y="3680649"/>
             <a:ext cx="4140000" cy="0"/>
           </a:xfrm>
           <a:prstGeom prst="line">
@@ -5786,7 +6002,7 @@
       </p:cxnSp>
       <p:cxnSp>
         <p:nvCxnSpPr>
-          <p:cNvPr id="104" name="Straight Connector 103">
+          <p:cNvPr id="26" name="Straight Connector 25">
             <a:extLst>
               <a:ext uri="{FF2B5EF4-FFF2-40B4-BE49-F238E27FC236}">
                 <a16:creationId xmlns:a16="http://schemas.microsoft.com/office/drawing/2014/main" id="{B34D1450-8571-CA5B-49E2-E7FF08CBEEA7}"/>
@@ -5800,7 +6016,7 @@
         </p:nvCxnSpPr>
         <p:spPr>
           <a:xfrm>
-            <a:off x="-5176" y="4935816"/>
+            <a:off x="-5176" y="5233504"/>
             <a:ext cx="4140000" cy="0"/>
           </a:xfrm>
           <a:prstGeom prst="line">
@@ -5832,7 +6048,7 @@
       </p:cxnSp>
       <p:cxnSp>
         <p:nvCxnSpPr>
-          <p:cNvPr id="105" name="Straight Connector 104">
+          <p:cNvPr id="27" name="Straight Connector 26">
             <a:extLst>
               <a:ext uri="{FF2B5EF4-FFF2-40B4-BE49-F238E27FC236}">
                 <a16:creationId xmlns:a16="http://schemas.microsoft.com/office/drawing/2014/main" id="{EBA96BED-1C2B-2165-A516-69C67FBDEA11}"/>
@@ -5846,7 +6062,7 @@
         </p:nvCxnSpPr>
         <p:spPr>
           <a:xfrm>
-            <a:off x="175863" y="1892524"/>
+            <a:off x="175863" y="2190212"/>
             <a:ext cx="3964337" cy="0"/>
           </a:xfrm>
           <a:prstGeom prst="line">
@@ -5877,7 +6093,7 @@
       </p:cxnSp>
       <p:cxnSp>
         <p:nvCxnSpPr>
-          <p:cNvPr id="106" name="Straight Connector 105">
+          <p:cNvPr id="28" name="Straight Connector 27">
             <a:extLst>
               <a:ext uri="{FF2B5EF4-FFF2-40B4-BE49-F238E27FC236}">
                 <a16:creationId xmlns:a16="http://schemas.microsoft.com/office/drawing/2014/main" id="{D65539E4-71BB-6DCB-81BC-F16BB93F43F8}"/>
@@ -5891,7 +6107,7 @@
         </p:nvCxnSpPr>
         <p:spPr>
           <a:xfrm>
-            <a:off x="168383" y="1227079"/>
+            <a:off x="168383" y="1245367"/>
             <a:ext cx="3971817" cy="0"/>
           </a:xfrm>
           <a:prstGeom prst="line">

</xml_diff>

<commit_message>
Changed the section on objective verification
</commit_message>
<xml_diff>
--- a/chapter_03/figures/forecast_evaluation_strategy.pptx
+++ b/chapter_03/figures/forecast_evaluation_strategy.pptx
@@ -2,7 +2,7 @@
 <file path=ppt/presentation.xml><?xml version="1.0" encoding="utf-8"?>
 <p:presentation xmlns:a="http://schemas.openxmlformats.org/drawingml/2006/main" xmlns:r="http://schemas.openxmlformats.org/officeDocument/2006/relationships" xmlns:p="http://schemas.openxmlformats.org/presentationml/2006/main" saveSubsetFonts="1">
   <p:sldMasterIdLst>
-    <p:sldMasterId id="2147483732" r:id="rId1"/>
+    <p:sldMasterId id="2147483744" r:id="rId1"/>
   </p:sldMasterIdLst>
   <p:notesMasterIdLst>
     <p:notesMasterId r:id="rId3"/>
@@ -10,7 +10,7 @@
   <p:sldIdLst>
     <p:sldId id="256" r:id="rId2"/>
   </p:sldIdLst>
-  <p:sldSz cx="4140200" cy="5975350"/>
+  <p:sldSz cx="4140200" cy="6156325"/>
   <p:notesSz cx="6858000" cy="9144000"/>
   <p:defaultTextStyle>
     <a:defPPr>
@@ -118,7 +118,7 @@
 <file path=ppt/revisionInfo.xml><?xml version="1.0" encoding="utf-8"?>
 <p1510:revInfo xmlns:a="http://schemas.openxmlformats.org/drawingml/2006/main" xmlns:r="http://schemas.openxmlformats.org/officeDocument/2006/relationships" xmlns:p1510="http://schemas.microsoft.com/office/powerpoint/2015/10/main">
   <p1510:revLst>
-    <p1510:client id="{61D033AF-DECF-4E4A-A0E6-FAFF0A02AD4A}" v="38" dt="2025-06-27T05:46:37.567"/>
+    <p1510:client id="{61D033AF-DECF-4E4A-A0E6-FAFF0A02AD4A}" v="44" dt="2025-06-27T12:16:18.135"/>
   </p1510:revLst>
 </p1510:revInfo>
 </file>
@@ -127,13 +127,13 @@
 <pc:chgInfo xmlns:a="http://schemas.openxmlformats.org/drawingml/2006/main" xmlns:r="http://schemas.openxmlformats.org/officeDocument/2006/relationships" xmlns:ac="http://schemas.microsoft.com/office/drawing/2013/main/command" xmlns:pc="http://schemas.microsoft.com/office/powerpoint/2013/main/command">
   <pc:docChgLst>
     <pc:chgData name="Fatima Pillosu" userId="a6295d4dc9e22643" providerId="LiveId" clId="{61D033AF-DECF-4E4A-A0E6-FAFF0A02AD4A}"/>
-    <pc:docChg chg="undo custSel modSld">
-      <pc:chgData name="Fatima Pillosu" userId="a6295d4dc9e22643" providerId="LiveId" clId="{61D033AF-DECF-4E4A-A0E6-FAFF0A02AD4A}" dt="2025-06-27T05:46:41.828" v="3401" actId="1036"/>
+    <pc:docChg chg="undo custSel modSld modMainMaster modNotesMaster">
+      <pc:chgData name="Fatima Pillosu" userId="a6295d4dc9e22643" providerId="LiveId" clId="{61D033AF-DECF-4E4A-A0E6-FAFF0A02AD4A}" dt="2025-06-27T12:17:51.107" v="3595" actId="20577"/>
       <pc:docMkLst>
         <pc:docMk/>
       </pc:docMkLst>
-      <pc:sldChg chg="addSp delSp modSp mod">
-        <pc:chgData name="Fatima Pillosu" userId="a6295d4dc9e22643" providerId="LiveId" clId="{61D033AF-DECF-4E4A-A0E6-FAFF0A02AD4A}" dt="2025-06-27T05:46:41.828" v="3401" actId="1036"/>
+      <pc:sldChg chg="addSp delSp modSp mod modNotes">
+        <pc:chgData name="Fatima Pillosu" userId="a6295d4dc9e22643" providerId="LiveId" clId="{61D033AF-DECF-4E4A-A0E6-FAFF0A02AD4A}" dt="2025-06-27T12:17:51.107" v="3595" actId="20577"/>
         <pc:sldMkLst>
           <pc:docMk/>
           <pc:sldMk cId="2412790101" sldId="256"/>
@@ -154,6 +154,14 @@
             <ac:spMk id="2" creationId="{5F9C8026-4C6B-D6F9-CA2C-A59B5ECF5D00}"/>
           </ac:spMkLst>
         </pc:spChg>
+        <pc:spChg chg="add del mod">
+          <ac:chgData name="Fatima Pillosu" userId="a6295d4dc9e22643" providerId="LiveId" clId="{61D033AF-DECF-4E4A-A0E6-FAFF0A02AD4A}" dt="2025-06-27T12:15:51.690" v="3511" actId="21"/>
+          <ac:spMkLst>
+            <pc:docMk/>
+            <pc:sldMk cId="2412790101" sldId="256"/>
+            <ac:spMk id="2" creationId="{D9841862-2050-5B02-3FBC-54A24536641A}"/>
+          </ac:spMkLst>
+        </pc:spChg>
         <pc:spChg chg="del">
           <ac:chgData name="Fatima Pillosu" userId="a6295d4dc9e22643" providerId="LiveId" clId="{61D033AF-DECF-4E4A-A0E6-FAFF0A02AD4A}" dt="2025-06-26T05:34:22.862" v="74" actId="21"/>
           <ac:spMkLst>
@@ -162,8 +170,8 @@
             <ac:spMk id="3" creationId="{5F9C8026-4C6B-D6F9-CA2C-A59B5ECF5D00}"/>
           </ac:spMkLst>
         </pc:spChg>
-        <pc:spChg chg="add mod">
-          <ac:chgData name="Fatima Pillosu" userId="a6295d4dc9e22643" providerId="LiveId" clId="{61D033AF-DECF-4E4A-A0E6-FAFF0A02AD4A}" dt="2025-06-27T05:46:41.828" v="3401" actId="1036"/>
+        <pc:spChg chg="add del mod">
+          <ac:chgData name="Fatima Pillosu" userId="a6295d4dc9e22643" providerId="LiveId" clId="{61D033AF-DECF-4E4A-A0E6-FAFF0A02AD4A}" dt="2025-06-27T12:15:51.690" v="3511" actId="21"/>
           <ac:spMkLst>
             <pc:docMk/>
             <pc:sldMk cId="2412790101" sldId="256"/>
@@ -178,8 +186,8 @@
             <ac:spMk id="3" creationId="{FB5C892E-DCD3-8B9E-2922-1E95ED9097F3}"/>
           </ac:spMkLst>
         </pc:spChg>
-        <pc:spChg chg="add mod">
-          <ac:chgData name="Fatima Pillosu" userId="a6295d4dc9e22643" providerId="LiveId" clId="{61D033AF-DECF-4E4A-A0E6-FAFF0A02AD4A}" dt="2025-06-27T05:46:41.828" v="3401" actId="1036"/>
+        <pc:spChg chg="add del mod">
+          <ac:chgData name="Fatima Pillosu" userId="a6295d4dc9e22643" providerId="LiveId" clId="{61D033AF-DECF-4E4A-A0E6-FAFF0A02AD4A}" dt="2025-06-27T12:15:51.690" v="3511" actId="21"/>
           <ac:spMkLst>
             <pc:docMk/>
             <pc:sldMk cId="2412790101" sldId="256"/>
@@ -202,8 +210,8 @@
             <ac:spMk id="4" creationId="{583A55BE-6294-291E-24EA-6FDD03CBA2E7}"/>
           </ac:spMkLst>
         </pc:spChg>
-        <pc:spChg chg="add mod">
-          <ac:chgData name="Fatima Pillosu" userId="a6295d4dc9e22643" providerId="LiveId" clId="{61D033AF-DECF-4E4A-A0E6-FAFF0A02AD4A}" dt="2025-06-27T05:46:41.828" v="3401" actId="1036"/>
+        <pc:spChg chg="add del mod">
+          <ac:chgData name="Fatima Pillosu" userId="a6295d4dc9e22643" providerId="LiveId" clId="{61D033AF-DECF-4E4A-A0E6-FAFF0A02AD4A}" dt="2025-06-27T12:15:51.690" v="3511" actId="21"/>
           <ac:spMkLst>
             <pc:docMk/>
             <pc:sldMk cId="2412790101" sldId="256"/>
@@ -242,8 +250,8 @@
             <ac:spMk id="6" creationId="{91E8465F-C483-4093-3158-F91048E66783}"/>
           </ac:spMkLst>
         </pc:spChg>
-        <pc:spChg chg="add mod">
-          <ac:chgData name="Fatima Pillosu" userId="a6295d4dc9e22643" providerId="LiveId" clId="{61D033AF-DECF-4E4A-A0E6-FAFF0A02AD4A}" dt="2025-06-27T05:46:41.828" v="3401" actId="1036"/>
+        <pc:spChg chg="add del mod">
+          <ac:chgData name="Fatima Pillosu" userId="a6295d4dc9e22643" providerId="LiveId" clId="{61D033AF-DECF-4E4A-A0E6-FAFF0A02AD4A}" dt="2025-06-27T12:11:49.564" v="3442" actId="478"/>
           <ac:spMkLst>
             <pc:docMk/>
             <pc:sldMk cId="2412790101" sldId="256"/>
@@ -258,8 +266,8 @@
             <ac:spMk id="7" creationId="{31C95DF1-1021-B801-DF6E-518471057358}"/>
           </ac:spMkLst>
         </pc:spChg>
-        <pc:spChg chg="add mod">
-          <ac:chgData name="Fatima Pillosu" userId="a6295d4dc9e22643" providerId="LiveId" clId="{61D033AF-DECF-4E4A-A0E6-FAFF0A02AD4A}" dt="2025-06-27T05:46:41.828" v="3401" actId="1036"/>
+        <pc:spChg chg="add del mod">
+          <ac:chgData name="Fatima Pillosu" userId="a6295d4dc9e22643" providerId="LiveId" clId="{61D033AF-DECF-4E4A-A0E6-FAFF0A02AD4A}" dt="2025-06-27T12:15:51.690" v="3511" actId="21"/>
           <ac:spMkLst>
             <pc:docMk/>
             <pc:sldMk cId="2412790101" sldId="256"/>
@@ -274,16 +282,16 @@
             <ac:spMk id="8" creationId="{26DAFA34-6888-C3F6-07E1-0C3D78F45867}"/>
           </ac:spMkLst>
         </pc:spChg>
-        <pc:spChg chg="add mod">
-          <ac:chgData name="Fatima Pillosu" userId="a6295d4dc9e22643" providerId="LiveId" clId="{61D033AF-DECF-4E4A-A0E6-FAFF0A02AD4A}" dt="2025-06-27T05:46:41.828" v="3401" actId="1036"/>
+        <pc:spChg chg="add del mod">
+          <ac:chgData name="Fatima Pillosu" userId="a6295d4dc9e22643" providerId="LiveId" clId="{61D033AF-DECF-4E4A-A0E6-FAFF0A02AD4A}" dt="2025-06-27T12:15:51.690" v="3511" actId="21"/>
           <ac:spMkLst>
             <pc:docMk/>
             <pc:sldMk cId="2412790101" sldId="256"/>
             <ac:spMk id="8" creationId="{91E8465F-C483-4093-3158-F91048E66783}"/>
           </ac:spMkLst>
         </pc:spChg>
-        <pc:spChg chg="add mod">
-          <ac:chgData name="Fatima Pillosu" userId="a6295d4dc9e22643" providerId="LiveId" clId="{61D033AF-DECF-4E4A-A0E6-FAFF0A02AD4A}" dt="2025-06-27T05:46:41.828" v="3401" actId="1036"/>
+        <pc:spChg chg="add del mod">
+          <ac:chgData name="Fatima Pillosu" userId="a6295d4dc9e22643" providerId="LiveId" clId="{61D033AF-DECF-4E4A-A0E6-FAFF0A02AD4A}" dt="2025-06-27T12:15:51.690" v="3511" actId="21"/>
           <ac:spMkLst>
             <pc:docMk/>
             <pc:sldMk cId="2412790101" sldId="256"/>
@@ -314,16 +322,16 @@
             <ac:spMk id="10" creationId="{E88CAF47-5440-73C9-1B42-B3885629252B}"/>
           </ac:spMkLst>
         </pc:spChg>
-        <pc:spChg chg="add mod">
-          <ac:chgData name="Fatima Pillosu" userId="a6295d4dc9e22643" providerId="LiveId" clId="{61D033AF-DECF-4E4A-A0E6-FAFF0A02AD4A}" dt="2025-06-27T05:46:41.828" v="3401" actId="1036"/>
+        <pc:spChg chg="add del mod">
+          <ac:chgData name="Fatima Pillosu" userId="a6295d4dc9e22643" providerId="LiveId" clId="{61D033AF-DECF-4E4A-A0E6-FAFF0A02AD4A}" dt="2025-06-27T12:15:51.690" v="3511" actId="21"/>
           <ac:spMkLst>
             <pc:docMk/>
             <pc:sldMk cId="2412790101" sldId="256"/>
             <ac:spMk id="10" creationId="{FACA5D21-1BAA-49AA-7590-BDC05D388114}"/>
           </ac:spMkLst>
         </pc:spChg>
-        <pc:spChg chg="add mod">
-          <ac:chgData name="Fatima Pillosu" userId="a6295d4dc9e22643" providerId="LiveId" clId="{61D033AF-DECF-4E4A-A0E6-FAFF0A02AD4A}" dt="2025-06-27T05:46:41.828" v="3401" actId="1036"/>
+        <pc:spChg chg="add del mod">
+          <ac:chgData name="Fatima Pillosu" userId="a6295d4dc9e22643" providerId="LiveId" clId="{61D033AF-DECF-4E4A-A0E6-FAFF0A02AD4A}" dt="2025-06-27T12:15:51.690" v="3511" actId="21"/>
           <ac:spMkLst>
             <pc:docMk/>
             <pc:sldMk cId="2412790101" sldId="256"/>
@@ -354,8 +362,8 @@
             <ac:spMk id="12" creationId="{5216C86E-60C9-619C-F246-35D203BB2F07}"/>
           </ac:spMkLst>
         </pc:spChg>
-        <pc:spChg chg="add mod">
-          <ac:chgData name="Fatima Pillosu" userId="a6295d4dc9e22643" providerId="LiveId" clId="{61D033AF-DECF-4E4A-A0E6-FAFF0A02AD4A}" dt="2025-06-27T05:46:41.828" v="3401" actId="1036"/>
+        <pc:spChg chg="add del mod">
+          <ac:chgData name="Fatima Pillosu" userId="a6295d4dc9e22643" providerId="LiveId" clId="{61D033AF-DECF-4E4A-A0E6-FAFF0A02AD4A}" dt="2025-06-27T12:15:51.690" v="3511" actId="21"/>
           <ac:spMkLst>
             <pc:docMk/>
             <pc:sldMk cId="2412790101" sldId="256"/>
@@ -378,8 +386,8 @@
             <ac:spMk id="13" creationId="{AB6D6DF9-DF18-A3D3-FAC5-57B9823F41B1}"/>
           </ac:spMkLst>
         </pc:spChg>
-        <pc:spChg chg="add mod">
-          <ac:chgData name="Fatima Pillosu" userId="a6295d4dc9e22643" providerId="LiveId" clId="{61D033AF-DECF-4E4A-A0E6-FAFF0A02AD4A}" dt="2025-06-27T05:46:41.828" v="3401" actId="1036"/>
+        <pc:spChg chg="add del mod">
+          <ac:chgData name="Fatima Pillosu" userId="a6295d4dc9e22643" providerId="LiveId" clId="{61D033AF-DECF-4E4A-A0E6-FAFF0A02AD4A}" dt="2025-06-27T12:15:51.690" v="3511" actId="21"/>
           <ac:spMkLst>
             <pc:docMk/>
             <pc:sldMk cId="2412790101" sldId="256"/>
@@ -402,8 +410,8 @@
             <ac:spMk id="14" creationId="{44F96520-C1B8-0DEE-FE46-92F1569833C7}"/>
           </ac:spMkLst>
         </pc:spChg>
-        <pc:spChg chg="add mod">
-          <ac:chgData name="Fatima Pillosu" userId="a6295d4dc9e22643" providerId="LiveId" clId="{61D033AF-DECF-4E4A-A0E6-FAFF0A02AD4A}" dt="2025-06-27T05:46:41.828" v="3401" actId="1036"/>
+        <pc:spChg chg="add del mod">
+          <ac:chgData name="Fatima Pillosu" userId="a6295d4dc9e22643" providerId="LiveId" clId="{61D033AF-DECF-4E4A-A0E6-FAFF0A02AD4A}" dt="2025-06-27T12:15:51.690" v="3511" actId="21"/>
           <ac:spMkLst>
             <pc:docMk/>
             <pc:sldMk cId="2412790101" sldId="256"/>
@@ -418,8 +426,8 @@
             <ac:spMk id="15" creationId="{270F2959-BD8B-2196-95FB-8D47C2F8DFEE}"/>
           </ac:spMkLst>
         </pc:spChg>
-        <pc:spChg chg="add mod">
-          <ac:chgData name="Fatima Pillosu" userId="a6295d4dc9e22643" providerId="LiveId" clId="{61D033AF-DECF-4E4A-A0E6-FAFF0A02AD4A}" dt="2025-06-27T05:46:41.828" v="3401" actId="1036"/>
+        <pc:spChg chg="add del mod">
+          <ac:chgData name="Fatima Pillosu" userId="a6295d4dc9e22643" providerId="LiveId" clId="{61D033AF-DECF-4E4A-A0E6-FAFF0A02AD4A}" dt="2025-06-27T12:15:51.690" v="3511" actId="21"/>
           <ac:spMkLst>
             <pc:docMk/>
             <pc:sldMk cId="2412790101" sldId="256"/>
@@ -450,16 +458,16 @@
             <ac:spMk id="16" creationId="{E88CAF47-5440-73C9-1B42-B3885629252B}"/>
           </ac:spMkLst>
         </pc:spChg>
-        <pc:spChg chg="add mod">
-          <ac:chgData name="Fatima Pillosu" userId="a6295d4dc9e22643" providerId="LiveId" clId="{61D033AF-DECF-4E4A-A0E6-FAFF0A02AD4A}" dt="2025-06-27T05:46:41.828" v="3401" actId="1036"/>
+        <pc:spChg chg="add del mod">
+          <ac:chgData name="Fatima Pillosu" userId="a6295d4dc9e22643" providerId="LiveId" clId="{61D033AF-DECF-4E4A-A0E6-FAFF0A02AD4A}" dt="2025-06-27T12:15:51.690" v="3511" actId="21"/>
           <ac:spMkLst>
             <pc:docMk/>
             <pc:sldMk cId="2412790101" sldId="256"/>
             <ac:spMk id="16" creationId="{EE073022-3D67-FA36-A6BB-1349696A25C2}"/>
           </ac:spMkLst>
         </pc:spChg>
-        <pc:spChg chg="add mod">
-          <ac:chgData name="Fatima Pillosu" userId="a6295d4dc9e22643" providerId="LiveId" clId="{61D033AF-DECF-4E4A-A0E6-FAFF0A02AD4A}" dt="2025-06-27T05:46:41.828" v="3401" actId="1036"/>
+        <pc:spChg chg="add del mod">
+          <ac:chgData name="Fatima Pillosu" userId="a6295d4dc9e22643" providerId="LiveId" clId="{61D033AF-DECF-4E4A-A0E6-FAFF0A02AD4A}" dt="2025-06-27T12:15:51.690" v="3511" actId="21"/>
           <ac:spMkLst>
             <pc:docMk/>
             <pc:sldMk cId="2412790101" sldId="256"/>
@@ -474,8 +482,8 @@
             <ac:spMk id="17" creationId="{F0379129-0B4C-9E6E-3C06-018694AD7810}"/>
           </ac:spMkLst>
         </pc:spChg>
-        <pc:spChg chg="add mod">
-          <ac:chgData name="Fatima Pillosu" userId="a6295d4dc9e22643" providerId="LiveId" clId="{61D033AF-DECF-4E4A-A0E6-FAFF0A02AD4A}" dt="2025-06-27T05:46:41.828" v="3401" actId="1036"/>
+        <pc:spChg chg="add del mod">
+          <ac:chgData name="Fatima Pillosu" userId="a6295d4dc9e22643" providerId="LiveId" clId="{61D033AF-DECF-4E4A-A0E6-FAFF0A02AD4A}" dt="2025-06-27T12:15:51.690" v="3511" actId="21"/>
           <ac:spMkLst>
             <pc:docMk/>
             <pc:sldMk cId="2412790101" sldId="256"/>
@@ -490,8 +498,8 @@
             <ac:spMk id="18" creationId="{ED3F179D-B885-7D31-FEC9-958FC08D0EE6}"/>
           </ac:spMkLst>
         </pc:spChg>
-        <pc:spChg chg="add mod">
-          <ac:chgData name="Fatima Pillosu" userId="a6295d4dc9e22643" providerId="LiveId" clId="{61D033AF-DECF-4E4A-A0E6-FAFF0A02AD4A}" dt="2025-06-27T05:46:41.828" v="3401" actId="1036"/>
+        <pc:spChg chg="add del mod">
+          <ac:chgData name="Fatima Pillosu" userId="a6295d4dc9e22643" providerId="LiveId" clId="{61D033AF-DECF-4E4A-A0E6-FAFF0A02AD4A}" dt="2025-06-27T12:15:51.690" v="3511" actId="21"/>
           <ac:spMkLst>
             <pc:docMk/>
             <pc:sldMk cId="2412790101" sldId="256"/>
@@ -506,8 +514,8 @@
             <ac:spMk id="20" creationId="{03BDF258-EAE2-5C51-887C-04325961DE3E}"/>
           </ac:spMkLst>
         </pc:spChg>
-        <pc:spChg chg="add mod">
-          <ac:chgData name="Fatima Pillosu" userId="a6295d4dc9e22643" providerId="LiveId" clId="{61D033AF-DECF-4E4A-A0E6-FAFF0A02AD4A}" dt="2025-06-27T05:46:41.828" v="3401" actId="1036"/>
+        <pc:spChg chg="add del mod">
+          <ac:chgData name="Fatima Pillosu" userId="a6295d4dc9e22643" providerId="LiveId" clId="{61D033AF-DECF-4E4A-A0E6-FAFF0A02AD4A}" dt="2025-06-27T12:15:51.690" v="3511" actId="21"/>
           <ac:spMkLst>
             <pc:docMk/>
             <pc:sldMk cId="2412790101" sldId="256"/>
@@ -522,8 +530,8 @@
             <ac:spMk id="21" creationId="{270F2959-BD8B-2196-95FB-8D47C2F8DFEE}"/>
           </ac:spMkLst>
         </pc:spChg>
-        <pc:spChg chg="add mod">
-          <ac:chgData name="Fatima Pillosu" userId="a6295d4dc9e22643" providerId="LiveId" clId="{61D033AF-DECF-4E4A-A0E6-FAFF0A02AD4A}" dt="2025-06-27T05:46:41.828" v="3401" actId="1036"/>
+        <pc:spChg chg="add del mod">
+          <ac:chgData name="Fatima Pillosu" userId="a6295d4dc9e22643" providerId="LiveId" clId="{61D033AF-DECF-4E4A-A0E6-FAFF0A02AD4A}" dt="2025-06-27T12:15:51.690" v="3511" actId="21"/>
           <ac:spMkLst>
             <pc:docMk/>
             <pc:sldMk cId="2412790101" sldId="256"/>
@@ -538,8 +546,8 @@
             <ac:spMk id="22" creationId="{79BD22D6-2E91-EE6B-6DC1-8F89293EC427}"/>
           </ac:spMkLst>
         </pc:spChg>
-        <pc:spChg chg="add mod">
-          <ac:chgData name="Fatima Pillosu" userId="a6295d4dc9e22643" providerId="LiveId" clId="{61D033AF-DECF-4E4A-A0E6-FAFF0A02AD4A}" dt="2025-06-27T05:46:41.828" v="3401" actId="1036"/>
+        <pc:spChg chg="add del mod">
+          <ac:chgData name="Fatima Pillosu" userId="a6295d4dc9e22643" providerId="LiveId" clId="{61D033AF-DECF-4E4A-A0E6-FAFF0A02AD4A}" dt="2025-06-27T12:15:51.690" v="3511" actId="21"/>
           <ac:spMkLst>
             <pc:docMk/>
             <pc:sldMk cId="2412790101" sldId="256"/>
@@ -554,8 +562,8 @@
             <ac:spMk id="23" creationId="{6DE70467-F13E-0EF5-BDD7-2E306D012960}"/>
           </ac:spMkLst>
         </pc:spChg>
-        <pc:spChg chg="add mod">
-          <ac:chgData name="Fatima Pillosu" userId="a6295d4dc9e22643" providerId="LiveId" clId="{61D033AF-DECF-4E4A-A0E6-FAFF0A02AD4A}" dt="2025-06-27T05:46:41.828" v="3401" actId="1036"/>
+        <pc:spChg chg="add del mod">
+          <ac:chgData name="Fatima Pillosu" userId="a6295d4dc9e22643" providerId="LiveId" clId="{61D033AF-DECF-4E4A-A0E6-FAFF0A02AD4A}" dt="2025-06-27T12:15:51.690" v="3511" actId="21"/>
           <ac:spMkLst>
             <pc:docMk/>
             <pc:sldMk cId="2412790101" sldId="256"/>
@@ -570,8 +578,8 @@
             <ac:spMk id="24" creationId="{062ED1AE-086B-DAEA-D664-FB6D28F48278}"/>
           </ac:spMkLst>
         </pc:spChg>
-        <pc:spChg chg="add mod">
-          <ac:chgData name="Fatima Pillosu" userId="a6295d4dc9e22643" providerId="LiveId" clId="{61D033AF-DECF-4E4A-A0E6-FAFF0A02AD4A}" dt="2025-06-27T05:46:41.828" v="3401" actId="1036"/>
+        <pc:spChg chg="add del mod">
+          <ac:chgData name="Fatima Pillosu" userId="a6295d4dc9e22643" providerId="LiveId" clId="{61D033AF-DECF-4E4A-A0E6-FAFF0A02AD4A}" dt="2025-06-27T12:15:51.690" v="3511" actId="21"/>
           <ac:spMkLst>
             <pc:docMk/>
             <pc:sldMk cId="2412790101" sldId="256"/>
@@ -618,6 +626,14 @@
             <ac:spMk id="29" creationId="{69980176-6812-790E-510C-A984CD49D573}"/>
           </ac:spMkLst>
         </pc:spChg>
+        <pc:spChg chg="add del">
+          <ac:chgData name="Fatima Pillosu" userId="a6295d4dc9e22643" providerId="LiveId" clId="{61D033AF-DECF-4E4A-A0E6-FAFF0A02AD4A}" dt="2025-06-27T12:15:50.375" v="3510" actId="478"/>
+          <ac:spMkLst>
+            <pc:docMk/>
+            <pc:sldMk cId="2412790101" sldId="256"/>
+            <ac:spMk id="30" creationId="{2330FBDE-8941-46A9-AD8D-F6D079102F6B}"/>
+          </ac:spMkLst>
+        </pc:spChg>
         <pc:spChg chg="add del mod">
           <ac:chgData name="Fatima Pillosu" userId="a6295d4dc9e22643" providerId="LiveId" clId="{61D033AF-DECF-4E4A-A0E6-FAFF0A02AD4A}" dt="2025-06-26T16:50:18.344" v="3216" actId="21"/>
           <ac:spMkLst>
@@ -634,6 +650,14 @@
             <ac:spMk id="31" creationId="{EC48E012-CA83-72EC-6969-6BED91D11428}"/>
           </ac:spMkLst>
         </pc:spChg>
+        <pc:spChg chg="add mod">
+          <ac:chgData name="Fatima Pillosu" userId="a6295d4dc9e22643" providerId="LiveId" clId="{61D033AF-DECF-4E4A-A0E6-FAFF0A02AD4A}" dt="2025-06-27T12:16:18.134" v="3513"/>
+          <ac:spMkLst>
+            <pc:docMk/>
+            <pc:sldMk cId="2412790101" sldId="256"/>
+            <ac:spMk id="31" creationId="{F0379129-0B4C-9E6E-3C06-018694AD7810}"/>
+          </ac:spMkLst>
+        </pc:spChg>
         <pc:spChg chg="add del mod">
           <ac:chgData name="Fatima Pillosu" userId="a6295d4dc9e22643" providerId="LiveId" clId="{61D033AF-DECF-4E4A-A0E6-FAFF0A02AD4A}" dt="2025-06-26T16:00:49.712" v="2236" actId="478"/>
           <ac:spMkLst>
@@ -642,6 +666,22 @@
             <ac:spMk id="32" creationId="{11064E66-AA6E-37E6-8AA5-F1C88B37FDF9}"/>
           </ac:spMkLst>
         </pc:spChg>
+        <pc:spChg chg="add mod">
+          <ac:chgData name="Fatima Pillosu" userId="a6295d4dc9e22643" providerId="LiveId" clId="{61D033AF-DECF-4E4A-A0E6-FAFF0A02AD4A}" dt="2025-06-27T12:16:18.134" v="3513"/>
+          <ac:spMkLst>
+            <pc:docMk/>
+            <pc:sldMk cId="2412790101" sldId="256"/>
+            <ac:spMk id="32" creationId="{270F2959-BD8B-2196-95FB-8D47C2F8DFEE}"/>
+          </ac:spMkLst>
+        </pc:spChg>
+        <pc:spChg chg="add mod">
+          <ac:chgData name="Fatima Pillosu" userId="a6295d4dc9e22643" providerId="LiveId" clId="{61D033AF-DECF-4E4A-A0E6-FAFF0A02AD4A}" dt="2025-06-27T12:17:51.107" v="3595" actId="20577"/>
+          <ac:spMkLst>
+            <pc:docMk/>
+            <pc:sldMk cId="2412790101" sldId="256"/>
+            <ac:spMk id="33" creationId="{062ED1AE-086B-DAEA-D664-FB6D28F48278}"/>
+          </ac:spMkLst>
+        </pc:spChg>
         <pc:spChg chg="add del mod">
           <ac:chgData name="Fatima Pillosu" userId="a6295d4dc9e22643" providerId="LiveId" clId="{61D033AF-DECF-4E4A-A0E6-FAFF0A02AD4A}" dt="2025-06-26T16:50:18.344" v="3216" actId="21"/>
           <ac:spMkLst>
@@ -658,6 +698,14 @@
             <ac:spMk id="34" creationId="{048DF5CD-FB80-9439-B968-893335D58712}"/>
           </ac:spMkLst>
         </pc:spChg>
+        <pc:spChg chg="add mod">
+          <ac:chgData name="Fatima Pillosu" userId="a6295d4dc9e22643" providerId="LiveId" clId="{61D033AF-DECF-4E4A-A0E6-FAFF0A02AD4A}" dt="2025-06-27T12:16:18.134" v="3513"/>
+          <ac:spMkLst>
+            <pc:docMk/>
+            <pc:sldMk cId="2412790101" sldId="256"/>
+            <ac:spMk id="34" creationId="{9B01EB53-902C-3FEF-12AF-92C7EBD29C1D}"/>
+          </ac:spMkLst>
+        </pc:spChg>
         <pc:spChg chg="add del mod">
           <ac:chgData name="Fatima Pillosu" userId="a6295d4dc9e22643" providerId="LiveId" clId="{61D033AF-DECF-4E4A-A0E6-FAFF0A02AD4A}" dt="2025-06-26T15:16:46.105" v="1515" actId="478"/>
           <ac:spMkLst>
@@ -666,6 +714,22 @@
             <ac:spMk id="35" creationId="{54625141-5C6E-650D-9DD7-780B07CD621D}"/>
           </ac:spMkLst>
         </pc:spChg>
+        <pc:spChg chg="add mod">
+          <ac:chgData name="Fatima Pillosu" userId="a6295d4dc9e22643" providerId="LiveId" clId="{61D033AF-DECF-4E4A-A0E6-FAFF0A02AD4A}" dt="2025-06-27T12:16:18.134" v="3513"/>
+          <ac:spMkLst>
+            <pc:docMk/>
+            <pc:sldMk cId="2412790101" sldId="256"/>
+            <ac:spMk id="35" creationId="{91E8465F-C483-4093-3158-F91048E66783}"/>
+          </ac:spMkLst>
+        </pc:spChg>
+        <pc:spChg chg="add mod">
+          <ac:chgData name="Fatima Pillosu" userId="a6295d4dc9e22643" providerId="LiveId" clId="{61D033AF-DECF-4E4A-A0E6-FAFF0A02AD4A}" dt="2025-06-27T12:16:18.134" v="3513"/>
+          <ac:spMkLst>
+            <pc:docMk/>
+            <pc:sldMk cId="2412790101" sldId="256"/>
+            <ac:spMk id="36" creationId="{14B4D2FE-6A01-70EE-57E1-D9A209E24C0F}"/>
+          </ac:spMkLst>
+        </pc:spChg>
         <pc:spChg chg="add del mod">
           <ac:chgData name="Fatima Pillosu" userId="a6295d4dc9e22643" providerId="LiveId" clId="{61D033AF-DECF-4E4A-A0E6-FAFF0A02AD4A}" dt="2025-06-26T16:50:18.344" v="3216" actId="21"/>
           <ac:spMkLst>
@@ -682,6 +746,22 @@
             <ac:spMk id="37" creationId="{6FE58704-E40A-B268-7ACF-6EE103269248}"/>
           </ac:spMkLst>
         </pc:spChg>
+        <pc:spChg chg="add mod">
+          <ac:chgData name="Fatima Pillosu" userId="a6295d4dc9e22643" providerId="LiveId" clId="{61D033AF-DECF-4E4A-A0E6-FAFF0A02AD4A}" dt="2025-06-27T12:16:18.134" v="3513"/>
+          <ac:spMkLst>
+            <pc:docMk/>
+            <pc:sldMk cId="2412790101" sldId="256"/>
+            <ac:spMk id="37" creationId="{FACA5D21-1BAA-49AA-7590-BDC05D388114}"/>
+          </ac:spMkLst>
+        </pc:spChg>
+        <pc:spChg chg="add mod">
+          <ac:chgData name="Fatima Pillosu" userId="a6295d4dc9e22643" providerId="LiveId" clId="{61D033AF-DECF-4E4A-A0E6-FAFF0A02AD4A}" dt="2025-06-27T12:16:18.134" v="3513"/>
+          <ac:spMkLst>
+            <pc:docMk/>
+            <pc:sldMk cId="2412790101" sldId="256"/>
+            <ac:spMk id="38" creationId="{5216C86E-60C9-619C-F246-35D203BB2F07}"/>
+          </ac:spMkLst>
+        </pc:spChg>
         <pc:spChg chg="add del mod">
           <ac:chgData name="Fatima Pillosu" userId="a6295d4dc9e22643" providerId="LiveId" clId="{61D033AF-DECF-4E4A-A0E6-FAFF0A02AD4A}" dt="2025-06-26T16:50:18.344" v="3216" actId="21"/>
           <ac:spMkLst>
@@ -698,6 +778,14 @@
             <ac:spMk id="39" creationId="{930869D1-E322-FC45-BA00-86C98ADC3B23}"/>
           </ac:spMkLst>
         </pc:spChg>
+        <pc:spChg chg="add mod">
+          <ac:chgData name="Fatima Pillosu" userId="a6295d4dc9e22643" providerId="LiveId" clId="{61D033AF-DECF-4E4A-A0E6-FAFF0A02AD4A}" dt="2025-06-27T12:16:18.134" v="3513"/>
+          <ac:spMkLst>
+            <pc:docMk/>
+            <pc:sldMk cId="2412790101" sldId="256"/>
+            <ac:spMk id="39" creationId="{A2A0F751-F9A6-3129-E72C-A6BE6A161570}"/>
+          </ac:spMkLst>
+        </pc:spChg>
         <pc:spChg chg="add del mod">
           <ac:chgData name="Fatima Pillosu" userId="a6295d4dc9e22643" providerId="LiveId" clId="{61D033AF-DECF-4E4A-A0E6-FAFF0A02AD4A}" dt="2025-06-26T16:50:18.344" v="3216" actId="21"/>
           <ac:spMkLst>
@@ -706,6 +794,14 @@
             <ac:spMk id="40" creationId="{BD8DD6A2-178B-DB31-2592-FE465B91B968}"/>
           </ac:spMkLst>
         </pc:spChg>
+        <pc:spChg chg="add mod">
+          <ac:chgData name="Fatima Pillosu" userId="a6295d4dc9e22643" providerId="LiveId" clId="{61D033AF-DECF-4E4A-A0E6-FAFF0A02AD4A}" dt="2025-06-27T12:16:18.134" v="3513"/>
+          <ac:spMkLst>
+            <pc:docMk/>
+            <pc:sldMk cId="2412790101" sldId="256"/>
+            <ac:spMk id="40" creationId="{C181FF3B-6AD0-1BE1-4914-0A9CA1D7C4D3}"/>
+          </ac:spMkLst>
+        </pc:spChg>
         <pc:spChg chg="add del mod">
           <ac:chgData name="Fatima Pillosu" userId="a6295d4dc9e22643" providerId="LiveId" clId="{61D033AF-DECF-4E4A-A0E6-FAFF0A02AD4A}" dt="2025-06-26T16:50:18.344" v="3216" actId="21"/>
           <ac:spMkLst>
@@ -714,6 +810,22 @@
             <ac:spMk id="41" creationId="{4F2F5DC6-56FD-AA6B-238F-F1D3E9FEA95A}"/>
           </ac:spMkLst>
         </pc:spChg>
+        <pc:spChg chg="add mod">
+          <ac:chgData name="Fatima Pillosu" userId="a6295d4dc9e22643" providerId="LiveId" clId="{61D033AF-DECF-4E4A-A0E6-FAFF0A02AD4A}" dt="2025-06-27T12:16:18.134" v="3513"/>
+          <ac:spMkLst>
+            <pc:docMk/>
+            <pc:sldMk cId="2412790101" sldId="256"/>
+            <ac:spMk id="41" creationId="{F64F700D-59E2-F229-195C-FCF79FDABACB}"/>
+          </ac:spMkLst>
+        </pc:spChg>
+        <pc:spChg chg="add mod">
+          <ac:chgData name="Fatima Pillosu" userId="a6295d4dc9e22643" providerId="LiveId" clId="{61D033AF-DECF-4E4A-A0E6-FAFF0A02AD4A}" dt="2025-06-27T12:16:18.134" v="3513"/>
+          <ac:spMkLst>
+            <pc:docMk/>
+            <pc:sldMk cId="2412790101" sldId="256"/>
+            <ac:spMk id="42" creationId="{675F66ED-1587-EE2D-7961-3C1CE26DA6A5}"/>
+          </ac:spMkLst>
+        </pc:spChg>
         <pc:spChg chg="add del mod">
           <ac:chgData name="Fatima Pillosu" userId="a6295d4dc9e22643" providerId="LiveId" clId="{61D033AF-DECF-4E4A-A0E6-FAFF0A02AD4A}" dt="2025-06-26T16:50:18.344" v="3216" actId="21"/>
           <ac:spMkLst>
@@ -730,12 +842,84 @@
             <ac:spMk id="43" creationId="{E33BAA42-6AE6-B9C5-7D87-CC1819156847}"/>
           </ac:spMkLst>
         </pc:spChg>
+        <pc:spChg chg="add mod">
+          <ac:chgData name="Fatima Pillosu" userId="a6295d4dc9e22643" providerId="LiveId" clId="{61D033AF-DECF-4E4A-A0E6-FAFF0A02AD4A}" dt="2025-06-27T12:16:18.134" v="3513"/>
+          <ac:spMkLst>
+            <pc:docMk/>
+            <pc:sldMk cId="2412790101" sldId="256"/>
+            <ac:spMk id="43" creationId="{EE073022-3D67-FA36-A6BB-1349696A25C2}"/>
+          </ac:spMkLst>
+        </pc:spChg>
         <pc:spChg chg="add del mod">
           <ac:chgData name="Fatima Pillosu" userId="a6295d4dc9e22643" providerId="LiveId" clId="{61D033AF-DECF-4E4A-A0E6-FAFF0A02AD4A}" dt="2025-06-26T16:50:18.344" v="3216" actId="21"/>
           <ac:spMkLst>
             <pc:docMk/>
             <pc:sldMk cId="2412790101" sldId="256"/>
             <ac:spMk id="44" creationId="{49445F97-EAF9-8864-EB39-A2AABCEDD7FB}"/>
+          </ac:spMkLst>
+        </pc:spChg>
+        <pc:spChg chg="add mod">
+          <ac:chgData name="Fatima Pillosu" userId="a6295d4dc9e22643" providerId="LiveId" clId="{61D033AF-DECF-4E4A-A0E6-FAFF0A02AD4A}" dt="2025-06-27T12:16:18.134" v="3513"/>
+          <ac:spMkLst>
+            <pc:docMk/>
+            <pc:sldMk cId="2412790101" sldId="256"/>
+            <ac:spMk id="44" creationId="{6FE58704-E40A-B268-7ACF-6EE103269248}"/>
+          </ac:spMkLst>
+        </pc:spChg>
+        <pc:spChg chg="add mod">
+          <ac:chgData name="Fatima Pillosu" userId="a6295d4dc9e22643" providerId="LiveId" clId="{61D033AF-DECF-4E4A-A0E6-FAFF0A02AD4A}" dt="2025-06-27T12:16:18.134" v="3513"/>
+          <ac:spMkLst>
+            <pc:docMk/>
+            <pc:sldMk cId="2412790101" sldId="256"/>
+            <ac:spMk id="45" creationId="{92B98603-355D-9B96-6D9F-C8009BB9722A}"/>
+          </ac:spMkLst>
+        </pc:spChg>
+        <pc:spChg chg="add mod">
+          <ac:chgData name="Fatima Pillosu" userId="a6295d4dc9e22643" providerId="LiveId" clId="{61D033AF-DECF-4E4A-A0E6-FAFF0A02AD4A}" dt="2025-06-27T12:16:18.134" v="3513"/>
+          <ac:spMkLst>
+            <pc:docMk/>
+            <pc:sldMk cId="2412790101" sldId="256"/>
+            <ac:spMk id="46" creationId="{930869D1-E322-FC45-BA00-86C98ADC3B23}"/>
+          </ac:spMkLst>
+        </pc:spChg>
+        <pc:spChg chg="add mod">
+          <ac:chgData name="Fatima Pillosu" userId="a6295d4dc9e22643" providerId="LiveId" clId="{61D033AF-DECF-4E4A-A0E6-FAFF0A02AD4A}" dt="2025-06-27T12:16:18.134" v="3513"/>
+          <ac:spMkLst>
+            <pc:docMk/>
+            <pc:sldMk cId="2412790101" sldId="256"/>
+            <ac:spMk id="47" creationId="{BD8DD6A2-178B-DB31-2592-FE465B91B968}"/>
+          </ac:spMkLst>
+        </pc:spChg>
+        <pc:spChg chg="add mod">
+          <ac:chgData name="Fatima Pillosu" userId="a6295d4dc9e22643" providerId="LiveId" clId="{61D033AF-DECF-4E4A-A0E6-FAFF0A02AD4A}" dt="2025-06-27T12:16:18.134" v="3513"/>
+          <ac:spMkLst>
+            <pc:docMk/>
+            <pc:sldMk cId="2412790101" sldId="256"/>
+            <ac:spMk id="48" creationId="{4F2F5DC6-56FD-AA6B-238F-F1D3E9FEA95A}"/>
+          </ac:spMkLst>
+        </pc:spChg>
+        <pc:spChg chg="add mod">
+          <ac:chgData name="Fatima Pillosu" userId="a6295d4dc9e22643" providerId="LiveId" clId="{61D033AF-DECF-4E4A-A0E6-FAFF0A02AD4A}" dt="2025-06-27T12:16:18.134" v="3513"/>
+          <ac:spMkLst>
+            <pc:docMk/>
+            <pc:sldMk cId="2412790101" sldId="256"/>
+            <ac:spMk id="49" creationId="{BF12B402-8ABA-F1A7-0C14-F3F1483ABF5A}"/>
+          </ac:spMkLst>
+        </pc:spChg>
+        <pc:spChg chg="add mod">
+          <ac:chgData name="Fatima Pillosu" userId="a6295d4dc9e22643" providerId="LiveId" clId="{61D033AF-DECF-4E4A-A0E6-FAFF0A02AD4A}" dt="2025-06-27T12:16:18.134" v="3513"/>
+          <ac:spMkLst>
+            <pc:docMk/>
+            <pc:sldMk cId="2412790101" sldId="256"/>
+            <ac:spMk id="50" creationId="{E33BAA42-6AE6-B9C5-7D87-CC1819156847}"/>
+          </ac:spMkLst>
+        </pc:spChg>
+        <pc:spChg chg="add mod">
+          <ac:chgData name="Fatima Pillosu" userId="a6295d4dc9e22643" providerId="LiveId" clId="{61D033AF-DECF-4E4A-A0E6-FAFF0A02AD4A}" dt="2025-06-27T12:16:18.134" v="3513"/>
+          <ac:spMkLst>
+            <pc:docMk/>
+            <pc:sldMk cId="2412790101" sldId="256"/>
+            <ac:spMk id="51" creationId="{49445F97-EAF9-8864-EB39-A2AABCEDD7FB}"/>
           </ac:spMkLst>
         </pc:spChg>
         <pc:spChg chg="add del">
@@ -744,6 +928,14 @@
             <pc:docMk/>
             <pc:sldMk cId="2412790101" sldId="256"/>
             <ac:spMk id="54" creationId="{0F1E5CB8-1DE7-4DAE-1E59-1534AA59581E}"/>
+          </ac:spMkLst>
+        </pc:spChg>
+        <pc:spChg chg="add mod">
+          <ac:chgData name="Fatima Pillosu" userId="a6295d4dc9e22643" providerId="LiveId" clId="{61D033AF-DECF-4E4A-A0E6-FAFF0A02AD4A}" dt="2025-06-27T12:16:18.134" v="3513"/>
+          <ac:spMkLst>
+            <pc:docMk/>
+            <pc:sldMk cId="2412790101" sldId="256"/>
+            <ac:spMk id="55" creationId="{D9841862-2050-5B02-3FBC-54A24536641A}"/>
           </ac:spMkLst>
         </pc:spChg>
         <pc:spChg chg="add del mod">
@@ -1114,36 +1306,44 @@
             <ac:cxnSpMk id="19" creationId="{50849AC7-0405-6E4C-255B-2854D4AC2067}"/>
           </ac:cxnSpMkLst>
         </pc:cxnChg>
-        <pc:cxnChg chg="add mod">
-          <ac:chgData name="Fatima Pillosu" userId="a6295d4dc9e22643" providerId="LiveId" clId="{61D033AF-DECF-4E4A-A0E6-FAFF0A02AD4A}" dt="2025-06-27T05:46:41.828" v="3401" actId="1036"/>
+        <pc:cxnChg chg="add del mod">
+          <ac:chgData name="Fatima Pillosu" userId="a6295d4dc9e22643" providerId="LiveId" clId="{61D033AF-DECF-4E4A-A0E6-FAFF0A02AD4A}" dt="2025-06-27T12:10:45.978" v="3432" actId="478"/>
           <ac:cxnSpMkLst>
             <pc:docMk/>
             <pc:sldMk cId="2412790101" sldId="256"/>
             <ac:cxnSpMk id="25" creationId="{F5B77EE0-1764-73C0-B82D-D5C6872D70F3}"/>
           </ac:cxnSpMkLst>
         </pc:cxnChg>
-        <pc:cxnChg chg="add mod">
-          <ac:chgData name="Fatima Pillosu" userId="a6295d4dc9e22643" providerId="LiveId" clId="{61D033AF-DECF-4E4A-A0E6-FAFF0A02AD4A}" dt="2025-06-27T05:46:41.828" v="3401" actId="1036"/>
+        <pc:cxnChg chg="add del mod">
+          <ac:chgData name="Fatima Pillosu" userId="a6295d4dc9e22643" providerId="LiveId" clId="{61D033AF-DECF-4E4A-A0E6-FAFF0A02AD4A}" dt="2025-06-27T12:15:51.690" v="3511" actId="21"/>
           <ac:cxnSpMkLst>
             <pc:docMk/>
             <pc:sldMk cId="2412790101" sldId="256"/>
             <ac:cxnSpMk id="26" creationId="{B34D1450-8571-CA5B-49E2-E7FF08CBEEA7}"/>
           </ac:cxnSpMkLst>
         </pc:cxnChg>
-        <pc:cxnChg chg="add mod">
-          <ac:chgData name="Fatima Pillosu" userId="a6295d4dc9e22643" providerId="LiveId" clId="{61D033AF-DECF-4E4A-A0E6-FAFF0A02AD4A}" dt="2025-06-27T05:46:41.828" v="3401" actId="1036"/>
+        <pc:cxnChg chg="add del mod">
+          <ac:chgData name="Fatima Pillosu" userId="a6295d4dc9e22643" providerId="LiveId" clId="{61D033AF-DECF-4E4A-A0E6-FAFF0A02AD4A}" dt="2025-06-27T12:15:51.690" v="3511" actId="21"/>
           <ac:cxnSpMkLst>
             <pc:docMk/>
             <pc:sldMk cId="2412790101" sldId="256"/>
             <ac:cxnSpMk id="27" creationId="{EBA96BED-1C2B-2165-A516-69C67FBDEA11}"/>
           </ac:cxnSpMkLst>
         </pc:cxnChg>
-        <pc:cxnChg chg="add mod">
-          <ac:chgData name="Fatima Pillosu" userId="a6295d4dc9e22643" providerId="LiveId" clId="{61D033AF-DECF-4E4A-A0E6-FAFF0A02AD4A}" dt="2025-06-27T05:46:41.828" v="3401" actId="1036"/>
+        <pc:cxnChg chg="add del mod">
+          <ac:chgData name="Fatima Pillosu" userId="a6295d4dc9e22643" providerId="LiveId" clId="{61D033AF-DECF-4E4A-A0E6-FAFF0A02AD4A}" dt="2025-06-27T12:15:51.690" v="3511" actId="21"/>
           <ac:cxnSpMkLst>
             <pc:docMk/>
             <pc:sldMk cId="2412790101" sldId="256"/>
             <ac:cxnSpMk id="28" creationId="{D65539E4-71BB-6DCB-81BC-F16BB93F43F8}"/>
+          </ac:cxnSpMkLst>
+        </pc:cxnChg>
+        <pc:cxnChg chg="add del mod">
+          <ac:chgData name="Fatima Pillosu" userId="a6295d4dc9e22643" providerId="LiveId" clId="{61D033AF-DECF-4E4A-A0E6-FAFF0A02AD4A}" dt="2025-06-27T12:15:51.690" v="3511" actId="21"/>
+          <ac:cxnSpMkLst>
+            <pc:docMk/>
+            <pc:sldMk cId="2412790101" sldId="256"/>
+            <ac:cxnSpMk id="29" creationId="{0A72F057-9E72-400E-8109-69D873A1808C}"/>
           </ac:cxnSpMkLst>
         </pc:cxnChg>
         <pc:cxnChg chg="add del mod">
@@ -1178,6 +1378,38 @@
             <ac:cxnSpMk id="49" creationId="{D65539E4-71BB-6DCB-81BC-F16BB93F43F8}"/>
           </ac:cxnSpMkLst>
         </pc:cxnChg>
+        <pc:cxnChg chg="add mod">
+          <ac:chgData name="Fatima Pillosu" userId="a6295d4dc9e22643" providerId="LiveId" clId="{61D033AF-DECF-4E4A-A0E6-FAFF0A02AD4A}" dt="2025-06-27T12:16:18.134" v="3513"/>
+          <ac:cxnSpMkLst>
+            <pc:docMk/>
+            <pc:sldMk cId="2412790101" sldId="256"/>
+            <ac:cxnSpMk id="52" creationId="{B34D1450-8571-CA5B-49E2-E7FF08CBEEA7}"/>
+          </ac:cxnSpMkLst>
+        </pc:cxnChg>
+        <pc:cxnChg chg="add mod">
+          <ac:chgData name="Fatima Pillosu" userId="a6295d4dc9e22643" providerId="LiveId" clId="{61D033AF-DECF-4E4A-A0E6-FAFF0A02AD4A}" dt="2025-06-27T12:16:18.134" v="3513"/>
+          <ac:cxnSpMkLst>
+            <pc:docMk/>
+            <pc:sldMk cId="2412790101" sldId="256"/>
+            <ac:cxnSpMk id="53" creationId="{EBA96BED-1C2B-2165-A516-69C67FBDEA11}"/>
+          </ac:cxnSpMkLst>
+        </pc:cxnChg>
+        <pc:cxnChg chg="add mod">
+          <ac:chgData name="Fatima Pillosu" userId="a6295d4dc9e22643" providerId="LiveId" clId="{61D033AF-DECF-4E4A-A0E6-FAFF0A02AD4A}" dt="2025-06-27T12:16:18.134" v="3513"/>
+          <ac:cxnSpMkLst>
+            <pc:docMk/>
+            <pc:sldMk cId="2412790101" sldId="256"/>
+            <ac:cxnSpMk id="54" creationId="{D65539E4-71BB-6DCB-81BC-F16BB93F43F8}"/>
+          </ac:cxnSpMkLst>
+        </pc:cxnChg>
+        <pc:cxnChg chg="add mod">
+          <ac:chgData name="Fatima Pillosu" userId="a6295d4dc9e22643" providerId="LiveId" clId="{61D033AF-DECF-4E4A-A0E6-FAFF0A02AD4A}" dt="2025-06-27T12:16:18.134" v="3513"/>
+          <ac:cxnSpMkLst>
+            <pc:docMk/>
+            <pc:sldMk cId="2412790101" sldId="256"/>
+            <ac:cxnSpMk id="56" creationId="{0A72F057-9E72-400E-8109-69D873A1808C}"/>
+          </ac:cxnSpMkLst>
+        </pc:cxnChg>
         <pc:cxnChg chg="add del mod">
           <ac:chgData name="Fatima Pillosu" userId="a6295d4dc9e22643" providerId="LiveId" clId="{61D033AF-DECF-4E4A-A0E6-FAFF0A02AD4A}" dt="2025-06-26T16:51:39.193" v="3231" actId="21"/>
           <ac:cxnSpMkLst>
@@ -1243,6 +1475,280 @@
           </ac:cxnSpMkLst>
         </pc:cxnChg>
       </pc:sldChg>
+      <pc:sldMasterChg chg="modSp modSldLayout">
+        <pc:chgData name="Fatima Pillosu" userId="a6295d4dc9e22643" providerId="LiveId" clId="{61D033AF-DECF-4E4A-A0E6-FAFF0A02AD4A}" dt="2025-06-27T12:16:11.140" v="3512"/>
+        <pc:sldMasterMkLst>
+          <pc:docMk/>
+          <pc:sldMasterMk cId="2426559392" sldId="2147483732"/>
+        </pc:sldMasterMkLst>
+        <pc:spChg chg="mod">
+          <ac:chgData name="Fatima Pillosu" userId="a6295d4dc9e22643" providerId="LiveId" clId="{61D033AF-DECF-4E4A-A0E6-FAFF0A02AD4A}" dt="2025-06-27T12:16:11.140" v="3512"/>
+          <ac:spMkLst>
+            <pc:docMk/>
+            <pc:sldMasterMk cId="2426559392" sldId="2147483732"/>
+            <ac:spMk id="2" creationId="{00000000-0000-0000-0000-000000000000}"/>
+          </ac:spMkLst>
+        </pc:spChg>
+        <pc:spChg chg="mod">
+          <ac:chgData name="Fatima Pillosu" userId="a6295d4dc9e22643" providerId="LiveId" clId="{61D033AF-DECF-4E4A-A0E6-FAFF0A02AD4A}" dt="2025-06-27T12:16:11.140" v="3512"/>
+          <ac:spMkLst>
+            <pc:docMk/>
+            <pc:sldMasterMk cId="2426559392" sldId="2147483732"/>
+            <ac:spMk id="3" creationId="{00000000-0000-0000-0000-000000000000}"/>
+          </ac:spMkLst>
+        </pc:spChg>
+        <pc:spChg chg="mod">
+          <ac:chgData name="Fatima Pillosu" userId="a6295d4dc9e22643" providerId="LiveId" clId="{61D033AF-DECF-4E4A-A0E6-FAFF0A02AD4A}" dt="2025-06-27T12:16:11.140" v="3512"/>
+          <ac:spMkLst>
+            <pc:docMk/>
+            <pc:sldMasterMk cId="2426559392" sldId="2147483732"/>
+            <ac:spMk id="4" creationId="{00000000-0000-0000-0000-000000000000}"/>
+          </ac:spMkLst>
+        </pc:spChg>
+        <pc:spChg chg="mod">
+          <ac:chgData name="Fatima Pillosu" userId="a6295d4dc9e22643" providerId="LiveId" clId="{61D033AF-DECF-4E4A-A0E6-FAFF0A02AD4A}" dt="2025-06-27T12:16:11.140" v="3512"/>
+          <ac:spMkLst>
+            <pc:docMk/>
+            <pc:sldMasterMk cId="2426559392" sldId="2147483732"/>
+            <ac:spMk id="5" creationId="{00000000-0000-0000-0000-000000000000}"/>
+          </ac:spMkLst>
+        </pc:spChg>
+        <pc:spChg chg="mod">
+          <ac:chgData name="Fatima Pillosu" userId="a6295d4dc9e22643" providerId="LiveId" clId="{61D033AF-DECF-4E4A-A0E6-FAFF0A02AD4A}" dt="2025-06-27T12:16:11.140" v="3512"/>
+          <ac:spMkLst>
+            <pc:docMk/>
+            <pc:sldMasterMk cId="2426559392" sldId="2147483732"/>
+            <ac:spMk id="6" creationId="{00000000-0000-0000-0000-000000000000}"/>
+          </ac:spMkLst>
+        </pc:spChg>
+        <pc:sldLayoutChg chg="modSp">
+          <pc:chgData name="Fatima Pillosu" userId="a6295d4dc9e22643" providerId="LiveId" clId="{61D033AF-DECF-4E4A-A0E6-FAFF0A02AD4A}" dt="2025-06-27T12:16:11.140" v="3512"/>
+          <pc:sldLayoutMkLst>
+            <pc:docMk/>
+            <pc:sldMasterMk cId="2426559392" sldId="2147483732"/>
+            <pc:sldLayoutMk cId="3427419639" sldId="2147483733"/>
+          </pc:sldLayoutMkLst>
+          <pc:spChg chg="mod">
+            <ac:chgData name="Fatima Pillosu" userId="a6295d4dc9e22643" providerId="LiveId" clId="{61D033AF-DECF-4E4A-A0E6-FAFF0A02AD4A}" dt="2025-06-27T12:16:11.140" v="3512"/>
+            <ac:spMkLst>
+              <pc:docMk/>
+              <pc:sldMasterMk cId="2426559392" sldId="2147483732"/>
+              <pc:sldLayoutMk cId="3427419639" sldId="2147483733"/>
+              <ac:spMk id="2" creationId="{00000000-0000-0000-0000-000000000000}"/>
+            </ac:spMkLst>
+          </pc:spChg>
+          <pc:spChg chg="mod">
+            <ac:chgData name="Fatima Pillosu" userId="a6295d4dc9e22643" providerId="LiveId" clId="{61D033AF-DECF-4E4A-A0E6-FAFF0A02AD4A}" dt="2025-06-27T12:16:11.140" v="3512"/>
+            <ac:spMkLst>
+              <pc:docMk/>
+              <pc:sldMasterMk cId="2426559392" sldId="2147483732"/>
+              <pc:sldLayoutMk cId="3427419639" sldId="2147483733"/>
+              <ac:spMk id="3" creationId="{00000000-0000-0000-0000-000000000000}"/>
+            </ac:spMkLst>
+          </pc:spChg>
+        </pc:sldLayoutChg>
+        <pc:sldLayoutChg chg="modSp">
+          <pc:chgData name="Fatima Pillosu" userId="a6295d4dc9e22643" providerId="LiveId" clId="{61D033AF-DECF-4E4A-A0E6-FAFF0A02AD4A}" dt="2025-06-27T12:16:11.140" v="3512"/>
+          <pc:sldLayoutMkLst>
+            <pc:docMk/>
+            <pc:sldMasterMk cId="2426559392" sldId="2147483732"/>
+            <pc:sldLayoutMk cId="2446184478" sldId="2147483735"/>
+          </pc:sldLayoutMkLst>
+          <pc:spChg chg="mod">
+            <ac:chgData name="Fatima Pillosu" userId="a6295d4dc9e22643" providerId="LiveId" clId="{61D033AF-DECF-4E4A-A0E6-FAFF0A02AD4A}" dt="2025-06-27T12:16:11.140" v="3512"/>
+            <ac:spMkLst>
+              <pc:docMk/>
+              <pc:sldMasterMk cId="2426559392" sldId="2147483732"/>
+              <pc:sldLayoutMk cId="2446184478" sldId="2147483735"/>
+              <ac:spMk id="2" creationId="{00000000-0000-0000-0000-000000000000}"/>
+            </ac:spMkLst>
+          </pc:spChg>
+          <pc:spChg chg="mod">
+            <ac:chgData name="Fatima Pillosu" userId="a6295d4dc9e22643" providerId="LiveId" clId="{61D033AF-DECF-4E4A-A0E6-FAFF0A02AD4A}" dt="2025-06-27T12:16:11.140" v="3512"/>
+            <ac:spMkLst>
+              <pc:docMk/>
+              <pc:sldMasterMk cId="2426559392" sldId="2147483732"/>
+              <pc:sldLayoutMk cId="2446184478" sldId="2147483735"/>
+              <ac:spMk id="3" creationId="{00000000-0000-0000-0000-000000000000}"/>
+            </ac:spMkLst>
+          </pc:spChg>
+        </pc:sldLayoutChg>
+        <pc:sldLayoutChg chg="modSp">
+          <pc:chgData name="Fatima Pillosu" userId="a6295d4dc9e22643" providerId="LiveId" clId="{61D033AF-DECF-4E4A-A0E6-FAFF0A02AD4A}" dt="2025-06-27T12:16:11.140" v="3512"/>
+          <pc:sldLayoutMkLst>
+            <pc:docMk/>
+            <pc:sldMasterMk cId="2426559392" sldId="2147483732"/>
+            <pc:sldLayoutMk cId="1266478800" sldId="2147483736"/>
+          </pc:sldLayoutMkLst>
+          <pc:spChg chg="mod">
+            <ac:chgData name="Fatima Pillosu" userId="a6295d4dc9e22643" providerId="LiveId" clId="{61D033AF-DECF-4E4A-A0E6-FAFF0A02AD4A}" dt="2025-06-27T12:16:11.140" v="3512"/>
+            <ac:spMkLst>
+              <pc:docMk/>
+              <pc:sldMasterMk cId="2426559392" sldId="2147483732"/>
+              <pc:sldLayoutMk cId="1266478800" sldId="2147483736"/>
+              <ac:spMk id="3" creationId="{00000000-0000-0000-0000-000000000000}"/>
+            </ac:spMkLst>
+          </pc:spChg>
+          <pc:spChg chg="mod">
+            <ac:chgData name="Fatima Pillosu" userId="a6295d4dc9e22643" providerId="LiveId" clId="{61D033AF-DECF-4E4A-A0E6-FAFF0A02AD4A}" dt="2025-06-27T12:16:11.140" v="3512"/>
+            <ac:spMkLst>
+              <pc:docMk/>
+              <pc:sldMasterMk cId="2426559392" sldId="2147483732"/>
+              <pc:sldLayoutMk cId="1266478800" sldId="2147483736"/>
+              <ac:spMk id="4" creationId="{00000000-0000-0000-0000-000000000000}"/>
+            </ac:spMkLst>
+          </pc:spChg>
+        </pc:sldLayoutChg>
+        <pc:sldLayoutChg chg="modSp">
+          <pc:chgData name="Fatima Pillosu" userId="a6295d4dc9e22643" providerId="LiveId" clId="{61D033AF-DECF-4E4A-A0E6-FAFF0A02AD4A}" dt="2025-06-27T12:16:11.140" v="3512"/>
+          <pc:sldLayoutMkLst>
+            <pc:docMk/>
+            <pc:sldMasterMk cId="2426559392" sldId="2147483732"/>
+            <pc:sldLayoutMk cId="848431461" sldId="2147483737"/>
+          </pc:sldLayoutMkLst>
+          <pc:spChg chg="mod">
+            <ac:chgData name="Fatima Pillosu" userId="a6295d4dc9e22643" providerId="LiveId" clId="{61D033AF-DECF-4E4A-A0E6-FAFF0A02AD4A}" dt="2025-06-27T12:16:11.140" v="3512"/>
+            <ac:spMkLst>
+              <pc:docMk/>
+              <pc:sldMasterMk cId="2426559392" sldId="2147483732"/>
+              <pc:sldLayoutMk cId="848431461" sldId="2147483737"/>
+              <ac:spMk id="2" creationId="{00000000-0000-0000-0000-000000000000}"/>
+            </ac:spMkLst>
+          </pc:spChg>
+          <pc:spChg chg="mod">
+            <ac:chgData name="Fatima Pillosu" userId="a6295d4dc9e22643" providerId="LiveId" clId="{61D033AF-DECF-4E4A-A0E6-FAFF0A02AD4A}" dt="2025-06-27T12:16:11.140" v="3512"/>
+            <ac:spMkLst>
+              <pc:docMk/>
+              <pc:sldMasterMk cId="2426559392" sldId="2147483732"/>
+              <pc:sldLayoutMk cId="848431461" sldId="2147483737"/>
+              <ac:spMk id="3" creationId="{00000000-0000-0000-0000-000000000000}"/>
+            </ac:spMkLst>
+          </pc:spChg>
+          <pc:spChg chg="mod">
+            <ac:chgData name="Fatima Pillosu" userId="a6295d4dc9e22643" providerId="LiveId" clId="{61D033AF-DECF-4E4A-A0E6-FAFF0A02AD4A}" dt="2025-06-27T12:16:11.140" v="3512"/>
+            <ac:spMkLst>
+              <pc:docMk/>
+              <pc:sldMasterMk cId="2426559392" sldId="2147483732"/>
+              <pc:sldLayoutMk cId="848431461" sldId="2147483737"/>
+              <ac:spMk id="4" creationId="{00000000-0000-0000-0000-000000000000}"/>
+            </ac:spMkLst>
+          </pc:spChg>
+          <pc:spChg chg="mod">
+            <ac:chgData name="Fatima Pillosu" userId="a6295d4dc9e22643" providerId="LiveId" clId="{61D033AF-DECF-4E4A-A0E6-FAFF0A02AD4A}" dt="2025-06-27T12:16:11.140" v="3512"/>
+            <ac:spMkLst>
+              <pc:docMk/>
+              <pc:sldMasterMk cId="2426559392" sldId="2147483732"/>
+              <pc:sldLayoutMk cId="848431461" sldId="2147483737"/>
+              <ac:spMk id="5" creationId="{00000000-0000-0000-0000-000000000000}"/>
+            </ac:spMkLst>
+          </pc:spChg>
+          <pc:spChg chg="mod">
+            <ac:chgData name="Fatima Pillosu" userId="a6295d4dc9e22643" providerId="LiveId" clId="{61D033AF-DECF-4E4A-A0E6-FAFF0A02AD4A}" dt="2025-06-27T12:16:11.140" v="3512"/>
+            <ac:spMkLst>
+              <pc:docMk/>
+              <pc:sldMasterMk cId="2426559392" sldId="2147483732"/>
+              <pc:sldLayoutMk cId="848431461" sldId="2147483737"/>
+              <ac:spMk id="6" creationId="{00000000-0000-0000-0000-000000000000}"/>
+            </ac:spMkLst>
+          </pc:spChg>
+        </pc:sldLayoutChg>
+        <pc:sldLayoutChg chg="modSp">
+          <pc:chgData name="Fatima Pillosu" userId="a6295d4dc9e22643" providerId="LiveId" clId="{61D033AF-DECF-4E4A-A0E6-FAFF0A02AD4A}" dt="2025-06-27T12:16:11.140" v="3512"/>
+          <pc:sldLayoutMkLst>
+            <pc:docMk/>
+            <pc:sldMasterMk cId="2426559392" sldId="2147483732"/>
+            <pc:sldLayoutMk cId="3205400973" sldId="2147483740"/>
+          </pc:sldLayoutMkLst>
+          <pc:spChg chg="mod">
+            <ac:chgData name="Fatima Pillosu" userId="a6295d4dc9e22643" providerId="LiveId" clId="{61D033AF-DECF-4E4A-A0E6-FAFF0A02AD4A}" dt="2025-06-27T12:16:11.140" v="3512"/>
+            <ac:spMkLst>
+              <pc:docMk/>
+              <pc:sldMasterMk cId="2426559392" sldId="2147483732"/>
+              <pc:sldLayoutMk cId="3205400973" sldId="2147483740"/>
+              <ac:spMk id="2" creationId="{00000000-0000-0000-0000-000000000000}"/>
+            </ac:spMkLst>
+          </pc:spChg>
+          <pc:spChg chg="mod">
+            <ac:chgData name="Fatima Pillosu" userId="a6295d4dc9e22643" providerId="LiveId" clId="{61D033AF-DECF-4E4A-A0E6-FAFF0A02AD4A}" dt="2025-06-27T12:16:11.140" v="3512"/>
+            <ac:spMkLst>
+              <pc:docMk/>
+              <pc:sldMasterMk cId="2426559392" sldId="2147483732"/>
+              <pc:sldLayoutMk cId="3205400973" sldId="2147483740"/>
+              <ac:spMk id="3" creationId="{00000000-0000-0000-0000-000000000000}"/>
+            </ac:spMkLst>
+          </pc:spChg>
+          <pc:spChg chg="mod">
+            <ac:chgData name="Fatima Pillosu" userId="a6295d4dc9e22643" providerId="LiveId" clId="{61D033AF-DECF-4E4A-A0E6-FAFF0A02AD4A}" dt="2025-06-27T12:16:11.140" v="3512"/>
+            <ac:spMkLst>
+              <pc:docMk/>
+              <pc:sldMasterMk cId="2426559392" sldId="2147483732"/>
+              <pc:sldLayoutMk cId="3205400973" sldId="2147483740"/>
+              <ac:spMk id="4" creationId="{00000000-0000-0000-0000-000000000000}"/>
+            </ac:spMkLst>
+          </pc:spChg>
+        </pc:sldLayoutChg>
+        <pc:sldLayoutChg chg="modSp">
+          <pc:chgData name="Fatima Pillosu" userId="a6295d4dc9e22643" providerId="LiveId" clId="{61D033AF-DECF-4E4A-A0E6-FAFF0A02AD4A}" dt="2025-06-27T12:16:11.140" v="3512"/>
+          <pc:sldLayoutMkLst>
+            <pc:docMk/>
+            <pc:sldMasterMk cId="2426559392" sldId="2147483732"/>
+            <pc:sldLayoutMk cId="153824804" sldId="2147483741"/>
+          </pc:sldLayoutMkLst>
+          <pc:spChg chg="mod">
+            <ac:chgData name="Fatima Pillosu" userId="a6295d4dc9e22643" providerId="LiveId" clId="{61D033AF-DECF-4E4A-A0E6-FAFF0A02AD4A}" dt="2025-06-27T12:16:11.140" v="3512"/>
+            <ac:spMkLst>
+              <pc:docMk/>
+              <pc:sldMasterMk cId="2426559392" sldId="2147483732"/>
+              <pc:sldLayoutMk cId="153824804" sldId="2147483741"/>
+              <ac:spMk id="2" creationId="{00000000-0000-0000-0000-000000000000}"/>
+            </ac:spMkLst>
+          </pc:spChg>
+          <pc:spChg chg="mod">
+            <ac:chgData name="Fatima Pillosu" userId="a6295d4dc9e22643" providerId="LiveId" clId="{61D033AF-DECF-4E4A-A0E6-FAFF0A02AD4A}" dt="2025-06-27T12:16:11.140" v="3512"/>
+            <ac:spMkLst>
+              <pc:docMk/>
+              <pc:sldMasterMk cId="2426559392" sldId="2147483732"/>
+              <pc:sldLayoutMk cId="153824804" sldId="2147483741"/>
+              <ac:spMk id="3" creationId="{00000000-0000-0000-0000-000000000000}"/>
+            </ac:spMkLst>
+          </pc:spChg>
+          <pc:spChg chg="mod">
+            <ac:chgData name="Fatima Pillosu" userId="a6295d4dc9e22643" providerId="LiveId" clId="{61D033AF-DECF-4E4A-A0E6-FAFF0A02AD4A}" dt="2025-06-27T12:16:11.140" v="3512"/>
+            <ac:spMkLst>
+              <pc:docMk/>
+              <pc:sldMasterMk cId="2426559392" sldId="2147483732"/>
+              <pc:sldLayoutMk cId="153824804" sldId="2147483741"/>
+              <ac:spMk id="4" creationId="{00000000-0000-0000-0000-000000000000}"/>
+            </ac:spMkLst>
+          </pc:spChg>
+        </pc:sldLayoutChg>
+        <pc:sldLayoutChg chg="modSp">
+          <pc:chgData name="Fatima Pillosu" userId="a6295d4dc9e22643" providerId="LiveId" clId="{61D033AF-DECF-4E4A-A0E6-FAFF0A02AD4A}" dt="2025-06-27T12:16:11.140" v="3512"/>
+          <pc:sldLayoutMkLst>
+            <pc:docMk/>
+            <pc:sldMasterMk cId="2426559392" sldId="2147483732"/>
+            <pc:sldLayoutMk cId="1935129454" sldId="2147483743"/>
+          </pc:sldLayoutMkLst>
+          <pc:spChg chg="mod">
+            <ac:chgData name="Fatima Pillosu" userId="a6295d4dc9e22643" providerId="LiveId" clId="{61D033AF-DECF-4E4A-A0E6-FAFF0A02AD4A}" dt="2025-06-27T12:16:11.140" v="3512"/>
+            <ac:spMkLst>
+              <pc:docMk/>
+              <pc:sldMasterMk cId="2426559392" sldId="2147483732"/>
+              <pc:sldLayoutMk cId="1935129454" sldId="2147483743"/>
+              <ac:spMk id="2" creationId="{00000000-0000-0000-0000-000000000000}"/>
+            </ac:spMkLst>
+          </pc:spChg>
+          <pc:spChg chg="mod">
+            <ac:chgData name="Fatima Pillosu" userId="a6295d4dc9e22643" providerId="LiveId" clId="{61D033AF-DECF-4E4A-A0E6-FAFF0A02AD4A}" dt="2025-06-27T12:16:11.140" v="3512"/>
+            <ac:spMkLst>
+              <pc:docMk/>
+              <pc:sldMasterMk cId="2426559392" sldId="2147483732"/>
+              <pc:sldLayoutMk cId="1935129454" sldId="2147483743"/>
+              <ac:spMk id="3" creationId="{00000000-0000-0000-0000-000000000000}"/>
+            </ac:spMkLst>
+          </pc:spChg>
+        </pc:sldLayoutChg>
+      </pc:sldMasterChg>
     </pc:docChg>
   </pc:docChgLst>
 </pc:chgInfo>
@@ -1348,8 +1854,8 @@
         </p:nvSpPr>
         <p:spPr>
           <a:xfrm>
-            <a:off x="2360613" y="1143000"/>
-            <a:ext cx="2136775" cy="3086100"/>
+            <a:off x="2390775" y="1143000"/>
+            <a:ext cx="2076450" cy="3086100"/>
           </a:xfrm>
           <a:prstGeom prst="rect">
             <a:avLst/>
@@ -1627,8 +2133,8 @@
         </p:nvSpPr>
         <p:spPr>
           <a:xfrm>
-            <a:off x="2360613" y="1143000"/>
-            <a:ext cx="2136775" cy="3086100"/>
+            <a:off x="2390775" y="1143000"/>
+            <a:ext cx="2076450" cy="3086100"/>
           </a:xfrm>
         </p:spPr>
       </p:sp>
@@ -1716,8 +2222,8 @@
         </p:nvSpPr>
         <p:spPr>
           <a:xfrm>
-            <a:off x="310515" y="977911"/>
-            <a:ext cx="3519170" cy="2080307"/>
+            <a:off x="310515" y="1007529"/>
+            <a:ext cx="3519170" cy="2143313"/>
           </a:xfrm>
         </p:spPr>
         <p:txBody>
@@ -1748,8 +2254,8 @@
         </p:nvSpPr>
         <p:spPr>
           <a:xfrm>
-            <a:off x="517525" y="3138443"/>
-            <a:ext cx="3105150" cy="1442659"/>
+            <a:off x="517525" y="3233496"/>
+            <a:ext cx="3105150" cy="1486353"/>
           </a:xfrm>
         </p:spPr>
         <p:txBody>
@@ -1869,7 +2375,7 @@
     </p:spTree>
     <p:extLst>
       <p:ext uri="{BB962C8B-B14F-4D97-AF65-F5344CB8AC3E}">
-        <p14:creationId xmlns:p14="http://schemas.microsoft.com/office/powerpoint/2010/main" val="3427419639"/>
+        <p14:creationId xmlns:p14="http://schemas.microsoft.com/office/powerpoint/2010/main" val="2840409469"/>
       </p:ext>
     </p:extLst>
   </p:cSld>
@@ -2039,7 +2545,7 @@
     </p:spTree>
     <p:extLst>
       <p:ext uri="{BB962C8B-B14F-4D97-AF65-F5344CB8AC3E}">
-        <p14:creationId xmlns:p14="http://schemas.microsoft.com/office/powerpoint/2010/main" val="4008702703"/>
+        <p14:creationId xmlns:p14="http://schemas.microsoft.com/office/powerpoint/2010/main" val="871005892"/>
       </p:ext>
     </p:extLst>
   </p:cSld>
@@ -2078,8 +2584,8 @@
         </p:nvSpPr>
         <p:spPr>
           <a:xfrm>
-            <a:off x="2962831" y="318132"/>
-            <a:ext cx="892731" cy="5063833"/>
+            <a:off x="2962831" y="327767"/>
+            <a:ext cx="892731" cy="5217201"/>
           </a:xfrm>
         </p:spPr>
         <p:txBody>
@@ -2106,8 +2612,8 @@
         </p:nvSpPr>
         <p:spPr>
           <a:xfrm>
-            <a:off x="284639" y="318132"/>
-            <a:ext cx="2626439" cy="5063833"/>
+            <a:off x="284639" y="327767"/>
+            <a:ext cx="2626439" cy="5217201"/>
           </a:xfrm>
         </p:spPr>
         <p:txBody>
@@ -2219,7 +2725,7 @@
     </p:spTree>
     <p:extLst>
       <p:ext uri="{BB962C8B-B14F-4D97-AF65-F5344CB8AC3E}">
-        <p14:creationId xmlns:p14="http://schemas.microsoft.com/office/powerpoint/2010/main" val="1935129454"/>
+        <p14:creationId xmlns:p14="http://schemas.microsoft.com/office/powerpoint/2010/main" val="2247324097"/>
       </p:ext>
     </p:extLst>
   </p:cSld>
@@ -2389,7 +2895,7 @@
     </p:spTree>
     <p:extLst>
       <p:ext uri="{BB962C8B-B14F-4D97-AF65-F5344CB8AC3E}">
-        <p14:creationId xmlns:p14="http://schemas.microsoft.com/office/powerpoint/2010/main" val="599031406"/>
+        <p14:creationId xmlns:p14="http://schemas.microsoft.com/office/powerpoint/2010/main" val="4287827184"/>
       </p:ext>
     </p:extLst>
   </p:cSld>
@@ -2428,8 +2934,8 @@
         </p:nvSpPr>
         <p:spPr>
           <a:xfrm>
-            <a:off x="282482" y="1489690"/>
-            <a:ext cx="3570923" cy="2485579"/>
+            <a:off x="282482" y="1534808"/>
+            <a:ext cx="3570923" cy="2560860"/>
           </a:xfrm>
         </p:spPr>
         <p:txBody>
@@ -2460,8 +2966,8 @@
         </p:nvSpPr>
         <p:spPr>
           <a:xfrm>
-            <a:off x="282482" y="3998784"/>
-            <a:ext cx="3570923" cy="1307107"/>
+            <a:off x="282482" y="4119894"/>
+            <a:ext cx="3570923" cy="1346696"/>
           </a:xfrm>
         </p:spPr>
         <p:txBody>
@@ -2635,7 +3141,7 @@
     </p:spTree>
     <p:extLst>
       <p:ext uri="{BB962C8B-B14F-4D97-AF65-F5344CB8AC3E}">
-        <p14:creationId xmlns:p14="http://schemas.microsoft.com/office/powerpoint/2010/main" val="2446184478"/>
+        <p14:creationId xmlns:p14="http://schemas.microsoft.com/office/powerpoint/2010/main" val="3692140293"/>
       </p:ext>
     </p:extLst>
   </p:cSld>
@@ -2697,8 +3203,8 @@
         </p:nvSpPr>
         <p:spPr>
           <a:xfrm>
-            <a:off x="284639" y="1590660"/>
-            <a:ext cx="1759585" cy="3791305"/>
+            <a:off x="284639" y="1638836"/>
+            <a:ext cx="1759585" cy="3906132"/>
           </a:xfrm>
         </p:spPr>
         <p:txBody>
@@ -2754,8 +3260,8 @@
         </p:nvSpPr>
         <p:spPr>
           <a:xfrm>
-            <a:off x="2095976" y="1590660"/>
-            <a:ext cx="1759585" cy="3791305"/>
+            <a:off x="2095976" y="1638836"/>
+            <a:ext cx="1759585" cy="3906132"/>
           </a:xfrm>
         </p:spPr>
         <p:txBody>
@@ -2867,7 +3373,7 @@
     </p:spTree>
     <p:extLst>
       <p:ext uri="{BB962C8B-B14F-4D97-AF65-F5344CB8AC3E}">
-        <p14:creationId xmlns:p14="http://schemas.microsoft.com/office/powerpoint/2010/main" val="1266478800"/>
+        <p14:creationId xmlns:p14="http://schemas.microsoft.com/office/powerpoint/2010/main" val="1627683255"/>
       </p:ext>
     </p:extLst>
   </p:cSld>
@@ -2906,8 +3412,8 @@
         </p:nvSpPr>
         <p:spPr>
           <a:xfrm>
-            <a:off x="285178" y="318133"/>
-            <a:ext cx="3570923" cy="1154958"/>
+            <a:off x="285178" y="327769"/>
+            <a:ext cx="3570923" cy="1189938"/>
           </a:xfrm>
         </p:spPr>
         <p:txBody>
@@ -2934,8 +3440,8 @@
         </p:nvSpPr>
         <p:spPr>
           <a:xfrm>
-            <a:off x="285179" y="1464791"/>
-            <a:ext cx="1751498" cy="717871"/>
+            <a:off x="285179" y="1509155"/>
+            <a:ext cx="1751498" cy="739614"/>
           </a:xfrm>
         </p:spPr>
         <p:txBody>
@@ -2999,8 +3505,8 @@
         </p:nvSpPr>
         <p:spPr>
           <a:xfrm>
-            <a:off x="285179" y="2182663"/>
-            <a:ext cx="1751498" cy="3210368"/>
+            <a:off x="285179" y="2248769"/>
+            <a:ext cx="1751498" cy="3307600"/>
           </a:xfrm>
         </p:spPr>
         <p:txBody>
@@ -3056,8 +3562,8 @@
         </p:nvSpPr>
         <p:spPr>
           <a:xfrm>
-            <a:off x="2095977" y="1464791"/>
-            <a:ext cx="1760124" cy="717871"/>
+            <a:off x="2095977" y="1509155"/>
+            <a:ext cx="1760124" cy="739614"/>
           </a:xfrm>
         </p:spPr>
         <p:txBody>
@@ -3121,8 +3627,8 @@
         </p:nvSpPr>
         <p:spPr>
           <a:xfrm>
-            <a:off x="2095977" y="2182663"/>
-            <a:ext cx="1760124" cy="3210368"/>
+            <a:off x="2095977" y="2248769"/>
+            <a:ext cx="1760124" cy="3307600"/>
           </a:xfrm>
         </p:spPr>
         <p:txBody>
@@ -3234,7 +3740,7 @@
     </p:spTree>
     <p:extLst>
       <p:ext uri="{BB962C8B-B14F-4D97-AF65-F5344CB8AC3E}">
-        <p14:creationId xmlns:p14="http://schemas.microsoft.com/office/powerpoint/2010/main" val="848431461"/>
+        <p14:creationId xmlns:p14="http://schemas.microsoft.com/office/powerpoint/2010/main" val="3811490411"/>
       </p:ext>
     </p:extLst>
   </p:cSld>
@@ -3352,7 +3858,7 @@
     </p:spTree>
     <p:extLst>
       <p:ext uri="{BB962C8B-B14F-4D97-AF65-F5344CB8AC3E}">
-        <p14:creationId xmlns:p14="http://schemas.microsoft.com/office/powerpoint/2010/main" val="3103456263"/>
+        <p14:creationId xmlns:p14="http://schemas.microsoft.com/office/powerpoint/2010/main" val="1897659722"/>
       </p:ext>
     </p:extLst>
   </p:cSld>
@@ -3447,7 +3953,7 @@
     </p:spTree>
     <p:extLst>
       <p:ext uri="{BB962C8B-B14F-4D97-AF65-F5344CB8AC3E}">
-        <p14:creationId xmlns:p14="http://schemas.microsoft.com/office/powerpoint/2010/main" val="3149528862"/>
+        <p14:creationId xmlns:p14="http://schemas.microsoft.com/office/powerpoint/2010/main" val="2502266973"/>
       </p:ext>
     </p:extLst>
   </p:cSld>
@@ -3486,8 +3992,8 @@
         </p:nvSpPr>
         <p:spPr>
           <a:xfrm>
-            <a:off x="285178" y="398357"/>
-            <a:ext cx="1335322" cy="1394248"/>
+            <a:off x="285178" y="410422"/>
+            <a:ext cx="1335322" cy="1436476"/>
           </a:xfrm>
         </p:spPr>
         <p:txBody>
@@ -3518,8 +4024,8 @@
         </p:nvSpPr>
         <p:spPr>
           <a:xfrm>
-            <a:off x="1760124" y="860341"/>
-            <a:ext cx="2095976" cy="4246371"/>
+            <a:off x="1760124" y="886398"/>
+            <a:ext cx="2095976" cy="4374981"/>
           </a:xfrm>
         </p:spPr>
         <p:txBody>
@@ -3603,8 +4109,8 @@
         </p:nvSpPr>
         <p:spPr>
           <a:xfrm>
-            <a:off x="285178" y="1792605"/>
-            <a:ext cx="1335322" cy="3321023"/>
+            <a:off x="285178" y="1846898"/>
+            <a:ext cx="1335322" cy="3421606"/>
           </a:xfrm>
         </p:spPr>
         <p:txBody>
@@ -3724,7 +4230,7 @@
     </p:spTree>
     <p:extLst>
       <p:ext uri="{BB962C8B-B14F-4D97-AF65-F5344CB8AC3E}">
-        <p14:creationId xmlns:p14="http://schemas.microsoft.com/office/powerpoint/2010/main" val="3205400973"/>
+        <p14:creationId xmlns:p14="http://schemas.microsoft.com/office/powerpoint/2010/main" val="2676274483"/>
       </p:ext>
     </p:extLst>
   </p:cSld>
@@ -3763,8 +4269,8 @@
         </p:nvSpPr>
         <p:spPr>
           <a:xfrm>
-            <a:off x="285178" y="398357"/>
-            <a:ext cx="1335322" cy="1394248"/>
+            <a:off x="285178" y="410422"/>
+            <a:ext cx="1335322" cy="1436476"/>
           </a:xfrm>
         </p:spPr>
         <p:txBody>
@@ -3795,8 +4301,8 @@
         </p:nvSpPr>
         <p:spPr>
           <a:xfrm>
-            <a:off x="1760124" y="860341"/>
-            <a:ext cx="2095976" cy="4246371"/>
+            <a:off x="1760124" y="886398"/>
+            <a:ext cx="2095976" cy="4374981"/>
           </a:xfrm>
         </p:spPr>
         <p:txBody>
@@ -3860,8 +4366,8 @@
         </p:nvSpPr>
         <p:spPr>
           <a:xfrm>
-            <a:off x="285178" y="1792605"/>
-            <a:ext cx="1335322" cy="3321023"/>
+            <a:off x="285178" y="1846898"/>
+            <a:ext cx="1335322" cy="3421606"/>
           </a:xfrm>
         </p:spPr>
         <p:txBody>
@@ -3981,7 +4487,7 @@
     </p:spTree>
     <p:extLst>
       <p:ext uri="{BB962C8B-B14F-4D97-AF65-F5344CB8AC3E}">
-        <p14:creationId xmlns:p14="http://schemas.microsoft.com/office/powerpoint/2010/main" val="153824804"/>
+        <p14:creationId xmlns:p14="http://schemas.microsoft.com/office/powerpoint/2010/main" val="3842344399"/>
       </p:ext>
     </p:extLst>
   </p:cSld>
@@ -4025,8 +4531,8 @@
         </p:nvSpPr>
         <p:spPr>
           <a:xfrm>
-            <a:off x="284639" y="318133"/>
-            <a:ext cx="3570923" cy="1154958"/>
+            <a:off x="284639" y="327769"/>
+            <a:ext cx="3570923" cy="1189938"/>
           </a:xfrm>
           <a:prstGeom prst="rect">
             <a:avLst/>
@@ -4058,8 +4564,8 @@
         </p:nvSpPr>
         <p:spPr>
           <a:xfrm>
-            <a:off x="284639" y="1590660"/>
-            <a:ext cx="3570923" cy="3791305"/>
+            <a:off x="284639" y="1638836"/>
+            <a:ext cx="3570923" cy="3906132"/>
           </a:xfrm>
           <a:prstGeom prst="rect">
             <a:avLst/>
@@ -4120,8 +4626,8 @@
         </p:nvSpPr>
         <p:spPr>
           <a:xfrm>
-            <a:off x="284639" y="5538266"/>
-            <a:ext cx="931545" cy="318132"/>
+            <a:off x="284639" y="5706003"/>
+            <a:ext cx="931545" cy="327767"/>
           </a:xfrm>
           <a:prstGeom prst="rect">
             <a:avLst/>
@@ -4161,8 +4667,8 @@
         </p:nvSpPr>
         <p:spPr>
           <a:xfrm>
-            <a:off x="1371441" y="5538266"/>
-            <a:ext cx="1397318" cy="318132"/>
+            <a:off x="1371441" y="5706003"/>
+            <a:ext cx="1397318" cy="327767"/>
           </a:xfrm>
           <a:prstGeom prst="rect">
             <a:avLst/>
@@ -4198,8 +4704,8 @@
         </p:nvSpPr>
         <p:spPr>
           <a:xfrm>
-            <a:off x="2924016" y="5538266"/>
-            <a:ext cx="931545" cy="318132"/>
+            <a:off x="2924016" y="5706003"/>
+            <a:ext cx="931545" cy="327767"/>
           </a:xfrm>
           <a:prstGeom prst="rect">
             <a:avLst/>
@@ -4230,23 +4736,23 @@
     </p:spTree>
     <p:extLst>
       <p:ext uri="{BB962C8B-B14F-4D97-AF65-F5344CB8AC3E}">
-        <p14:creationId xmlns:p14="http://schemas.microsoft.com/office/powerpoint/2010/main" val="2426559392"/>
+        <p14:creationId xmlns:p14="http://schemas.microsoft.com/office/powerpoint/2010/main" val="20919327"/>
       </p:ext>
     </p:extLst>
   </p:cSld>
   <p:clrMap bg1="lt1" tx1="dk1" bg2="lt2" tx2="dk2" accent1="accent1" accent2="accent2" accent3="accent3" accent4="accent4" accent5="accent5" accent6="accent6" hlink="hlink" folHlink="folHlink"/>
   <p:sldLayoutIdLst>
-    <p:sldLayoutId id="2147483733" r:id="rId1"/>
-    <p:sldLayoutId id="2147483734" r:id="rId2"/>
-    <p:sldLayoutId id="2147483735" r:id="rId3"/>
-    <p:sldLayoutId id="2147483736" r:id="rId4"/>
-    <p:sldLayoutId id="2147483737" r:id="rId5"/>
-    <p:sldLayoutId id="2147483738" r:id="rId6"/>
-    <p:sldLayoutId id="2147483739" r:id="rId7"/>
-    <p:sldLayoutId id="2147483740" r:id="rId8"/>
-    <p:sldLayoutId id="2147483741" r:id="rId9"/>
-    <p:sldLayoutId id="2147483742" r:id="rId10"/>
-    <p:sldLayoutId id="2147483743" r:id="rId11"/>
+    <p:sldLayoutId id="2147483745" r:id="rId1"/>
+    <p:sldLayoutId id="2147483746" r:id="rId2"/>
+    <p:sldLayoutId id="2147483747" r:id="rId3"/>
+    <p:sldLayoutId id="2147483748" r:id="rId4"/>
+    <p:sldLayoutId id="2147483749" r:id="rId5"/>
+    <p:sldLayoutId id="2147483750" r:id="rId6"/>
+    <p:sldLayoutId id="2147483751" r:id="rId7"/>
+    <p:sldLayoutId id="2147483752" r:id="rId8"/>
+    <p:sldLayoutId id="2147483753" r:id="rId9"/>
+    <p:sldLayoutId id="2147483754" r:id="rId10"/>
+    <p:sldLayoutId id="2147483755" r:id="rId11"/>
   </p:sldLayoutIdLst>
   <p:txStyles>
     <p:titleStyle>
@@ -4550,7 +5056,7 @@
       </p:grpSpPr>
       <p:sp>
         <p:nvSpPr>
-          <p:cNvPr id="3" name="TextBox 2">
+          <p:cNvPr id="31" name="TextBox 30">
             <a:extLst>
               <a:ext uri="{FF2B5EF4-FFF2-40B4-BE49-F238E27FC236}">
                 <a16:creationId xmlns:a16="http://schemas.microsoft.com/office/drawing/2014/main" id="{F0379129-0B4C-9E6E-3C06-018694AD7810}"/>
@@ -4562,7 +5068,7 @@
         </p:nvSpPr>
         <p:spPr>
           <a:xfrm>
-            <a:off x="334131" y="852359"/>
+            <a:off x="334131" y="945964"/>
             <a:ext cx="1075362" cy="338554"/>
           </a:xfrm>
           <a:prstGeom prst="rect">
@@ -4599,7 +5105,7 @@
       </p:sp>
       <p:sp>
         <p:nvSpPr>
-          <p:cNvPr id="4" name="TextBox 3">
+          <p:cNvPr id="32" name="TextBox 31">
             <a:extLst>
               <a:ext uri="{FF2B5EF4-FFF2-40B4-BE49-F238E27FC236}">
                 <a16:creationId xmlns:a16="http://schemas.microsoft.com/office/drawing/2014/main" id="{270F2959-BD8B-2196-95FB-8D47C2F8DFEE}"/>
@@ -4611,7 +5117,7 @@
         </p:nvSpPr>
         <p:spPr>
           <a:xfrm>
-            <a:off x="1294576" y="5376587"/>
+            <a:off x="1294576" y="5544227"/>
             <a:ext cx="2883344" cy="461665"/>
           </a:xfrm>
           <a:prstGeom prst="rect">
@@ -4641,7 +5147,7 @@
       </p:sp>
       <p:sp>
         <p:nvSpPr>
-          <p:cNvPr id="5" name="TextBox 4">
+          <p:cNvPr id="33" name="TextBox 32">
             <a:extLst>
               <a:ext uri="{FF2B5EF4-FFF2-40B4-BE49-F238E27FC236}">
                 <a16:creationId xmlns:a16="http://schemas.microsoft.com/office/drawing/2014/main" id="{062ED1AE-086B-DAEA-D664-FB6D28F48278}"/>
@@ -4653,8 +5159,8 @@
         </p:nvSpPr>
         <p:spPr>
           <a:xfrm>
-            <a:off x="-81390" y="-60223"/>
-            <a:ext cx="4319282" cy="430887"/>
+            <a:off x="-81391" y="-60223"/>
+            <a:ext cx="4479969" cy="430887"/>
           </a:xfrm>
           <a:prstGeom prst="rect">
             <a:avLst/>
@@ -4687,7 +5193,7 @@
                 <a:latin typeface="Calibri Light" panose="020F0302020204030204" pitchFamily="34" charset="0"/>
                 <a:cs typeface="Calibri Light" panose="020F0302020204030204" pitchFamily="34" charset="0"/>
               </a:rPr>
-              <a:t>Data processing and methods used for objective/subjective verification </a:t>
+              <a:t>Objective verification, including data processing (DP), and subjective verification </a:t>
             </a:r>
             <a:endParaRPr lang="en-GB" sz="1000" dirty="0">
               <a:solidFill>
@@ -4701,49 +5207,7 @@
       </p:sp>
       <p:sp>
         <p:nvSpPr>
-          <p:cNvPr id="6" name="TextBox 5">
-            <a:extLst>
-              <a:ext uri="{FF2B5EF4-FFF2-40B4-BE49-F238E27FC236}">
-                <a16:creationId xmlns:a16="http://schemas.microsoft.com/office/drawing/2014/main" id="{FB5C892E-DCD3-8B9E-2922-1E95ED9097F3}"/>
-              </a:ext>
-            </a:extLst>
-          </p:cNvPr>
-          <p:cNvSpPr txBox="1"/>
-          <p:nvPr/>
-        </p:nvSpPr>
-        <p:spPr>
-          <a:xfrm>
-            <a:off x="-104016" y="1127896"/>
-            <a:ext cx="307777" cy="2495603"/>
-          </a:xfrm>
-          <a:prstGeom prst="rect">
-            <a:avLst/>
-          </a:prstGeom>
-          <a:noFill/>
-        </p:spPr>
-        <p:txBody>
-          <a:bodyPr vert="vert270" wrap="square" rtlCol="0">
-            <a:spAutoFit/>
-          </a:bodyPr>
-          <a:lstStyle/>
-          <a:p>
-            <a:pPr algn="ctr"/>
-            <a:r>
-              <a:rPr lang="en-GB" sz="800" b="1" dirty="0">
-                <a:solidFill>
-                  <a:srgbClr val="222222"/>
-                </a:solidFill>
-                <a:latin typeface="Calibri" panose="020F0502020204030204" pitchFamily="34" charset="0"/>
-                <a:cs typeface="Calibri" panose="020F0502020204030204" pitchFamily="34" charset="0"/>
-              </a:rPr>
-              <a:t>DATA PROCESSING</a:t>
-            </a:r>
-          </a:p>
-        </p:txBody>
-      </p:sp>
-      <p:sp>
-        <p:nvSpPr>
-          <p:cNvPr id="7" name="Rectangle 6">
+          <p:cNvPr id="34" name="Rectangle 33">
             <a:extLst>
               <a:ext uri="{FF2B5EF4-FFF2-40B4-BE49-F238E27FC236}">
                 <a16:creationId xmlns:a16="http://schemas.microsoft.com/office/drawing/2014/main" id="{9B01EB53-902C-3FEF-12AF-92C7EBD29C1D}"/>
@@ -4818,7 +5282,7 @@
       </p:sp>
       <p:sp>
         <p:nvSpPr>
-          <p:cNvPr id="8" name="Rectangle 7">
+          <p:cNvPr id="35" name="Rectangle 34">
             <a:extLst>
               <a:ext uri="{FF2B5EF4-FFF2-40B4-BE49-F238E27FC236}">
                 <a16:creationId xmlns:a16="http://schemas.microsoft.com/office/drawing/2014/main" id="{91E8465F-C483-4093-3158-F91048E66783}"/>
@@ -4889,7 +5353,7 @@
       </p:sp>
       <p:sp>
         <p:nvSpPr>
-          <p:cNvPr id="9" name="Rectangle 8">
+          <p:cNvPr id="36" name="Rectangle 35">
             <a:extLst>
               <a:ext uri="{FF2B5EF4-FFF2-40B4-BE49-F238E27FC236}">
                 <a16:creationId xmlns:a16="http://schemas.microsoft.com/office/drawing/2014/main" id="{14B4D2FE-6A01-70EE-57E1-D9A209E24C0F}"/>
@@ -4960,7 +5424,7 @@
       </p:sp>
       <p:sp>
         <p:nvSpPr>
-          <p:cNvPr id="10" name="Rectangle 9">
+          <p:cNvPr id="37" name="Rectangle 36">
             <a:extLst>
               <a:ext uri="{FF2B5EF4-FFF2-40B4-BE49-F238E27FC236}">
                 <a16:creationId xmlns:a16="http://schemas.microsoft.com/office/drawing/2014/main" id="{FACA5D21-1BAA-49AA-7590-BDC05D388114}"/>
@@ -5031,7 +5495,7 @@
       </p:sp>
       <p:sp>
         <p:nvSpPr>
-          <p:cNvPr id="11" name="Rectangle 10">
+          <p:cNvPr id="38" name="Rectangle 37">
             <a:extLst>
               <a:ext uri="{FF2B5EF4-FFF2-40B4-BE49-F238E27FC236}">
                 <a16:creationId xmlns:a16="http://schemas.microsoft.com/office/drawing/2014/main" id="{5216C86E-60C9-619C-F246-35D203BB2F07}"/>
@@ -5106,7 +5570,7 @@
       </p:sp>
       <p:sp>
         <p:nvSpPr>
-          <p:cNvPr id="12" name="TextBox 11">
+          <p:cNvPr id="39" name="TextBox 38">
             <a:extLst>
               <a:ext uri="{FF2B5EF4-FFF2-40B4-BE49-F238E27FC236}">
                 <a16:creationId xmlns:a16="http://schemas.microsoft.com/office/drawing/2014/main" id="{A2A0F751-F9A6-3129-E72C-A6BE6A161570}"/>
@@ -5118,8 +5582,8 @@
         </p:nvSpPr>
         <p:spPr>
           <a:xfrm>
-            <a:off x="31039" y="852359"/>
-            <a:ext cx="430887" cy="338554"/>
+            <a:off x="31337" y="856018"/>
+            <a:ext cx="430887" cy="518447"/>
           </a:xfrm>
           <a:prstGeom prst="rect">
             <a:avLst/>
@@ -5141,7 +5605,7 @@
                 <a:latin typeface="Calibri" panose="020F0502020204030204" pitchFamily="34" charset="0"/>
                 <a:cs typeface="Calibri" panose="020F0502020204030204" pitchFamily="34" charset="0"/>
               </a:rPr>
-              <a:t>Input </a:t>
+              <a:t>DP: Input </a:t>
             </a:r>
           </a:p>
           <a:p>
@@ -5168,7 +5632,7 @@
       </p:sp>
       <p:sp>
         <p:nvSpPr>
-          <p:cNvPr id="13" name="TextBox 12">
+          <p:cNvPr id="40" name="TextBox 39">
             <a:extLst>
               <a:ext uri="{FF2B5EF4-FFF2-40B4-BE49-F238E27FC236}">
                 <a16:creationId xmlns:a16="http://schemas.microsoft.com/office/drawing/2014/main" id="{C181FF3B-6AD0-1BE1-4914-0A9CA1D7C4D3}"/>
@@ -5180,7 +5644,7 @@
         </p:nvSpPr>
         <p:spPr>
           <a:xfrm>
-            <a:off x="1363545" y="852359"/>
+            <a:off x="1363545" y="945964"/>
             <a:ext cx="896322" cy="338554"/>
           </a:xfrm>
           <a:prstGeom prst="rect">
@@ -5217,7 +5681,7 @@
       </p:sp>
       <p:sp>
         <p:nvSpPr>
-          <p:cNvPr id="14" name="TextBox 13">
+          <p:cNvPr id="41" name="TextBox 40">
             <a:extLst>
               <a:ext uri="{FF2B5EF4-FFF2-40B4-BE49-F238E27FC236}">
                 <a16:creationId xmlns:a16="http://schemas.microsoft.com/office/drawing/2014/main" id="{F64F700D-59E2-F229-195C-FCF79FDABACB}"/>
@@ -5229,7 +5693,7 @@
         </p:nvSpPr>
         <p:spPr>
           <a:xfrm>
-            <a:off x="2313137" y="852359"/>
+            <a:off x="2313137" y="945964"/>
             <a:ext cx="1827063" cy="338554"/>
           </a:xfrm>
           <a:prstGeom prst="rect">
@@ -5266,7 +5730,7 @@
       </p:sp>
       <p:sp>
         <p:nvSpPr>
-          <p:cNvPr id="15" name="TextBox 14">
+          <p:cNvPr id="42" name="TextBox 41">
             <a:extLst>
               <a:ext uri="{FF2B5EF4-FFF2-40B4-BE49-F238E27FC236}">
                 <a16:creationId xmlns:a16="http://schemas.microsoft.com/office/drawing/2014/main" id="{675F66ED-1587-EE2D-7961-3C1CE26DA6A5}"/>
@@ -5278,7 +5742,7 @@
         </p:nvSpPr>
         <p:spPr>
           <a:xfrm>
-            <a:off x="31039" y="1350528"/>
+            <a:off x="31337" y="1518168"/>
             <a:ext cx="430887" cy="734524"/>
           </a:xfrm>
           <a:prstGeom prst="rect">
@@ -5301,7 +5765,7 @@
                 <a:latin typeface="Calibri" panose="020F0502020204030204" pitchFamily="34" charset="0"/>
                 <a:cs typeface="Calibri" panose="020F0502020204030204" pitchFamily="34" charset="0"/>
               </a:rPr>
-              <a:t>Verifying Threshold</a:t>
+              <a:t>DP: Verifying Threshold</a:t>
             </a:r>
             <a:endParaRPr lang="en-GB" sz="800" b="1" dirty="0">
               <a:solidFill>
@@ -5315,7 +5779,7 @@
       </p:sp>
       <p:sp>
         <p:nvSpPr>
-          <p:cNvPr id="16" name="TextBox 15">
+          <p:cNvPr id="43" name="TextBox 42">
             <a:extLst>
               <a:ext uri="{FF2B5EF4-FFF2-40B4-BE49-F238E27FC236}">
                 <a16:creationId xmlns:a16="http://schemas.microsoft.com/office/drawing/2014/main" id="{EE073022-3D67-FA36-A6BB-1349696A25C2}"/>
@@ -5327,7 +5791,7 @@
         </p:nvSpPr>
         <p:spPr>
           <a:xfrm>
-            <a:off x="1348173" y="1223326"/>
+            <a:off x="1348173" y="1390966"/>
             <a:ext cx="927067" cy="954107"/>
           </a:xfrm>
           <a:prstGeom prst="rect">
@@ -5364,7 +5828,7 @@
       </p:sp>
       <p:sp>
         <p:nvSpPr>
-          <p:cNvPr id="17" name="TextBox 16">
+          <p:cNvPr id="44" name="TextBox 43">
             <a:extLst>
               <a:ext uri="{FF2B5EF4-FFF2-40B4-BE49-F238E27FC236}">
                 <a16:creationId xmlns:a16="http://schemas.microsoft.com/office/drawing/2014/main" id="{6FE58704-E40A-B268-7ACF-6EE103269248}"/>
@@ -5376,7 +5840,7 @@
         </p:nvSpPr>
         <p:spPr>
           <a:xfrm>
-            <a:off x="2290452" y="1469140"/>
+            <a:off x="2290452" y="1636780"/>
             <a:ext cx="1823052" cy="461665"/>
           </a:xfrm>
           <a:prstGeom prst="rect">
@@ -5426,7 +5890,7 @@
       </p:sp>
       <p:sp>
         <p:nvSpPr>
-          <p:cNvPr id="18" name="TextBox 17">
+          <p:cNvPr id="45" name="TextBox 44">
             <a:extLst>
               <a:ext uri="{FF2B5EF4-FFF2-40B4-BE49-F238E27FC236}">
                 <a16:creationId xmlns:a16="http://schemas.microsoft.com/office/drawing/2014/main" id="{92B98603-355D-9B96-6D9F-C8009BB9722A}"/>
@@ -5438,8 +5902,8 @@
         </p:nvSpPr>
         <p:spPr>
           <a:xfrm>
-            <a:off x="92594" y="2546225"/>
-            <a:ext cx="307777" cy="734524"/>
+            <a:off x="31337" y="2713865"/>
+            <a:ext cx="430887" cy="734524"/>
           </a:xfrm>
           <a:prstGeom prst="rect">
             <a:avLst/>
@@ -5461,7 +5925,7 @@
                 <a:latin typeface="Calibri" panose="020F0502020204030204" pitchFamily="34" charset="0"/>
                 <a:cs typeface="Calibri" panose="020F0502020204030204" pitchFamily="34" charset="0"/>
               </a:rPr>
-              <a:t>Field Creation</a:t>
+              <a:t>DP: Field Creation</a:t>
             </a:r>
             <a:endParaRPr lang="en-GB" sz="800" b="1" dirty="0">
               <a:solidFill>
@@ -5475,7 +5939,7 @@
       </p:sp>
       <p:sp>
         <p:nvSpPr>
-          <p:cNvPr id="19" name="TextBox 18">
+          <p:cNvPr id="46" name="TextBox 45">
             <a:extLst>
               <a:ext uri="{FF2B5EF4-FFF2-40B4-BE49-F238E27FC236}">
                 <a16:creationId xmlns:a16="http://schemas.microsoft.com/office/drawing/2014/main" id="{930869D1-E322-FC45-BA00-86C98ADC3B23}"/>
@@ -5487,7 +5951,7 @@
         </p:nvSpPr>
         <p:spPr>
           <a:xfrm>
-            <a:off x="341980" y="2190212"/>
+            <a:off x="341980" y="2357852"/>
             <a:ext cx="1059664" cy="1446550"/>
           </a:xfrm>
           <a:prstGeom prst="rect">
@@ -5527,7 +5991,7 @@
       </p:sp>
       <p:sp>
         <p:nvSpPr>
-          <p:cNvPr id="20" name="TextBox 19">
+          <p:cNvPr id="47" name="TextBox 46">
             <a:extLst>
               <a:ext uri="{FF2B5EF4-FFF2-40B4-BE49-F238E27FC236}">
                 <a16:creationId xmlns:a16="http://schemas.microsoft.com/office/drawing/2014/main" id="{BD8DD6A2-178B-DB31-2592-FE465B91B968}"/>
@@ -5539,7 +6003,7 @@
         </p:nvSpPr>
         <p:spPr>
           <a:xfrm>
-            <a:off x="1371231" y="2744210"/>
+            <a:off x="1371231" y="2911850"/>
             <a:ext cx="2761489" cy="338554"/>
           </a:xfrm>
           <a:prstGeom prst="rect">
@@ -5569,7 +6033,7 @@
       </p:sp>
       <p:sp>
         <p:nvSpPr>
-          <p:cNvPr id="21" name="TextBox 20">
+          <p:cNvPr id="48" name="TextBox 47">
             <a:extLst>
               <a:ext uri="{FF2B5EF4-FFF2-40B4-BE49-F238E27FC236}">
                 <a16:creationId xmlns:a16="http://schemas.microsoft.com/office/drawing/2014/main" id="{4F2F5DC6-56FD-AA6B-238F-F1D3E9FEA95A}"/>
@@ -5581,8 +6045,8 @@
         </p:nvSpPr>
         <p:spPr>
           <a:xfrm>
-            <a:off x="45690" y="3751062"/>
-            <a:ext cx="307777" cy="1433231"/>
+            <a:off x="-113350" y="831838"/>
+            <a:ext cx="307777" cy="4401666"/>
           </a:xfrm>
           <a:prstGeom prst="rect">
             <a:avLst/>
@@ -5611,7 +6075,7 @@
       </p:sp>
       <p:sp>
         <p:nvSpPr>
-          <p:cNvPr id="22" name="TextBox 21">
+          <p:cNvPr id="49" name="TextBox 48">
             <a:extLst>
               <a:ext uri="{FF2B5EF4-FFF2-40B4-BE49-F238E27FC236}">
                 <a16:creationId xmlns:a16="http://schemas.microsoft.com/office/drawing/2014/main" id="{BF12B402-8ABA-F1A7-0C14-F3F1483ABF5A}"/>
@@ -5623,7 +6087,7 @@
         </p:nvSpPr>
         <p:spPr>
           <a:xfrm>
-            <a:off x="1294576" y="3737743"/>
+            <a:off x="1294576" y="3905383"/>
             <a:ext cx="1059664" cy="1200329"/>
           </a:xfrm>
           <a:prstGeom prst="rect">
@@ -5735,7 +6199,7 @@
       </p:sp>
       <p:sp>
         <p:nvSpPr>
-          <p:cNvPr id="23" name="TextBox 22">
+          <p:cNvPr id="50" name="TextBox 49">
             <a:extLst>
               <a:ext uri="{FF2B5EF4-FFF2-40B4-BE49-F238E27FC236}">
                 <a16:creationId xmlns:a16="http://schemas.microsoft.com/office/drawing/2014/main" id="{E33BAA42-6AE6-B9C5-7D87-CC1819156847}"/>
@@ -5747,7 +6211,7 @@
         </p:nvSpPr>
         <p:spPr>
           <a:xfrm>
-            <a:off x="2231422" y="3737743"/>
+            <a:off x="2231422" y="3905383"/>
             <a:ext cx="1997677" cy="1446550"/>
           </a:xfrm>
           <a:prstGeom prst="rect">
@@ -5901,7 +6365,7 @@
       </p:sp>
       <p:sp>
         <p:nvSpPr>
-          <p:cNvPr id="24" name="TextBox 23">
+          <p:cNvPr id="51" name="TextBox 50">
             <a:extLst>
               <a:ext uri="{FF2B5EF4-FFF2-40B4-BE49-F238E27FC236}">
                 <a16:creationId xmlns:a16="http://schemas.microsoft.com/office/drawing/2014/main" id="{49445F97-EAF9-8864-EB39-A2AABCEDD7FB}"/>
@@ -5913,7 +6377,7 @@
         </p:nvSpPr>
         <p:spPr>
           <a:xfrm>
-            <a:off x="-15865" y="5240393"/>
+            <a:off x="-81390" y="5414390"/>
             <a:ext cx="430887" cy="753105"/>
           </a:xfrm>
           <a:prstGeom prst="rect">
@@ -5956,10 +6420,10 @@
       </p:sp>
       <p:cxnSp>
         <p:nvCxnSpPr>
-          <p:cNvPr id="25" name="Straight Connector 24">
+          <p:cNvPr id="52" name="Straight Connector 51">
             <a:extLst>
               <a:ext uri="{FF2B5EF4-FFF2-40B4-BE49-F238E27FC236}">
-                <a16:creationId xmlns:a16="http://schemas.microsoft.com/office/drawing/2014/main" id="{F5B77EE0-1764-73C0-B82D-D5C6872D70F3}"/>
+                <a16:creationId xmlns:a16="http://schemas.microsoft.com/office/drawing/2014/main" id="{B34D1450-8571-CA5B-49E2-E7FF08CBEEA7}"/>
               </a:ext>
             </a:extLst>
           </p:cNvPr>
@@ -5970,7 +6434,7 @@
         </p:nvCxnSpPr>
         <p:spPr>
           <a:xfrm>
-            <a:off x="2246" y="3680649"/>
+            <a:off x="-5176" y="5401144"/>
             <a:ext cx="4140000" cy="0"/>
           </a:xfrm>
           <a:prstGeom prst="line">
@@ -6002,53 +6466,7 @@
       </p:cxnSp>
       <p:cxnSp>
         <p:nvCxnSpPr>
-          <p:cNvPr id="26" name="Straight Connector 25">
-            <a:extLst>
-              <a:ext uri="{FF2B5EF4-FFF2-40B4-BE49-F238E27FC236}">
-                <a16:creationId xmlns:a16="http://schemas.microsoft.com/office/drawing/2014/main" id="{B34D1450-8571-CA5B-49E2-E7FF08CBEEA7}"/>
-              </a:ext>
-            </a:extLst>
-          </p:cNvPr>
-          <p:cNvCxnSpPr>
-            <a:cxnSpLocks/>
-          </p:cNvCxnSpPr>
-          <p:nvPr/>
-        </p:nvCxnSpPr>
-        <p:spPr>
-          <a:xfrm>
-            <a:off x="-5176" y="5233504"/>
-            <a:ext cx="4140000" cy="0"/>
-          </a:xfrm>
-          <a:prstGeom prst="line">
-            <a:avLst/>
-          </a:prstGeom>
-          <a:ln w="19050">
-            <a:solidFill>
-              <a:schemeClr val="tx1">
-                <a:lumMod val="75000"/>
-                <a:lumOff val="25000"/>
-              </a:schemeClr>
-            </a:solidFill>
-          </a:ln>
-        </p:spPr>
-        <p:style>
-          <a:lnRef idx="2">
-            <a:schemeClr val="accent1"/>
-          </a:lnRef>
-          <a:fillRef idx="0">
-            <a:schemeClr val="accent1"/>
-          </a:fillRef>
-          <a:effectRef idx="1">
-            <a:schemeClr val="accent1"/>
-          </a:effectRef>
-          <a:fontRef idx="minor">
-            <a:schemeClr val="tx1"/>
-          </a:fontRef>
-        </p:style>
-      </p:cxnSp>
-      <p:cxnSp>
-        <p:nvCxnSpPr>
-          <p:cNvPr id="27" name="Straight Connector 26">
+          <p:cNvPr id="53" name="Straight Connector 52">
             <a:extLst>
               <a:ext uri="{FF2B5EF4-FFF2-40B4-BE49-F238E27FC236}">
                 <a16:creationId xmlns:a16="http://schemas.microsoft.com/office/drawing/2014/main" id="{EBA96BED-1C2B-2165-A516-69C67FBDEA11}"/>
@@ -6062,7 +6480,7 @@
         </p:nvCxnSpPr>
         <p:spPr>
           <a:xfrm>
-            <a:off x="175863" y="2190212"/>
+            <a:off x="175863" y="2357852"/>
             <a:ext cx="3964337" cy="0"/>
           </a:xfrm>
           <a:prstGeom prst="line">
@@ -6093,7 +6511,7 @@
       </p:cxnSp>
       <p:cxnSp>
         <p:nvCxnSpPr>
-          <p:cNvPr id="28" name="Straight Connector 27">
+          <p:cNvPr id="54" name="Straight Connector 53">
             <a:extLst>
               <a:ext uri="{FF2B5EF4-FFF2-40B4-BE49-F238E27FC236}">
                 <a16:creationId xmlns:a16="http://schemas.microsoft.com/office/drawing/2014/main" id="{D65539E4-71BB-6DCB-81BC-F16BB93F43F8}"/>
@@ -6107,8 +6525,102 @@
         </p:nvCxnSpPr>
         <p:spPr>
           <a:xfrm>
-            <a:off x="168383" y="1245367"/>
+            <a:off x="168383" y="1413007"/>
             <a:ext cx="3971817" cy="0"/>
+          </a:xfrm>
+          <a:prstGeom prst="line">
+            <a:avLst/>
+          </a:prstGeom>
+          <a:ln w="3175">
+            <a:solidFill>
+              <a:schemeClr val="bg1">
+                <a:lumMod val="75000"/>
+              </a:schemeClr>
+            </a:solidFill>
+          </a:ln>
+        </p:spPr>
+        <p:style>
+          <a:lnRef idx="2">
+            <a:schemeClr val="accent1"/>
+          </a:lnRef>
+          <a:fillRef idx="0">
+            <a:schemeClr val="accent1"/>
+          </a:fillRef>
+          <a:effectRef idx="1">
+            <a:schemeClr val="accent1"/>
+          </a:effectRef>
+          <a:fontRef idx="minor">
+            <a:schemeClr val="tx1"/>
+          </a:fontRef>
+        </p:style>
+      </p:cxnSp>
+      <p:sp>
+        <p:nvSpPr>
+          <p:cNvPr id="55" name="TextBox 54">
+            <a:extLst>
+              <a:ext uri="{FF2B5EF4-FFF2-40B4-BE49-F238E27FC236}">
+                <a16:creationId xmlns:a16="http://schemas.microsoft.com/office/drawing/2014/main" id="{D9841862-2050-5B02-3FBC-54A24536641A}"/>
+              </a:ext>
+            </a:extLst>
+          </p:cNvPr>
+          <p:cNvSpPr txBox="1"/>
+          <p:nvPr/>
+        </p:nvSpPr>
+        <p:spPr>
+          <a:xfrm>
+            <a:off x="92892" y="3861552"/>
+            <a:ext cx="307777" cy="1532704"/>
+          </a:xfrm>
+          <a:prstGeom prst="rect">
+            <a:avLst/>
+          </a:prstGeom>
+          <a:noFill/>
+        </p:spPr>
+        <p:txBody>
+          <a:bodyPr vert="vert270" wrap="square" rtlCol="0">
+            <a:spAutoFit/>
+          </a:bodyPr>
+          <a:lstStyle/>
+          <a:p>
+            <a:pPr algn="ctr"/>
+            <a:r>
+              <a:rPr lang="en-US" sz="800" b="1" dirty="0">
+                <a:solidFill>
+                  <a:srgbClr val="222222"/>
+                </a:solidFill>
+                <a:latin typeface="Calibri" panose="020F0502020204030204" pitchFamily="34" charset="0"/>
+                <a:cs typeface="Calibri" panose="020F0502020204030204" pitchFamily="34" charset="0"/>
+              </a:rPr>
+              <a:t>List of considered scores</a:t>
+            </a:r>
+            <a:endParaRPr lang="en-GB" sz="800" b="1" dirty="0">
+              <a:solidFill>
+                <a:srgbClr val="222222"/>
+              </a:solidFill>
+              <a:latin typeface="Calibri" panose="020F0502020204030204" pitchFamily="34" charset="0"/>
+              <a:cs typeface="Calibri" panose="020F0502020204030204" pitchFamily="34" charset="0"/>
+            </a:endParaRPr>
+          </a:p>
+        </p:txBody>
+      </p:sp>
+      <p:cxnSp>
+        <p:nvCxnSpPr>
+          <p:cNvPr id="56" name="Straight Connector 55">
+            <a:extLst>
+              <a:ext uri="{FF2B5EF4-FFF2-40B4-BE49-F238E27FC236}">
+                <a16:creationId xmlns:a16="http://schemas.microsoft.com/office/drawing/2014/main" id="{0A72F057-9E72-400E-8109-69D873A1808C}"/>
+              </a:ext>
+            </a:extLst>
+          </p:cNvPr>
+          <p:cNvCxnSpPr>
+            <a:cxnSpLocks/>
+          </p:cNvCxnSpPr>
+          <p:nvPr/>
+        </p:nvCxnSpPr>
+        <p:spPr>
+          <a:xfrm>
+            <a:off x="168383" y="3861552"/>
+            <a:ext cx="3964337" cy="0"/>
           </a:xfrm>
           <a:prstGeom prst="line">
             <a:avLst/>

</xml_diff>